<commit_message>
menyelesaikan input form wo dan sudah tampil baik di ppt. lanjut input form unit
</commit_message>
<xml_diff>
--- a/template.pptx
+++ b/template.pptx
@@ -2,18 +2,18 @@
 <file path=ppt/presentation.xml><?xml version="1.0" encoding="utf-8"?>
 <p:presentation xmlns:a="http://schemas.openxmlformats.org/drawingml/2006/main" xmlns:r="http://schemas.openxmlformats.org/officeDocument/2006/relationships" xmlns:p="http://schemas.openxmlformats.org/presentationml/2006/main" saveSubsetFonts="1">
   <p:sldMasterIdLst>
-    <p:sldMasterId id="2147483648" r:id="rId1"/>
+    <p:sldMasterId id="2147483660" r:id="rId1"/>
   </p:sldMasterIdLst>
   <p:sldIdLst>
     <p:sldId id="256" r:id="rId2"/>
   </p:sldIdLst>
-  <p:sldSz cx="12192000" cy="6858000"/>
+  <p:sldSz cx="9144000" cy="6858000" type="screen4x3"/>
   <p:notesSz cx="6858000" cy="9144000"/>
   <p:defaultTextStyle>
     <a:defPPr>
-      <a:defRPr lang="id-ID"/>
+      <a:defRPr lang="en-US"/>
     </a:defPPr>
-    <a:lvl1pPr marL="0" algn="l" defTabSz="914400" rtl="0" eaLnBrk="1" latinLnBrk="0" hangingPunct="1">
+    <a:lvl1pPr marL="0" algn="l" defTabSz="457200" rtl="0" eaLnBrk="1" latinLnBrk="0" hangingPunct="1">
       <a:defRPr sz="1800" kern="1200">
         <a:solidFill>
           <a:schemeClr val="tx1"/>
@@ -23,7 +23,7 @@
         <a:cs typeface="+mn-cs"/>
       </a:defRPr>
     </a:lvl1pPr>
-    <a:lvl2pPr marL="457200" algn="l" defTabSz="914400" rtl="0" eaLnBrk="1" latinLnBrk="0" hangingPunct="1">
+    <a:lvl2pPr marL="457200" algn="l" defTabSz="457200" rtl="0" eaLnBrk="1" latinLnBrk="0" hangingPunct="1">
       <a:defRPr sz="1800" kern="1200">
         <a:solidFill>
           <a:schemeClr val="tx1"/>
@@ -33,7 +33,7 @@
         <a:cs typeface="+mn-cs"/>
       </a:defRPr>
     </a:lvl2pPr>
-    <a:lvl3pPr marL="914400" algn="l" defTabSz="914400" rtl="0" eaLnBrk="1" latinLnBrk="0" hangingPunct="1">
+    <a:lvl3pPr marL="914400" algn="l" defTabSz="457200" rtl="0" eaLnBrk="1" latinLnBrk="0" hangingPunct="1">
       <a:defRPr sz="1800" kern="1200">
         <a:solidFill>
           <a:schemeClr val="tx1"/>
@@ -43,7 +43,7 @@
         <a:cs typeface="+mn-cs"/>
       </a:defRPr>
     </a:lvl3pPr>
-    <a:lvl4pPr marL="1371600" algn="l" defTabSz="914400" rtl="0" eaLnBrk="1" latinLnBrk="0" hangingPunct="1">
+    <a:lvl4pPr marL="1371600" algn="l" defTabSz="457200" rtl="0" eaLnBrk="1" latinLnBrk="0" hangingPunct="1">
       <a:defRPr sz="1800" kern="1200">
         <a:solidFill>
           <a:schemeClr val="tx1"/>
@@ -53,7 +53,7 @@
         <a:cs typeface="+mn-cs"/>
       </a:defRPr>
     </a:lvl4pPr>
-    <a:lvl5pPr marL="1828800" algn="l" defTabSz="914400" rtl="0" eaLnBrk="1" latinLnBrk="0" hangingPunct="1">
+    <a:lvl5pPr marL="1828800" algn="l" defTabSz="457200" rtl="0" eaLnBrk="1" latinLnBrk="0" hangingPunct="1">
       <a:defRPr sz="1800" kern="1200">
         <a:solidFill>
           <a:schemeClr val="tx1"/>
@@ -63,7 +63,7 @@
         <a:cs typeface="+mn-cs"/>
       </a:defRPr>
     </a:lvl5pPr>
-    <a:lvl6pPr marL="2286000" algn="l" defTabSz="914400" rtl="0" eaLnBrk="1" latinLnBrk="0" hangingPunct="1">
+    <a:lvl6pPr marL="2286000" algn="l" defTabSz="457200" rtl="0" eaLnBrk="1" latinLnBrk="0" hangingPunct="1">
       <a:defRPr sz="1800" kern="1200">
         <a:solidFill>
           <a:schemeClr val="tx1"/>
@@ -73,7 +73,7 @@
         <a:cs typeface="+mn-cs"/>
       </a:defRPr>
     </a:lvl6pPr>
-    <a:lvl7pPr marL="2743200" algn="l" defTabSz="914400" rtl="0" eaLnBrk="1" latinLnBrk="0" hangingPunct="1">
+    <a:lvl7pPr marL="2743200" algn="l" defTabSz="457200" rtl="0" eaLnBrk="1" latinLnBrk="0" hangingPunct="1">
       <a:defRPr sz="1800" kern="1200">
         <a:solidFill>
           <a:schemeClr val="tx1"/>
@@ -83,7 +83,7 @@
         <a:cs typeface="+mn-cs"/>
       </a:defRPr>
     </a:lvl7pPr>
-    <a:lvl8pPr marL="3200400" algn="l" defTabSz="914400" rtl="0" eaLnBrk="1" latinLnBrk="0" hangingPunct="1">
+    <a:lvl8pPr marL="3200400" algn="l" defTabSz="457200" rtl="0" eaLnBrk="1" latinLnBrk="0" hangingPunct="1">
       <a:defRPr sz="1800" kern="1200">
         <a:solidFill>
           <a:schemeClr val="tx1"/>
@@ -93,7 +93,7 @@
         <a:cs typeface="+mn-cs"/>
       </a:defRPr>
     </a:lvl8pPr>
-    <a:lvl9pPr marL="3657600" algn="l" defTabSz="914400" rtl="0" eaLnBrk="1" latinLnBrk="0" hangingPunct="1">
+    <a:lvl9pPr marL="3657600" algn="l" defTabSz="457200" rtl="0" eaLnBrk="1" latinLnBrk="0" hangingPunct="1">
       <a:defRPr sz="1800" kern="1200">
         <a:solidFill>
           <a:schemeClr val="tx1"/>
@@ -104,6 +104,11 @@
       </a:defRPr>
     </a:lvl9pPr>
   </p:defaultTextStyle>
+  <p:extLst>
+    <p:ext uri="{EFAFB233-063F-42B5-8137-9DF3F51BA10A}">
+      <p15:sldGuideLst xmlns:p15="http://schemas.microsoft.com/office/powerpoint/2012/main"/>
+    </p:ext>
+  </p:extLst>
 </p:presentation>
 </file>
 
@@ -126,13 +131,7 @@
       </p:grpSpPr>
       <p:sp>
         <p:nvSpPr>
-          <p:cNvPr id="2" name="Title 1">
-            <a:extLst>
-              <a:ext uri="{FF2B5EF4-FFF2-40B4-BE49-F238E27FC236}">
-                <a16:creationId xmlns:a16="http://schemas.microsoft.com/office/drawing/2014/main" id="{F62D22D3-ED33-4C6A-8C9D-D4F120E1FB3F}"/>
-              </a:ext>
-            </a:extLst>
-          </p:cNvPr>
+          <p:cNvPr id="2" name="Title 1"/>
           <p:cNvSpPr>
             <a:spLocks noGrp="1"/>
           </p:cNvSpPr>
@@ -142,8 +141,8 @@
         </p:nvSpPr>
         <p:spPr>
           <a:xfrm>
-            <a:off x="1524000" y="1122363"/>
-            <a:ext cx="9144000" cy="2387600"/>
+            <a:off x="685800" y="1122363"/>
+            <a:ext cx="7772400" cy="2387600"/>
           </a:xfrm>
         </p:spPr>
         <p:txBody>
@@ -158,19 +157,13 @@
               <a:rPr lang="en-US"/>
               <a:t>Click to edit Master title style</a:t>
             </a:r>
-            <a:endParaRPr lang="id-ID"/>
-          </a:p>
-        </p:txBody>
-      </p:sp>
-      <p:sp>
-        <p:nvSpPr>
-          <p:cNvPr id="3" name="Subtitle 2">
-            <a:extLst>
-              <a:ext uri="{FF2B5EF4-FFF2-40B4-BE49-F238E27FC236}">
-                <a16:creationId xmlns:a16="http://schemas.microsoft.com/office/drawing/2014/main" id="{B000084A-768E-4523-AFE9-CD1EDCF8F78D}"/>
-              </a:ext>
-            </a:extLst>
-          </p:cNvPr>
+            <a:endParaRPr lang="en-US" dirty="0"/>
+          </a:p>
+        </p:txBody>
+      </p:sp>
+      <p:sp>
+        <p:nvSpPr>
+          <p:cNvPr id="3" name="Subtitle 2"/>
           <p:cNvSpPr>
             <a:spLocks noGrp="1"/>
           </p:cNvSpPr>
@@ -180,8 +173,8 @@
         </p:nvSpPr>
         <p:spPr>
           <a:xfrm>
-            <a:off x="1524000" y="3602038"/>
-            <a:ext cx="9144000" cy="1655762"/>
+            <a:off x="1143000" y="3602038"/>
+            <a:ext cx="6858000" cy="1655762"/>
           </a:xfrm>
         </p:spPr>
         <p:txBody>
@@ -229,19 +222,13 @@
               <a:rPr lang="en-US"/>
               <a:t>Click to edit Master subtitle style</a:t>
             </a:r>
-            <a:endParaRPr lang="id-ID"/>
-          </a:p>
-        </p:txBody>
-      </p:sp>
-      <p:sp>
-        <p:nvSpPr>
-          <p:cNvPr id="4" name="Date Placeholder 3">
-            <a:extLst>
-              <a:ext uri="{FF2B5EF4-FFF2-40B4-BE49-F238E27FC236}">
-                <a16:creationId xmlns:a16="http://schemas.microsoft.com/office/drawing/2014/main" id="{B3295FBE-D770-4757-A1BD-9205A9D90FAB}"/>
-              </a:ext>
-            </a:extLst>
-          </p:cNvPr>
+            <a:endParaRPr lang="en-US" dirty="0"/>
+          </a:p>
+        </p:txBody>
+      </p:sp>
+      <p:sp>
+        <p:nvSpPr>
+          <p:cNvPr id="4" name="Date Placeholder 3"/>
           <p:cNvSpPr>
             <a:spLocks noGrp="1"/>
           </p:cNvSpPr>
@@ -256,7 +243,7 @@
           <a:p>
             <a:fld id="{4EFE2193-3B2A-43CE-A067-88969492A3B6}" type="datetimeFigureOut">
               <a:rPr lang="id-ID" smtClean="0"/>
-              <a:t>06/11/2025</a:t>
+              <a:t>08/11/2025</a:t>
             </a:fld>
             <a:endParaRPr lang="id-ID"/>
           </a:p>
@@ -264,13 +251,7 @@
       </p:sp>
       <p:sp>
         <p:nvSpPr>
-          <p:cNvPr id="5" name="Footer Placeholder 4">
-            <a:extLst>
-              <a:ext uri="{FF2B5EF4-FFF2-40B4-BE49-F238E27FC236}">
-                <a16:creationId xmlns:a16="http://schemas.microsoft.com/office/drawing/2014/main" id="{5D55A1BA-BF4E-468F-A325-EE96D5EAAE61}"/>
-              </a:ext>
-            </a:extLst>
-          </p:cNvPr>
+          <p:cNvPr id="5" name="Footer Placeholder 4"/>
           <p:cNvSpPr>
             <a:spLocks noGrp="1"/>
           </p:cNvSpPr>
@@ -289,13 +270,7 @@
       </p:sp>
       <p:sp>
         <p:nvSpPr>
-          <p:cNvPr id="6" name="Slide Number Placeholder 5">
-            <a:extLst>
-              <a:ext uri="{FF2B5EF4-FFF2-40B4-BE49-F238E27FC236}">
-                <a16:creationId xmlns:a16="http://schemas.microsoft.com/office/drawing/2014/main" id="{9911DCAF-F554-4CAD-8A90-46DEBC938B94}"/>
-              </a:ext>
-            </a:extLst>
-          </p:cNvPr>
+          <p:cNvPr id="6" name="Slide Number Placeholder 5"/>
           <p:cNvSpPr>
             <a:spLocks noGrp="1"/>
           </p:cNvSpPr>
@@ -319,7 +294,7 @@
     </p:spTree>
     <p:extLst>
       <p:ext uri="{BB962C8B-B14F-4D97-AF65-F5344CB8AC3E}">
-        <p14:creationId xmlns:p14="http://schemas.microsoft.com/office/powerpoint/2010/main" val="2071974322"/>
+        <p14:creationId xmlns:p14="http://schemas.microsoft.com/office/powerpoint/2010/main" val="605002860"/>
       </p:ext>
     </p:extLst>
   </p:cSld>
@@ -348,13 +323,7 @@
       </p:grpSpPr>
       <p:sp>
         <p:nvSpPr>
-          <p:cNvPr id="2" name="Title 1">
-            <a:extLst>
-              <a:ext uri="{FF2B5EF4-FFF2-40B4-BE49-F238E27FC236}">
-                <a16:creationId xmlns:a16="http://schemas.microsoft.com/office/drawing/2014/main" id="{7B3AB306-4445-4B0A-A580-D1C3A7B665B9}"/>
-              </a:ext>
-            </a:extLst>
-          </p:cNvPr>
+          <p:cNvPr id="2" name="Title 1"/>
           <p:cNvSpPr>
             <a:spLocks noGrp="1"/>
           </p:cNvSpPr>
@@ -371,19 +340,13 @@
               <a:rPr lang="en-US"/>
               <a:t>Click to edit Master title style</a:t>
             </a:r>
-            <a:endParaRPr lang="id-ID"/>
-          </a:p>
-        </p:txBody>
-      </p:sp>
-      <p:sp>
-        <p:nvSpPr>
-          <p:cNvPr id="3" name="Vertical Text Placeholder 2">
-            <a:extLst>
-              <a:ext uri="{FF2B5EF4-FFF2-40B4-BE49-F238E27FC236}">
-                <a16:creationId xmlns:a16="http://schemas.microsoft.com/office/drawing/2014/main" id="{53290B88-5408-4B94-9645-409F9E823B4A}"/>
-              </a:ext>
-            </a:extLst>
-          </p:cNvPr>
+            <a:endParaRPr lang="en-US" dirty="0"/>
+          </a:p>
+        </p:txBody>
+      </p:sp>
+      <p:sp>
+        <p:nvSpPr>
+          <p:cNvPr id="3" name="Vertical Text Placeholder 2"/>
           <p:cNvSpPr>
             <a:spLocks noGrp="1"/>
           </p:cNvSpPr>
@@ -429,19 +392,13 @@
               <a:rPr lang="en-US"/>
               <a:t>Fifth level</a:t>
             </a:r>
-            <a:endParaRPr lang="id-ID"/>
-          </a:p>
-        </p:txBody>
-      </p:sp>
-      <p:sp>
-        <p:nvSpPr>
-          <p:cNvPr id="4" name="Date Placeholder 3">
-            <a:extLst>
-              <a:ext uri="{FF2B5EF4-FFF2-40B4-BE49-F238E27FC236}">
-                <a16:creationId xmlns:a16="http://schemas.microsoft.com/office/drawing/2014/main" id="{8E387FBA-B0FD-47EF-82F7-F56B1D273226}"/>
-              </a:ext>
-            </a:extLst>
-          </p:cNvPr>
+            <a:endParaRPr lang="en-US" dirty="0"/>
+          </a:p>
+        </p:txBody>
+      </p:sp>
+      <p:sp>
+        <p:nvSpPr>
+          <p:cNvPr id="4" name="Date Placeholder 3"/>
           <p:cNvSpPr>
             <a:spLocks noGrp="1"/>
           </p:cNvSpPr>
@@ -456,7 +413,7 @@
           <a:p>
             <a:fld id="{4EFE2193-3B2A-43CE-A067-88969492A3B6}" type="datetimeFigureOut">
               <a:rPr lang="id-ID" smtClean="0"/>
-              <a:t>06/11/2025</a:t>
+              <a:t>08/11/2025</a:t>
             </a:fld>
             <a:endParaRPr lang="id-ID"/>
           </a:p>
@@ -464,13 +421,7 @@
       </p:sp>
       <p:sp>
         <p:nvSpPr>
-          <p:cNvPr id="5" name="Footer Placeholder 4">
-            <a:extLst>
-              <a:ext uri="{FF2B5EF4-FFF2-40B4-BE49-F238E27FC236}">
-                <a16:creationId xmlns:a16="http://schemas.microsoft.com/office/drawing/2014/main" id="{40D42C43-30C7-436C-975C-9AD5006C79B7}"/>
-              </a:ext>
-            </a:extLst>
-          </p:cNvPr>
+          <p:cNvPr id="5" name="Footer Placeholder 4"/>
           <p:cNvSpPr>
             <a:spLocks noGrp="1"/>
           </p:cNvSpPr>
@@ -489,13 +440,7 @@
       </p:sp>
       <p:sp>
         <p:nvSpPr>
-          <p:cNvPr id="6" name="Slide Number Placeholder 5">
-            <a:extLst>
-              <a:ext uri="{FF2B5EF4-FFF2-40B4-BE49-F238E27FC236}">
-                <a16:creationId xmlns:a16="http://schemas.microsoft.com/office/drawing/2014/main" id="{28FF9850-09C2-4A7C-9E1F-29595F1DDD34}"/>
-              </a:ext>
-            </a:extLst>
-          </p:cNvPr>
+          <p:cNvPr id="6" name="Slide Number Placeholder 5"/>
           <p:cNvSpPr>
             <a:spLocks noGrp="1"/>
           </p:cNvSpPr>
@@ -519,7 +464,7 @@
     </p:spTree>
     <p:extLst>
       <p:ext uri="{BB962C8B-B14F-4D97-AF65-F5344CB8AC3E}">
-        <p14:creationId xmlns:p14="http://schemas.microsoft.com/office/powerpoint/2010/main" val="2482062022"/>
+        <p14:creationId xmlns:p14="http://schemas.microsoft.com/office/powerpoint/2010/main" val="4150269399"/>
       </p:ext>
     </p:extLst>
   </p:cSld>
@@ -548,13 +493,7 @@
       </p:grpSpPr>
       <p:sp>
         <p:nvSpPr>
-          <p:cNvPr id="2" name="Vertical Title 1">
-            <a:extLst>
-              <a:ext uri="{FF2B5EF4-FFF2-40B4-BE49-F238E27FC236}">
-                <a16:creationId xmlns:a16="http://schemas.microsoft.com/office/drawing/2014/main" id="{10086C2C-4C5F-4EFA-BEE9-0C54F02317AE}"/>
-              </a:ext>
-            </a:extLst>
-          </p:cNvPr>
+          <p:cNvPr id="2" name="Vertical Title 1"/>
           <p:cNvSpPr>
             <a:spLocks noGrp="1"/>
           </p:cNvSpPr>
@@ -564,8 +503,8 @@
         </p:nvSpPr>
         <p:spPr>
           <a:xfrm>
-            <a:off x="8724900" y="365125"/>
-            <a:ext cx="2628900" cy="5811838"/>
+            <a:off x="6543675" y="365125"/>
+            <a:ext cx="1971675" cy="5811838"/>
           </a:xfrm>
         </p:spPr>
         <p:txBody>
@@ -576,19 +515,13 @@
               <a:rPr lang="en-US"/>
               <a:t>Click to edit Master title style</a:t>
             </a:r>
-            <a:endParaRPr lang="id-ID"/>
-          </a:p>
-        </p:txBody>
-      </p:sp>
-      <p:sp>
-        <p:nvSpPr>
-          <p:cNvPr id="3" name="Vertical Text Placeholder 2">
-            <a:extLst>
-              <a:ext uri="{FF2B5EF4-FFF2-40B4-BE49-F238E27FC236}">
-                <a16:creationId xmlns:a16="http://schemas.microsoft.com/office/drawing/2014/main" id="{76A92254-0305-4756-94A2-6734B3E19A21}"/>
-              </a:ext>
-            </a:extLst>
-          </p:cNvPr>
+            <a:endParaRPr lang="en-US" dirty="0"/>
+          </a:p>
+        </p:txBody>
+      </p:sp>
+      <p:sp>
+        <p:nvSpPr>
+          <p:cNvPr id="3" name="Vertical Text Placeholder 2"/>
           <p:cNvSpPr>
             <a:spLocks noGrp="1"/>
           </p:cNvSpPr>
@@ -598,8 +531,8 @@
         </p:nvSpPr>
         <p:spPr>
           <a:xfrm>
-            <a:off x="838200" y="365125"/>
-            <a:ext cx="7734300" cy="5811838"/>
+            <a:off x="628650" y="365125"/>
+            <a:ext cx="5800725" cy="5811838"/>
           </a:xfrm>
         </p:spPr>
         <p:txBody>
@@ -639,19 +572,13 @@
               <a:rPr lang="en-US"/>
               <a:t>Fifth level</a:t>
             </a:r>
-            <a:endParaRPr lang="id-ID"/>
-          </a:p>
-        </p:txBody>
-      </p:sp>
-      <p:sp>
-        <p:nvSpPr>
-          <p:cNvPr id="4" name="Date Placeholder 3">
-            <a:extLst>
-              <a:ext uri="{FF2B5EF4-FFF2-40B4-BE49-F238E27FC236}">
-                <a16:creationId xmlns:a16="http://schemas.microsoft.com/office/drawing/2014/main" id="{2A1E8ED7-60E1-4D58-BF00-0AF171E3F799}"/>
-              </a:ext>
-            </a:extLst>
-          </p:cNvPr>
+            <a:endParaRPr lang="en-US" dirty="0"/>
+          </a:p>
+        </p:txBody>
+      </p:sp>
+      <p:sp>
+        <p:nvSpPr>
+          <p:cNvPr id="4" name="Date Placeholder 3"/>
           <p:cNvSpPr>
             <a:spLocks noGrp="1"/>
           </p:cNvSpPr>
@@ -666,7 +593,7 @@
           <a:p>
             <a:fld id="{4EFE2193-3B2A-43CE-A067-88969492A3B6}" type="datetimeFigureOut">
               <a:rPr lang="id-ID" smtClean="0"/>
-              <a:t>06/11/2025</a:t>
+              <a:t>08/11/2025</a:t>
             </a:fld>
             <a:endParaRPr lang="id-ID"/>
           </a:p>
@@ -674,13 +601,7 @@
       </p:sp>
       <p:sp>
         <p:nvSpPr>
-          <p:cNvPr id="5" name="Footer Placeholder 4">
-            <a:extLst>
-              <a:ext uri="{FF2B5EF4-FFF2-40B4-BE49-F238E27FC236}">
-                <a16:creationId xmlns:a16="http://schemas.microsoft.com/office/drawing/2014/main" id="{A6F943AD-EE7C-4D9D-ACC5-887531D1A303}"/>
-              </a:ext>
-            </a:extLst>
-          </p:cNvPr>
+          <p:cNvPr id="5" name="Footer Placeholder 4"/>
           <p:cNvSpPr>
             <a:spLocks noGrp="1"/>
           </p:cNvSpPr>
@@ -699,13 +620,7 @@
       </p:sp>
       <p:sp>
         <p:nvSpPr>
-          <p:cNvPr id="6" name="Slide Number Placeholder 5">
-            <a:extLst>
-              <a:ext uri="{FF2B5EF4-FFF2-40B4-BE49-F238E27FC236}">
-                <a16:creationId xmlns:a16="http://schemas.microsoft.com/office/drawing/2014/main" id="{236A932A-DB24-4118-8334-08F6330A213A}"/>
-              </a:ext>
-            </a:extLst>
-          </p:cNvPr>
+          <p:cNvPr id="6" name="Slide Number Placeholder 5"/>
           <p:cNvSpPr>
             <a:spLocks noGrp="1"/>
           </p:cNvSpPr>
@@ -729,7 +644,7 @@
     </p:spTree>
     <p:extLst>
       <p:ext uri="{BB962C8B-B14F-4D97-AF65-F5344CB8AC3E}">
-        <p14:creationId xmlns:p14="http://schemas.microsoft.com/office/powerpoint/2010/main" val="1973453476"/>
+        <p14:creationId xmlns:p14="http://schemas.microsoft.com/office/powerpoint/2010/main" val="1189203665"/>
       </p:ext>
     </p:extLst>
   </p:cSld>
@@ -758,13 +673,7 @@
       </p:grpSpPr>
       <p:sp>
         <p:nvSpPr>
-          <p:cNvPr id="2" name="Title 1">
-            <a:extLst>
-              <a:ext uri="{FF2B5EF4-FFF2-40B4-BE49-F238E27FC236}">
-                <a16:creationId xmlns:a16="http://schemas.microsoft.com/office/drawing/2014/main" id="{B3D5AAEC-29F2-4209-8EE5-FC1EF26CAD37}"/>
-              </a:ext>
-            </a:extLst>
-          </p:cNvPr>
+          <p:cNvPr id="2" name="Title 1"/>
           <p:cNvSpPr>
             <a:spLocks noGrp="1"/>
           </p:cNvSpPr>
@@ -781,19 +690,13 @@
               <a:rPr lang="en-US"/>
               <a:t>Click to edit Master title style</a:t>
             </a:r>
-            <a:endParaRPr lang="id-ID"/>
-          </a:p>
-        </p:txBody>
-      </p:sp>
-      <p:sp>
-        <p:nvSpPr>
-          <p:cNvPr id="3" name="Content Placeholder 2">
-            <a:extLst>
-              <a:ext uri="{FF2B5EF4-FFF2-40B4-BE49-F238E27FC236}">
-                <a16:creationId xmlns:a16="http://schemas.microsoft.com/office/drawing/2014/main" id="{8D02F550-4273-47B9-8ECB-34B0DC7FF28C}"/>
-              </a:ext>
-            </a:extLst>
-          </p:cNvPr>
+            <a:endParaRPr lang="en-US" dirty="0"/>
+          </a:p>
+        </p:txBody>
+      </p:sp>
+      <p:sp>
+        <p:nvSpPr>
+          <p:cNvPr id="3" name="Content Placeholder 2"/>
           <p:cNvSpPr>
             <a:spLocks noGrp="1"/>
           </p:cNvSpPr>
@@ -839,19 +742,13 @@
               <a:rPr lang="en-US"/>
               <a:t>Fifth level</a:t>
             </a:r>
-            <a:endParaRPr lang="id-ID"/>
-          </a:p>
-        </p:txBody>
-      </p:sp>
-      <p:sp>
-        <p:nvSpPr>
-          <p:cNvPr id="4" name="Date Placeholder 3">
-            <a:extLst>
-              <a:ext uri="{FF2B5EF4-FFF2-40B4-BE49-F238E27FC236}">
-                <a16:creationId xmlns:a16="http://schemas.microsoft.com/office/drawing/2014/main" id="{A3E7BA95-BA60-449B-940F-489D541CC502}"/>
-              </a:ext>
-            </a:extLst>
-          </p:cNvPr>
+            <a:endParaRPr lang="en-US" dirty="0"/>
+          </a:p>
+        </p:txBody>
+      </p:sp>
+      <p:sp>
+        <p:nvSpPr>
+          <p:cNvPr id="4" name="Date Placeholder 3"/>
           <p:cNvSpPr>
             <a:spLocks noGrp="1"/>
           </p:cNvSpPr>
@@ -866,7 +763,7 @@
           <a:p>
             <a:fld id="{4EFE2193-3B2A-43CE-A067-88969492A3B6}" type="datetimeFigureOut">
               <a:rPr lang="id-ID" smtClean="0"/>
-              <a:t>06/11/2025</a:t>
+              <a:t>08/11/2025</a:t>
             </a:fld>
             <a:endParaRPr lang="id-ID"/>
           </a:p>
@@ -874,13 +771,7 @@
       </p:sp>
       <p:sp>
         <p:nvSpPr>
-          <p:cNvPr id="5" name="Footer Placeholder 4">
-            <a:extLst>
-              <a:ext uri="{FF2B5EF4-FFF2-40B4-BE49-F238E27FC236}">
-                <a16:creationId xmlns:a16="http://schemas.microsoft.com/office/drawing/2014/main" id="{B0EB6460-F0F2-481A-9E20-4BAB473A63B8}"/>
-              </a:ext>
-            </a:extLst>
-          </p:cNvPr>
+          <p:cNvPr id="5" name="Footer Placeholder 4"/>
           <p:cNvSpPr>
             <a:spLocks noGrp="1"/>
           </p:cNvSpPr>
@@ -899,13 +790,7 @@
       </p:sp>
       <p:sp>
         <p:nvSpPr>
-          <p:cNvPr id="6" name="Slide Number Placeholder 5">
-            <a:extLst>
-              <a:ext uri="{FF2B5EF4-FFF2-40B4-BE49-F238E27FC236}">
-                <a16:creationId xmlns:a16="http://schemas.microsoft.com/office/drawing/2014/main" id="{E24C1B0B-2DE6-449B-85BA-178FBF5D384C}"/>
-              </a:ext>
-            </a:extLst>
-          </p:cNvPr>
+          <p:cNvPr id="6" name="Slide Number Placeholder 5"/>
           <p:cNvSpPr>
             <a:spLocks noGrp="1"/>
           </p:cNvSpPr>
@@ -929,7 +814,7 @@
     </p:spTree>
     <p:extLst>
       <p:ext uri="{BB962C8B-B14F-4D97-AF65-F5344CB8AC3E}">
-        <p14:creationId xmlns:p14="http://schemas.microsoft.com/office/powerpoint/2010/main" val="1910251013"/>
+        <p14:creationId xmlns:p14="http://schemas.microsoft.com/office/powerpoint/2010/main" val="667000855"/>
       </p:ext>
     </p:extLst>
   </p:cSld>
@@ -958,13 +843,7 @@
       </p:grpSpPr>
       <p:sp>
         <p:nvSpPr>
-          <p:cNvPr id="2" name="Title 1">
-            <a:extLst>
-              <a:ext uri="{FF2B5EF4-FFF2-40B4-BE49-F238E27FC236}">
-                <a16:creationId xmlns:a16="http://schemas.microsoft.com/office/drawing/2014/main" id="{FEECB6F4-4C42-4C2A-9A31-1AD416B368DC}"/>
-              </a:ext>
-            </a:extLst>
-          </p:cNvPr>
+          <p:cNvPr id="2" name="Title 1"/>
           <p:cNvSpPr>
             <a:spLocks noGrp="1"/>
           </p:cNvSpPr>
@@ -974,8 +853,8 @@
         </p:nvSpPr>
         <p:spPr>
           <a:xfrm>
-            <a:off x="831850" y="1709738"/>
-            <a:ext cx="10515600" cy="2852737"/>
+            <a:off x="623888" y="1709739"/>
+            <a:ext cx="7886700" cy="2852737"/>
           </a:xfrm>
         </p:spPr>
         <p:txBody>
@@ -990,19 +869,13 @@
               <a:rPr lang="en-US"/>
               <a:t>Click to edit Master title style</a:t>
             </a:r>
-            <a:endParaRPr lang="id-ID"/>
-          </a:p>
-        </p:txBody>
-      </p:sp>
-      <p:sp>
-        <p:nvSpPr>
-          <p:cNvPr id="3" name="Text Placeholder 2">
-            <a:extLst>
-              <a:ext uri="{FF2B5EF4-FFF2-40B4-BE49-F238E27FC236}">
-                <a16:creationId xmlns:a16="http://schemas.microsoft.com/office/drawing/2014/main" id="{CF3AB828-EE76-4BD0-B7E1-F89CB1DEE461}"/>
-              </a:ext>
-            </a:extLst>
-          </p:cNvPr>
+            <a:endParaRPr lang="en-US" dirty="0"/>
+          </a:p>
+        </p:txBody>
+      </p:sp>
+      <p:sp>
+        <p:nvSpPr>
+          <p:cNvPr id="3" name="Text Placeholder 2"/>
           <p:cNvSpPr>
             <a:spLocks noGrp="1"/>
           </p:cNvSpPr>
@@ -1012,8 +885,8 @@
         </p:nvSpPr>
         <p:spPr>
           <a:xfrm>
-            <a:off x="831850" y="4589463"/>
-            <a:ext cx="10515600" cy="1500187"/>
+            <a:off x="623888" y="4589464"/>
+            <a:ext cx="7886700" cy="1500187"/>
           </a:xfrm>
         </p:spPr>
         <p:txBody>
@@ -1023,9 +896,7 @@
               <a:buNone/>
               <a:defRPr sz="2400">
                 <a:solidFill>
-                  <a:schemeClr val="tx1">
-                    <a:tint val="75000"/>
-                  </a:schemeClr>
+                  <a:schemeClr val="tx1"/>
                 </a:solidFill>
               </a:defRPr>
             </a:lvl1pPr>
@@ -1121,13 +992,7 @@
       </p:sp>
       <p:sp>
         <p:nvSpPr>
-          <p:cNvPr id="4" name="Date Placeholder 3">
-            <a:extLst>
-              <a:ext uri="{FF2B5EF4-FFF2-40B4-BE49-F238E27FC236}">
-                <a16:creationId xmlns:a16="http://schemas.microsoft.com/office/drawing/2014/main" id="{7EBCB85D-7F79-4D7B-9DC5-949A32C1601F}"/>
-              </a:ext>
-            </a:extLst>
-          </p:cNvPr>
+          <p:cNvPr id="4" name="Date Placeholder 3"/>
           <p:cNvSpPr>
             <a:spLocks noGrp="1"/>
           </p:cNvSpPr>
@@ -1142,7 +1007,7 @@
           <a:p>
             <a:fld id="{4EFE2193-3B2A-43CE-A067-88969492A3B6}" type="datetimeFigureOut">
               <a:rPr lang="id-ID" smtClean="0"/>
-              <a:t>06/11/2025</a:t>
+              <a:t>08/11/2025</a:t>
             </a:fld>
             <a:endParaRPr lang="id-ID"/>
           </a:p>
@@ -1150,13 +1015,7 @@
       </p:sp>
       <p:sp>
         <p:nvSpPr>
-          <p:cNvPr id="5" name="Footer Placeholder 4">
-            <a:extLst>
-              <a:ext uri="{FF2B5EF4-FFF2-40B4-BE49-F238E27FC236}">
-                <a16:creationId xmlns:a16="http://schemas.microsoft.com/office/drawing/2014/main" id="{CA43924D-7BA1-4C33-9ECF-E9334844796A}"/>
-              </a:ext>
-            </a:extLst>
-          </p:cNvPr>
+          <p:cNvPr id="5" name="Footer Placeholder 4"/>
           <p:cNvSpPr>
             <a:spLocks noGrp="1"/>
           </p:cNvSpPr>
@@ -1175,13 +1034,7 @@
       </p:sp>
       <p:sp>
         <p:nvSpPr>
-          <p:cNvPr id="6" name="Slide Number Placeholder 5">
-            <a:extLst>
-              <a:ext uri="{FF2B5EF4-FFF2-40B4-BE49-F238E27FC236}">
-                <a16:creationId xmlns:a16="http://schemas.microsoft.com/office/drawing/2014/main" id="{8DAC8C36-6A5C-43F0-A459-9DCD8AD094A6}"/>
-              </a:ext>
-            </a:extLst>
-          </p:cNvPr>
+          <p:cNvPr id="6" name="Slide Number Placeholder 5"/>
           <p:cNvSpPr>
             <a:spLocks noGrp="1"/>
           </p:cNvSpPr>
@@ -1205,7 +1058,7 @@
     </p:spTree>
     <p:extLst>
       <p:ext uri="{BB962C8B-B14F-4D97-AF65-F5344CB8AC3E}">
-        <p14:creationId xmlns:p14="http://schemas.microsoft.com/office/powerpoint/2010/main" val="781668718"/>
+        <p14:creationId xmlns:p14="http://schemas.microsoft.com/office/powerpoint/2010/main" val="560858723"/>
       </p:ext>
     </p:extLst>
   </p:cSld>
@@ -1234,13 +1087,7 @@
       </p:grpSpPr>
       <p:sp>
         <p:nvSpPr>
-          <p:cNvPr id="2" name="Title 1">
-            <a:extLst>
-              <a:ext uri="{FF2B5EF4-FFF2-40B4-BE49-F238E27FC236}">
-                <a16:creationId xmlns:a16="http://schemas.microsoft.com/office/drawing/2014/main" id="{22AE2706-5473-4ACB-AB7D-E649244F0515}"/>
-              </a:ext>
-            </a:extLst>
-          </p:cNvPr>
+          <p:cNvPr id="2" name="Title 1"/>
           <p:cNvSpPr>
             <a:spLocks noGrp="1"/>
           </p:cNvSpPr>
@@ -1257,19 +1104,13 @@
               <a:rPr lang="en-US"/>
               <a:t>Click to edit Master title style</a:t>
             </a:r>
-            <a:endParaRPr lang="id-ID"/>
-          </a:p>
-        </p:txBody>
-      </p:sp>
-      <p:sp>
-        <p:nvSpPr>
-          <p:cNvPr id="3" name="Content Placeholder 2">
-            <a:extLst>
-              <a:ext uri="{FF2B5EF4-FFF2-40B4-BE49-F238E27FC236}">
-                <a16:creationId xmlns:a16="http://schemas.microsoft.com/office/drawing/2014/main" id="{4B5D19A6-DB12-48CF-8DEE-EF66C29EE636}"/>
-              </a:ext>
-            </a:extLst>
-          </p:cNvPr>
+            <a:endParaRPr lang="en-US" dirty="0"/>
+          </a:p>
+        </p:txBody>
+      </p:sp>
+      <p:sp>
+        <p:nvSpPr>
+          <p:cNvPr id="3" name="Content Placeholder 2"/>
           <p:cNvSpPr>
             <a:spLocks noGrp="1"/>
           </p:cNvSpPr>
@@ -1279,8 +1120,8 @@
         </p:nvSpPr>
         <p:spPr>
           <a:xfrm>
-            <a:off x="838200" y="1825625"/>
-            <a:ext cx="5181600" cy="4351338"/>
+            <a:off x="628650" y="1825625"/>
+            <a:ext cx="3886200" cy="4351338"/>
           </a:xfrm>
         </p:spPr>
         <p:txBody>
@@ -1320,19 +1161,13 @@
               <a:rPr lang="en-US"/>
               <a:t>Fifth level</a:t>
             </a:r>
-            <a:endParaRPr lang="id-ID"/>
-          </a:p>
-        </p:txBody>
-      </p:sp>
-      <p:sp>
-        <p:nvSpPr>
-          <p:cNvPr id="4" name="Content Placeholder 3">
-            <a:extLst>
-              <a:ext uri="{FF2B5EF4-FFF2-40B4-BE49-F238E27FC236}">
-                <a16:creationId xmlns:a16="http://schemas.microsoft.com/office/drawing/2014/main" id="{2E5F7A12-2747-4D24-9D3B-35B9BD3EFD08}"/>
-              </a:ext>
-            </a:extLst>
-          </p:cNvPr>
+            <a:endParaRPr lang="en-US" dirty="0"/>
+          </a:p>
+        </p:txBody>
+      </p:sp>
+      <p:sp>
+        <p:nvSpPr>
+          <p:cNvPr id="4" name="Content Placeholder 3"/>
           <p:cNvSpPr>
             <a:spLocks noGrp="1"/>
           </p:cNvSpPr>
@@ -1342,8 +1177,8 @@
         </p:nvSpPr>
         <p:spPr>
           <a:xfrm>
-            <a:off x="6172200" y="1825625"/>
-            <a:ext cx="5181600" cy="4351338"/>
+            <a:off x="4629150" y="1825625"/>
+            <a:ext cx="3886200" cy="4351338"/>
           </a:xfrm>
         </p:spPr>
         <p:txBody>
@@ -1383,19 +1218,13 @@
               <a:rPr lang="en-US"/>
               <a:t>Fifth level</a:t>
             </a:r>
-            <a:endParaRPr lang="id-ID"/>
-          </a:p>
-        </p:txBody>
-      </p:sp>
-      <p:sp>
-        <p:nvSpPr>
-          <p:cNvPr id="5" name="Date Placeholder 4">
-            <a:extLst>
-              <a:ext uri="{FF2B5EF4-FFF2-40B4-BE49-F238E27FC236}">
-                <a16:creationId xmlns:a16="http://schemas.microsoft.com/office/drawing/2014/main" id="{32632B51-A666-47EA-AA50-0512C92B4071}"/>
-              </a:ext>
-            </a:extLst>
-          </p:cNvPr>
+            <a:endParaRPr lang="en-US" dirty="0"/>
+          </a:p>
+        </p:txBody>
+      </p:sp>
+      <p:sp>
+        <p:nvSpPr>
+          <p:cNvPr id="5" name="Date Placeholder 4"/>
           <p:cNvSpPr>
             <a:spLocks noGrp="1"/>
           </p:cNvSpPr>
@@ -1410,7 +1239,7 @@
           <a:p>
             <a:fld id="{4EFE2193-3B2A-43CE-A067-88969492A3B6}" type="datetimeFigureOut">
               <a:rPr lang="id-ID" smtClean="0"/>
-              <a:t>06/11/2025</a:t>
+              <a:t>08/11/2025</a:t>
             </a:fld>
             <a:endParaRPr lang="id-ID"/>
           </a:p>
@@ -1418,13 +1247,7 @@
       </p:sp>
       <p:sp>
         <p:nvSpPr>
-          <p:cNvPr id="6" name="Footer Placeholder 5">
-            <a:extLst>
-              <a:ext uri="{FF2B5EF4-FFF2-40B4-BE49-F238E27FC236}">
-                <a16:creationId xmlns:a16="http://schemas.microsoft.com/office/drawing/2014/main" id="{ADF41317-0695-4985-8481-6198BE61B349}"/>
-              </a:ext>
-            </a:extLst>
-          </p:cNvPr>
+          <p:cNvPr id="6" name="Footer Placeholder 5"/>
           <p:cNvSpPr>
             <a:spLocks noGrp="1"/>
           </p:cNvSpPr>
@@ -1443,13 +1266,7 @@
       </p:sp>
       <p:sp>
         <p:nvSpPr>
-          <p:cNvPr id="7" name="Slide Number Placeholder 6">
-            <a:extLst>
-              <a:ext uri="{FF2B5EF4-FFF2-40B4-BE49-F238E27FC236}">
-                <a16:creationId xmlns:a16="http://schemas.microsoft.com/office/drawing/2014/main" id="{E620B9F4-4164-4AF8-B304-026753B3989D}"/>
-              </a:ext>
-            </a:extLst>
-          </p:cNvPr>
+          <p:cNvPr id="7" name="Slide Number Placeholder 6"/>
           <p:cNvSpPr>
             <a:spLocks noGrp="1"/>
           </p:cNvSpPr>
@@ -1473,7 +1290,7 @@
     </p:spTree>
     <p:extLst>
       <p:ext uri="{BB962C8B-B14F-4D97-AF65-F5344CB8AC3E}">
-        <p14:creationId xmlns:p14="http://schemas.microsoft.com/office/powerpoint/2010/main" val="3496889049"/>
+        <p14:creationId xmlns:p14="http://schemas.microsoft.com/office/powerpoint/2010/main" val="2798558292"/>
       </p:ext>
     </p:extLst>
   </p:cSld>
@@ -1502,13 +1319,7 @@
       </p:grpSpPr>
       <p:sp>
         <p:nvSpPr>
-          <p:cNvPr id="2" name="Title 1">
-            <a:extLst>
-              <a:ext uri="{FF2B5EF4-FFF2-40B4-BE49-F238E27FC236}">
-                <a16:creationId xmlns:a16="http://schemas.microsoft.com/office/drawing/2014/main" id="{DBB61681-CF7C-4B13-9DB7-5DB091C92EDD}"/>
-              </a:ext>
-            </a:extLst>
-          </p:cNvPr>
+          <p:cNvPr id="2" name="Title 1"/>
           <p:cNvSpPr>
             <a:spLocks noGrp="1"/>
           </p:cNvSpPr>
@@ -1518,8 +1329,8 @@
         </p:nvSpPr>
         <p:spPr>
           <a:xfrm>
-            <a:off x="839788" y="365125"/>
-            <a:ext cx="10515600" cy="1325563"/>
+            <a:off x="629841" y="365126"/>
+            <a:ext cx="7886700" cy="1325563"/>
           </a:xfrm>
         </p:spPr>
         <p:txBody>
@@ -1530,19 +1341,13 @@
               <a:rPr lang="en-US"/>
               <a:t>Click to edit Master title style</a:t>
             </a:r>
-            <a:endParaRPr lang="id-ID"/>
-          </a:p>
-        </p:txBody>
-      </p:sp>
-      <p:sp>
-        <p:nvSpPr>
-          <p:cNvPr id="3" name="Text Placeholder 2">
-            <a:extLst>
-              <a:ext uri="{FF2B5EF4-FFF2-40B4-BE49-F238E27FC236}">
-                <a16:creationId xmlns:a16="http://schemas.microsoft.com/office/drawing/2014/main" id="{9F2D6179-7880-4A7C-8017-47698B806562}"/>
-              </a:ext>
-            </a:extLst>
-          </p:cNvPr>
+            <a:endParaRPr lang="en-US" dirty="0"/>
+          </a:p>
+        </p:txBody>
+      </p:sp>
+      <p:sp>
+        <p:nvSpPr>
+          <p:cNvPr id="3" name="Text Placeholder 2"/>
           <p:cNvSpPr>
             <a:spLocks noGrp="1"/>
           </p:cNvSpPr>
@@ -1552,8 +1357,8 @@
         </p:nvSpPr>
         <p:spPr>
           <a:xfrm>
-            <a:off x="839788" y="1681163"/>
-            <a:ext cx="5157787" cy="823912"/>
+            <a:off x="629842" y="1681163"/>
+            <a:ext cx="3868340" cy="823912"/>
           </a:xfrm>
         </p:spPr>
         <p:txBody>
@@ -1607,13 +1412,7 @@
       </p:sp>
       <p:sp>
         <p:nvSpPr>
-          <p:cNvPr id="4" name="Content Placeholder 3">
-            <a:extLst>
-              <a:ext uri="{FF2B5EF4-FFF2-40B4-BE49-F238E27FC236}">
-                <a16:creationId xmlns:a16="http://schemas.microsoft.com/office/drawing/2014/main" id="{03D755E9-5555-48CC-8EBE-B9A56F72ED7C}"/>
-              </a:ext>
-            </a:extLst>
-          </p:cNvPr>
+          <p:cNvPr id="4" name="Content Placeholder 3"/>
           <p:cNvSpPr>
             <a:spLocks noGrp="1"/>
           </p:cNvSpPr>
@@ -1623,8 +1422,8 @@
         </p:nvSpPr>
         <p:spPr>
           <a:xfrm>
-            <a:off x="839788" y="2505075"/>
-            <a:ext cx="5157787" cy="3684588"/>
+            <a:off x="629842" y="2505075"/>
+            <a:ext cx="3868340" cy="3684588"/>
           </a:xfrm>
         </p:spPr>
         <p:txBody>
@@ -1664,19 +1463,13 @@
               <a:rPr lang="en-US"/>
               <a:t>Fifth level</a:t>
             </a:r>
-            <a:endParaRPr lang="id-ID"/>
-          </a:p>
-        </p:txBody>
-      </p:sp>
-      <p:sp>
-        <p:nvSpPr>
-          <p:cNvPr id="5" name="Text Placeholder 4">
-            <a:extLst>
-              <a:ext uri="{FF2B5EF4-FFF2-40B4-BE49-F238E27FC236}">
-                <a16:creationId xmlns:a16="http://schemas.microsoft.com/office/drawing/2014/main" id="{8EE6AE0E-2DE9-49C1-8A23-DDC14DA86B4A}"/>
-              </a:ext>
-            </a:extLst>
-          </p:cNvPr>
+            <a:endParaRPr lang="en-US" dirty="0"/>
+          </a:p>
+        </p:txBody>
+      </p:sp>
+      <p:sp>
+        <p:nvSpPr>
+          <p:cNvPr id="5" name="Text Placeholder 4"/>
           <p:cNvSpPr>
             <a:spLocks noGrp="1"/>
           </p:cNvSpPr>
@@ -1686,8 +1479,8 @@
         </p:nvSpPr>
         <p:spPr>
           <a:xfrm>
-            <a:off x="6172200" y="1681163"/>
-            <a:ext cx="5183188" cy="823912"/>
+            <a:off x="4629150" y="1681163"/>
+            <a:ext cx="3887391" cy="823912"/>
           </a:xfrm>
         </p:spPr>
         <p:txBody>
@@ -1741,13 +1534,7 @@
       </p:sp>
       <p:sp>
         <p:nvSpPr>
-          <p:cNvPr id="6" name="Content Placeholder 5">
-            <a:extLst>
-              <a:ext uri="{FF2B5EF4-FFF2-40B4-BE49-F238E27FC236}">
-                <a16:creationId xmlns:a16="http://schemas.microsoft.com/office/drawing/2014/main" id="{6DAC8EAB-009C-435D-A669-B33629220DEA}"/>
-              </a:ext>
-            </a:extLst>
-          </p:cNvPr>
+          <p:cNvPr id="6" name="Content Placeholder 5"/>
           <p:cNvSpPr>
             <a:spLocks noGrp="1"/>
           </p:cNvSpPr>
@@ -1757,8 +1544,8 @@
         </p:nvSpPr>
         <p:spPr>
           <a:xfrm>
-            <a:off x="6172200" y="2505075"/>
-            <a:ext cx="5183188" cy="3684588"/>
+            <a:off x="4629150" y="2505075"/>
+            <a:ext cx="3887391" cy="3684588"/>
           </a:xfrm>
         </p:spPr>
         <p:txBody>
@@ -1798,19 +1585,13 @@
               <a:rPr lang="en-US"/>
               <a:t>Fifth level</a:t>
             </a:r>
-            <a:endParaRPr lang="id-ID"/>
-          </a:p>
-        </p:txBody>
-      </p:sp>
-      <p:sp>
-        <p:nvSpPr>
-          <p:cNvPr id="7" name="Date Placeholder 6">
-            <a:extLst>
-              <a:ext uri="{FF2B5EF4-FFF2-40B4-BE49-F238E27FC236}">
-                <a16:creationId xmlns:a16="http://schemas.microsoft.com/office/drawing/2014/main" id="{19E44070-B77D-4E20-B386-BA516CEE766A}"/>
-              </a:ext>
-            </a:extLst>
-          </p:cNvPr>
+            <a:endParaRPr lang="en-US" dirty="0"/>
+          </a:p>
+        </p:txBody>
+      </p:sp>
+      <p:sp>
+        <p:nvSpPr>
+          <p:cNvPr id="7" name="Date Placeholder 6"/>
           <p:cNvSpPr>
             <a:spLocks noGrp="1"/>
           </p:cNvSpPr>
@@ -1825,7 +1606,7 @@
           <a:p>
             <a:fld id="{4EFE2193-3B2A-43CE-A067-88969492A3B6}" type="datetimeFigureOut">
               <a:rPr lang="id-ID" smtClean="0"/>
-              <a:t>06/11/2025</a:t>
+              <a:t>08/11/2025</a:t>
             </a:fld>
             <a:endParaRPr lang="id-ID"/>
           </a:p>
@@ -1833,13 +1614,7 @@
       </p:sp>
       <p:sp>
         <p:nvSpPr>
-          <p:cNvPr id="8" name="Footer Placeholder 7">
-            <a:extLst>
-              <a:ext uri="{FF2B5EF4-FFF2-40B4-BE49-F238E27FC236}">
-                <a16:creationId xmlns:a16="http://schemas.microsoft.com/office/drawing/2014/main" id="{EB25C728-1F55-4FB5-B810-B0198460FEFB}"/>
-              </a:ext>
-            </a:extLst>
-          </p:cNvPr>
+          <p:cNvPr id="8" name="Footer Placeholder 7"/>
           <p:cNvSpPr>
             <a:spLocks noGrp="1"/>
           </p:cNvSpPr>
@@ -1858,13 +1633,7 @@
       </p:sp>
       <p:sp>
         <p:nvSpPr>
-          <p:cNvPr id="9" name="Slide Number Placeholder 8">
-            <a:extLst>
-              <a:ext uri="{FF2B5EF4-FFF2-40B4-BE49-F238E27FC236}">
-                <a16:creationId xmlns:a16="http://schemas.microsoft.com/office/drawing/2014/main" id="{1B8A79DF-1AA6-4ECF-9426-7DE341AA352E}"/>
-              </a:ext>
-            </a:extLst>
-          </p:cNvPr>
+          <p:cNvPr id="9" name="Slide Number Placeholder 8"/>
           <p:cNvSpPr>
             <a:spLocks noGrp="1"/>
           </p:cNvSpPr>
@@ -1888,7 +1657,7 @@
     </p:spTree>
     <p:extLst>
       <p:ext uri="{BB962C8B-B14F-4D97-AF65-F5344CB8AC3E}">
-        <p14:creationId xmlns:p14="http://schemas.microsoft.com/office/powerpoint/2010/main" val="3653494827"/>
+        <p14:creationId xmlns:p14="http://schemas.microsoft.com/office/powerpoint/2010/main" val="737912227"/>
       </p:ext>
     </p:extLst>
   </p:cSld>
@@ -1917,13 +1686,7 @@
       </p:grpSpPr>
       <p:sp>
         <p:nvSpPr>
-          <p:cNvPr id="2" name="Title 1">
-            <a:extLst>
-              <a:ext uri="{FF2B5EF4-FFF2-40B4-BE49-F238E27FC236}">
-                <a16:creationId xmlns:a16="http://schemas.microsoft.com/office/drawing/2014/main" id="{D9938897-CBC5-41AF-9539-FFE53007F21C}"/>
-              </a:ext>
-            </a:extLst>
-          </p:cNvPr>
+          <p:cNvPr id="2" name="Title 1"/>
           <p:cNvSpPr>
             <a:spLocks noGrp="1"/>
           </p:cNvSpPr>
@@ -1940,19 +1703,13 @@
               <a:rPr lang="en-US"/>
               <a:t>Click to edit Master title style</a:t>
             </a:r>
-            <a:endParaRPr lang="id-ID"/>
-          </a:p>
-        </p:txBody>
-      </p:sp>
-      <p:sp>
-        <p:nvSpPr>
-          <p:cNvPr id="3" name="Date Placeholder 2">
-            <a:extLst>
-              <a:ext uri="{FF2B5EF4-FFF2-40B4-BE49-F238E27FC236}">
-                <a16:creationId xmlns:a16="http://schemas.microsoft.com/office/drawing/2014/main" id="{AF264F4A-EB29-401E-91A7-1BBEC06AB33B}"/>
-              </a:ext>
-            </a:extLst>
-          </p:cNvPr>
+            <a:endParaRPr lang="en-US" dirty="0"/>
+          </a:p>
+        </p:txBody>
+      </p:sp>
+      <p:sp>
+        <p:nvSpPr>
+          <p:cNvPr id="3" name="Date Placeholder 2"/>
           <p:cNvSpPr>
             <a:spLocks noGrp="1"/>
           </p:cNvSpPr>
@@ -1967,7 +1724,7 @@
           <a:p>
             <a:fld id="{4EFE2193-3B2A-43CE-A067-88969492A3B6}" type="datetimeFigureOut">
               <a:rPr lang="id-ID" smtClean="0"/>
-              <a:t>06/11/2025</a:t>
+              <a:t>08/11/2025</a:t>
             </a:fld>
             <a:endParaRPr lang="id-ID"/>
           </a:p>
@@ -1975,13 +1732,7 @@
       </p:sp>
       <p:sp>
         <p:nvSpPr>
-          <p:cNvPr id="4" name="Footer Placeholder 3">
-            <a:extLst>
-              <a:ext uri="{FF2B5EF4-FFF2-40B4-BE49-F238E27FC236}">
-                <a16:creationId xmlns:a16="http://schemas.microsoft.com/office/drawing/2014/main" id="{34490B91-7753-46A2-B038-89898637079A}"/>
-              </a:ext>
-            </a:extLst>
-          </p:cNvPr>
+          <p:cNvPr id="4" name="Footer Placeholder 3"/>
           <p:cNvSpPr>
             <a:spLocks noGrp="1"/>
           </p:cNvSpPr>
@@ -2000,13 +1751,7 @@
       </p:sp>
       <p:sp>
         <p:nvSpPr>
-          <p:cNvPr id="5" name="Slide Number Placeholder 4">
-            <a:extLst>
-              <a:ext uri="{FF2B5EF4-FFF2-40B4-BE49-F238E27FC236}">
-                <a16:creationId xmlns:a16="http://schemas.microsoft.com/office/drawing/2014/main" id="{FCB479ED-929A-4330-8983-06AA5A26E6CA}"/>
-              </a:ext>
-            </a:extLst>
-          </p:cNvPr>
+          <p:cNvPr id="5" name="Slide Number Placeholder 4"/>
           <p:cNvSpPr>
             <a:spLocks noGrp="1"/>
           </p:cNvSpPr>
@@ -2030,7 +1775,7 @@
     </p:spTree>
     <p:extLst>
       <p:ext uri="{BB962C8B-B14F-4D97-AF65-F5344CB8AC3E}">
-        <p14:creationId xmlns:p14="http://schemas.microsoft.com/office/powerpoint/2010/main" val="3604429580"/>
+        <p14:creationId xmlns:p14="http://schemas.microsoft.com/office/powerpoint/2010/main" val="2039356209"/>
       </p:ext>
     </p:extLst>
   </p:cSld>
@@ -2059,13 +1804,7 @@
       </p:grpSpPr>
       <p:sp>
         <p:nvSpPr>
-          <p:cNvPr id="2" name="Date Placeholder 1">
-            <a:extLst>
-              <a:ext uri="{FF2B5EF4-FFF2-40B4-BE49-F238E27FC236}">
-                <a16:creationId xmlns:a16="http://schemas.microsoft.com/office/drawing/2014/main" id="{6993A34D-3520-40DD-9C4D-09C673E989CC}"/>
-              </a:ext>
-            </a:extLst>
-          </p:cNvPr>
+          <p:cNvPr id="2" name="Date Placeholder 1"/>
           <p:cNvSpPr>
             <a:spLocks noGrp="1"/>
           </p:cNvSpPr>
@@ -2080,7 +1819,7 @@
           <a:p>
             <a:fld id="{4EFE2193-3B2A-43CE-A067-88969492A3B6}" type="datetimeFigureOut">
               <a:rPr lang="id-ID" smtClean="0"/>
-              <a:t>06/11/2025</a:t>
+              <a:t>08/11/2025</a:t>
             </a:fld>
             <a:endParaRPr lang="id-ID"/>
           </a:p>
@@ -2088,13 +1827,7 @@
       </p:sp>
       <p:sp>
         <p:nvSpPr>
-          <p:cNvPr id="3" name="Footer Placeholder 2">
-            <a:extLst>
-              <a:ext uri="{FF2B5EF4-FFF2-40B4-BE49-F238E27FC236}">
-                <a16:creationId xmlns:a16="http://schemas.microsoft.com/office/drawing/2014/main" id="{E1908878-415A-4AC4-ADFA-D4D1425615EB}"/>
-              </a:ext>
-            </a:extLst>
-          </p:cNvPr>
+          <p:cNvPr id="3" name="Footer Placeholder 2"/>
           <p:cNvSpPr>
             <a:spLocks noGrp="1"/>
           </p:cNvSpPr>
@@ -2113,13 +1846,7 @@
       </p:sp>
       <p:sp>
         <p:nvSpPr>
-          <p:cNvPr id="4" name="Slide Number Placeholder 3">
-            <a:extLst>
-              <a:ext uri="{FF2B5EF4-FFF2-40B4-BE49-F238E27FC236}">
-                <a16:creationId xmlns:a16="http://schemas.microsoft.com/office/drawing/2014/main" id="{07550624-B9EA-4586-A001-82C180B2744C}"/>
-              </a:ext>
-            </a:extLst>
-          </p:cNvPr>
+          <p:cNvPr id="4" name="Slide Number Placeholder 3"/>
           <p:cNvSpPr>
             <a:spLocks noGrp="1"/>
           </p:cNvSpPr>
@@ -2143,7 +1870,7 @@
     </p:spTree>
     <p:extLst>
       <p:ext uri="{BB962C8B-B14F-4D97-AF65-F5344CB8AC3E}">
-        <p14:creationId xmlns:p14="http://schemas.microsoft.com/office/powerpoint/2010/main" val="92063519"/>
+        <p14:creationId xmlns:p14="http://schemas.microsoft.com/office/powerpoint/2010/main" val="1878055254"/>
       </p:ext>
     </p:extLst>
   </p:cSld>
@@ -2172,13 +1899,7 @@
       </p:grpSpPr>
       <p:sp>
         <p:nvSpPr>
-          <p:cNvPr id="2" name="Title 1">
-            <a:extLst>
-              <a:ext uri="{FF2B5EF4-FFF2-40B4-BE49-F238E27FC236}">
-                <a16:creationId xmlns:a16="http://schemas.microsoft.com/office/drawing/2014/main" id="{289EBF12-499D-46F7-A6F6-B31DD19482CB}"/>
-              </a:ext>
-            </a:extLst>
-          </p:cNvPr>
+          <p:cNvPr id="2" name="Title 1"/>
           <p:cNvSpPr>
             <a:spLocks noGrp="1"/>
           </p:cNvSpPr>
@@ -2188,8 +1909,8 @@
         </p:nvSpPr>
         <p:spPr>
           <a:xfrm>
-            <a:off x="839788" y="457200"/>
-            <a:ext cx="3932237" cy="1600200"/>
+            <a:off x="629841" y="457200"/>
+            <a:ext cx="2949178" cy="1600200"/>
           </a:xfrm>
         </p:spPr>
         <p:txBody>
@@ -2204,19 +1925,13 @@
               <a:rPr lang="en-US"/>
               <a:t>Click to edit Master title style</a:t>
             </a:r>
-            <a:endParaRPr lang="id-ID"/>
-          </a:p>
-        </p:txBody>
-      </p:sp>
-      <p:sp>
-        <p:nvSpPr>
-          <p:cNvPr id="3" name="Content Placeholder 2">
-            <a:extLst>
-              <a:ext uri="{FF2B5EF4-FFF2-40B4-BE49-F238E27FC236}">
-                <a16:creationId xmlns:a16="http://schemas.microsoft.com/office/drawing/2014/main" id="{F2C16803-36D0-41B7-B5EA-269E830B3678}"/>
-              </a:ext>
-            </a:extLst>
-          </p:cNvPr>
+            <a:endParaRPr lang="en-US" dirty="0"/>
+          </a:p>
+        </p:txBody>
+      </p:sp>
+      <p:sp>
+        <p:nvSpPr>
+          <p:cNvPr id="3" name="Content Placeholder 2"/>
           <p:cNvSpPr>
             <a:spLocks noGrp="1"/>
           </p:cNvSpPr>
@@ -2226,8 +1941,8 @@
         </p:nvSpPr>
         <p:spPr>
           <a:xfrm>
-            <a:off x="5183188" y="987425"/>
-            <a:ext cx="6172200" cy="4873625"/>
+            <a:off x="3887391" y="987426"/>
+            <a:ext cx="4629150" cy="4873625"/>
           </a:xfrm>
         </p:spPr>
         <p:txBody>
@@ -2295,19 +2010,13 @@
               <a:rPr lang="en-US"/>
               <a:t>Fifth level</a:t>
             </a:r>
-            <a:endParaRPr lang="id-ID"/>
-          </a:p>
-        </p:txBody>
-      </p:sp>
-      <p:sp>
-        <p:nvSpPr>
-          <p:cNvPr id="4" name="Text Placeholder 3">
-            <a:extLst>
-              <a:ext uri="{FF2B5EF4-FFF2-40B4-BE49-F238E27FC236}">
-                <a16:creationId xmlns:a16="http://schemas.microsoft.com/office/drawing/2014/main" id="{46540294-1767-4D85-978E-12C010717670}"/>
-              </a:ext>
-            </a:extLst>
-          </p:cNvPr>
+            <a:endParaRPr lang="en-US" dirty="0"/>
+          </a:p>
+        </p:txBody>
+      </p:sp>
+      <p:sp>
+        <p:nvSpPr>
+          <p:cNvPr id="4" name="Text Placeholder 3"/>
           <p:cNvSpPr>
             <a:spLocks noGrp="1"/>
           </p:cNvSpPr>
@@ -2317,8 +2026,8 @@
         </p:nvSpPr>
         <p:spPr>
           <a:xfrm>
-            <a:off x="839788" y="2057400"/>
-            <a:ext cx="3932237" cy="3811588"/>
+            <a:off x="629841" y="2057400"/>
+            <a:ext cx="2949178" cy="3811588"/>
           </a:xfrm>
         </p:spPr>
         <p:txBody>
@@ -2372,13 +2081,7 @@
       </p:sp>
       <p:sp>
         <p:nvSpPr>
-          <p:cNvPr id="5" name="Date Placeholder 4">
-            <a:extLst>
-              <a:ext uri="{FF2B5EF4-FFF2-40B4-BE49-F238E27FC236}">
-                <a16:creationId xmlns:a16="http://schemas.microsoft.com/office/drawing/2014/main" id="{E7BDE8A7-3DEE-4C5A-8368-AEC4A085A977}"/>
-              </a:ext>
-            </a:extLst>
-          </p:cNvPr>
+          <p:cNvPr id="5" name="Date Placeholder 4"/>
           <p:cNvSpPr>
             <a:spLocks noGrp="1"/>
           </p:cNvSpPr>
@@ -2393,7 +2096,7 @@
           <a:p>
             <a:fld id="{4EFE2193-3B2A-43CE-A067-88969492A3B6}" type="datetimeFigureOut">
               <a:rPr lang="id-ID" smtClean="0"/>
-              <a:t>06/11/2025</a:t>
+              <a:t>08/11/2025</a:t>
             </a:fld>
             <a:endParaRPr lang="id-ID"/>
           </a:p>
@@ -2401,13 +2104,7 @@
       </p:sp>
       <p:sp>
         <p:nvSpPr>
-          <p:cNvPr id="6" name="Footer Placeholder 5">
-            <a:extLst>
-              <a:ext uri="{FF2B5EF4-FFF2-40B4-BE49-F238E27FC236}">
-                <a16:creationId xmlns:a16="http://schemas.microsoft.com/office/drawing/2014/main" id="{37B1BD80-4E29-4B49-A5E1-6A9D442707D5}"/>
-              </a:ext>
-            </a:extLst>
-          </p:cNvPr>
+          <p:cNvPr id="6" name="Footer Placeholder 5"/>
           <p:cNvSpPr>
             <a:spLocks noGrp="1"/>
           </p:cNvSpPr>
@@ -2426,13 +2123,7 @@
       </p:sp>
       <p:sp>
         <p:nvSpPr>
-          <p:cNvPr id="7" name="Slide Number Placeholder 6">
-            <a:extLst>
-              <a:ext uri="{FF2B5EF4-FFF2-40B4-BE49-F238E27FC236}">
-                <a16:creationId xmlns:a16="http://schemas.microsoft.com/office/drawing/2014/main" id="{B9866874-A987-45EC-8363-FF683360B096}"/>
-              </a:ext>
-            </a:extLst>
-          </p:cNvPr>
+          <p:cNvPr id="7" name="Slide Number Placeholder 6"/>
           <p:cNvSpPr>
             <a:spLocks noGrp="1"/>
           </p:cNvSpPr>
@@ -2456,7 +2147,7 @@
     </p:spTree>
     <p:extLst>
       <p:ext uri="{BB962C8B-B14F-4D97-AF65-F5344CB8AC3E}">
-        <p14:creationId xmlns:p14="http://schemas.microsoft.com/office/powerpoint/2010/main" val="1199396095"/>
+        <p14:creationId xmlns:p14="http://schemas.microsoft.com/office/powerpoint/2010/main" val="2019485168"/>
       </p:ext>
     </p:extLst>
   </p:cSld>
@@ -2485,13 +2176,7 @@
       </p:grpSpPr>
       <p:sp>
         <p:nvSpPr>
-          <p:cNvPr id="2" name="Title 1">
-            <a:extLst>
-              <a:ext uri="{FF2B5EF4-FFF2-40B4-BE49-F238E27FC236}">
-                <a16:creationId xmlns:a16="http://schemas.microsoft.com/office/drawing/2014/main" id="{5131841B-F091-4934-90B4-DCC6F371445F}"/>
-              </a:ext>
-            </a:extLst>
-          </p:cNvPr>
+          <p:cNvPr id="2" name="Title 1"/>
           <p:cNvSpPr>
             <a:spLocks noGrp="1"/>
           </p:cNvSpPr>
@@ -2501,8 +2186,8 @@
         </p:nvSpPr>
         <p:spPr>
           <a:xfrm>
-            <a:off x="839788" y="457200"/>
-            <a:ext cx="3932237" cy="1600200"/>
+            <a:off x="629841" y="457200"/>
+            <a:ext cx="2949178" cy="1600200"/>
           </a:xfrm>
         </p:spPr>
         <p:txBody>
@@ -2517,21 +2202,15 @@
               <a:rPr lang="en-US"/>
               <a:t>Click to edit Master title style</a:t>
             </a:r>
-            <a:endParaRPr lang="id-ID"/>
-          </a:p>
-        </p:txBody>
-      </p:sp>
-      <p:sp>
-        <p:nvSpPr>
-          <p:cNvPr id="3" name="Picture Placeholder 2">
-            <a:extLst>
-              <a:ext uri="{FF2B5EF4-FFF2-40B4-BE49-F238E27FC236}">
-                <a16:creationId xmlns:a16="http://schemas.microsoft.com/office/drawing/2014/main" id="{336FFA60-53BC-4725-B5FE-F45F811CCA15}"/>
-              </a:ext>
-            </a:extLst>
-          </p:cNvPr>
-          <p:cNvSpPr>
-            <a:spLocks noGrp="1"/>
+            <a:endParaRPr lang="en-US" dirty="0"/>
+          </a:p>
+        </p:txBody>
+      </p:sp>
+      <p:sp>
+        <p:nvSpPr>
+          <p:cNvPr id="3" name="Picture Placeholder 2"/>
+          <p:cNvSpPr>
+            <a:spLocks noGrp="1" noChangeAspect="1"/>
           </p:cNvSpPr>
           <p:nvPr>
             <p:ph type="pic" idx="1"/>
@@ -2539,12 +2218,12 @@
         </p:nvSpPr>
         <p:spPr>
           <a:xfrm>
-            <a:off x="5183188" y="987425"/>
-            <a:ext cx="6172200" cy="4873625"/>
+            <a:off x="3887391" y="987426"/>
+            <a:ext cx="4629150" cy="4873625"/>
           </a:xfrm>
         </p:spPr>
         <p:txBody>
-          <a:bodyPr/>
+          <a:bodyPr anchor="t"/>
           <a:lstStyle>
             <a:lvl1pPr marL="0" indent="0">
               <a:buNone/>
@@ -2584,19 +2263,17 @@
             </a:lvl9pPr>
           </a:lstStyle>
           <a:p>
-            <a:endParaRPr lang="id-ID"/>
-          </a:p>
-        </p:txBody>
-      </p:sp>
-      <p:sp>
-        <p:nvSpPr>
-          <p:cNvPr id="4" name="Text Placeholder 3">
-            <a:extLst>
-              <a:ext uri="{FF2B5EF4-FFF2-40B4-BE49-F238E27FC236}">
-                <a16:creationId xmlns:a16="http://schemas.microsoft.com/office/drawing/2014/main" id="{131D0A92-7DCB-492B-8AF4-7905E01A7D91}"/>
-              </a:ext>
-            </a:extLst>
-          </p:cNvPr>
+            <a:r>
+              <a:rPr lang="en-US"/>
+              <a:t>Click icon to add picture</a:t>
+            </a:r>
+            <a:endParaRPr lang="en-US" dirty="0"/>
+          </a:p>
+        </p:txBody>
+      </p:sp>
+      <p:sp>
+        <p:nvSpPr>
+          <p:cNvPr id="4" name="Text Placeholder 3"/>
           <p:cNvSpPr>
             <a:spLocks noGrp="1"/>
           </p:cNvSpPr>
@@ -2606,8 +2283,8 @@
         </p:nvSpPr>
         <p:spPr>
           <a:xfrm>
-            <a:off x="839788" y="2057400"/>
-            <a:ext cx="3932237" cy="3811588"/>
+            <a:off x="629841" y="2057400"/>
+            <a:ext cx="2949178" cy="3811588"/>
           </a:xfrm>
         </p:spPr>
         <p:txBody>
@@ -2661,13 +2338,7 @@
       </p:sp>
       <p:sp>
         <p:nvSpPr>
-          <p:cNvPr id="5" name="Date Placeholder 4">
-            <a:extLst>
-              <a:ext uri="{FF2B5EF4-FFF2-40B4-BE49-F238E27FC236}">
-                <a16:creationId xmlns:a16="http://schemas.microsoft.com/office/drawing/2014/main" id="{BABC1941-BE86-475A-B1AA-F38B241B5BFB}"/>
-              </a:ext>
-            </a:extLst>
-          </p:cNvPr>
+          <p:cNvPr id="5" name="Date Placeholder 4"/>
           <p:cNvSpPr>
             <a:spLocks noGrp="1"/>
           </p:cNvSpPr>
@@ -2682,7 +2353,7 @@
           <a:p>
             <a:fld id="{4EFE2193-3B2A-43CE-A067-88969492A3B6}" type="datetimeFigureOut">
               <a:rPr lang="id-ID" smtClean="0"/>
-              <a:t>06/11/2025</a:t>
+              <a:t>08/11/2025</a:t>
             </a:fld>
             <a:endParaRPr lang="id-ID"/>
           </a:p>
@@ -2690,13 +2361,7 @@
       </p:sp>
       <p:sp>
         <p:nvSpPr>
-          <p:cNvPr id="6" name="Footer Placeholder 5">
-            <a:extLst>
-              <a:ext uri="{FF2B5EF4-FFF2-40B4-BE49-F238E27FC236}">
-                <a16:creationId xmlns:a16="http://schemas.microsoft.com/office/drawing/2014/main" id="{E12DAF04-330F-4C4E-B26B-6287AEDF8A8E}"/>
-              </a:ext>
-            </a:extLst>
-          </p:cNvPr>
+          <p:cNvPr id="6" name="Footer Placeholder 5"/>
           <p:cNvSpPr>
             <a:spLocks noGrp="1"/>
           </p:cNvSpPr>
@@ -2715,13 +2380,7 @@
       </p:sp>
       <p:sp>
         <p:nvSpPr>
-          <p:cNvPr id="7" name="Slide Number Placeholder 6">
-            <a:extLst>
-              <a:ext uri="{FF2B5EF4-FFF2-40B4-BE49-F238E27FC236}">
-                <a16:creationId xmlns:a16="http://schemas.microsoft.com/office/drawing/2014/main" id="{2CFEF8E6-F1CA-4137-8408-DE9C363619BA}"/>
-              </a:ext>
-            </a:extLst>
-          </p:cNvPr>
+          <p:cNvPr id="7" name="Slide Number Placeholder 6"/>
           <p:cNvSpPr>
             <a:spLocks noGrp="1"/>
           </p:cNvSpPr>
@@ -2745,7 +2404,7 @@
     </p:spTree>
     <p:extLst>
       <p:ext uri="{BB962C8B-B14F-4D97-AF65-F5344CB8AC3E}">
-        <p14:creationId xmlns:p14="http://schemas.microsoft.com/office/powerpoint/2010/main" val="1694691379"/>
+        <p14:creationId xmlns:p14="http://schemas.microsoft.com/office/powerpoint/2010/main" val="2615253616"/>
       </p:ext>
     </p:extLst>
   </p:cSld>
@@ -2779,13 +2438,7 @@
       </p:grpSpPr>
       <p:sp>
         <p:nvSpPr>
-          <p:cNvPr id="2" name="Title Placeholder 1">
-            <a:extLst>
-              <a:ext uri="{FF2B5EF4-FFF2-40B4-BE49-F238E27FC236}">
-                <a16:creationId xmlns:a16="http://schemas.microsoft.com/office/drawing/2014/main" id="{F1EDE282-6326-4954-BB2B-15D65B122D69}"/>
-              </a:ext>
-            </a:extLst>
-          </p:cNvPr>
+          <p:cNvPr id="2" name="Title Placeholder 1"/>
           <p:cNvSpPr>
             <a:spLocks noGrp="1"/>
           </p:cNvSpPr>
@@ -2795,8 +2448,8 @@
         </p:nvSpPr>
         <p:spPr>
           <a:xfrm>
-            <a:off x="838200" y="365125"/>
-            <a:ext cx="10515600" cy="1325563"/>
+            <a:off x="628650" y="365126"/>
+            <a:ext cx="7886700" cy="1325563"/>
           </a:xfrm>
           <a:prstGeom prst="rect">
             <a:avLst/>
@@ -2812,19 +2465,13 @@
               <a:rPr lang="en-US"/>
               <a:t>Click to edit Master title style</a:t>
             </a:r>
-            <a:endParaRPr lang="id-ID"/>
-          </a:p>
-        </p:txBody>
-      </p:sp>
-      <p:sp>
-        <p:nvSpPr>
-          <p:cNvPr id="3" name="Text Placeholder 2">
-            <a:extLst>
-              <a:ext uri="{FF2B5EF4-FFF2-40B4-BE49-F238E27FC236}">
-                <a16:creationId xmlns:a16="http://schemas.microsoft.com/office/drawing/2014/main" id="{833B5290-B487-44E2-AAF1-F349EED3C4AF}"/>
-              </a:ext>
-            </a:extLst>
-          </p:cNvPr>
+            <a:endParaRPr lang="en-US" dirty="0"/>
+          </a:p>
+        </p:txBody>
+      </p:sp>
+      <p:sp>
+        <p:nvSpPr>
+          <p:cNvPr id="3" name="Text Placeholder 2"/>
           <p:cNvSpPr>
             <a:spLocks noGrp="1"/>
           </p:cNvSpPr>
@@ -2834,8 +2481,8 @@
         </p:nvSpPr>
         <p:spPr>
           <a:xfrm>
-            <a:off x="838200" y="1825625"/>
-            <a:ext cx="10515600" cy="4351338"/>
+            <a:off x="628650" y="1825625"/>
+            <a:ext cx="7886700" cy="4351338"/>
           </a:xfrm>
           <a:prstGeom prst="rect">
             <a:avLst/>
@@ -2880,19 +2527,13 @@
               <a:rPr lang="en-US"/>
               <a:t>Fifth level</a:t>
             </a:r>
-            <a:endParaRPr lang="id-ID"/>
-          </a:p>
-        </p:txBody>
-      </p:sp>
-      <p:sp>
-        <p:nvSpPr>
-          <p:cNvPr id="4" name="Date Placeholder 3">
-            <a:extLst>
-              <a:ext uri="{FF2B5EF4-FFF2-40B4-BE49-F238E27FC236}">
-                <a16:creationId xmlns:a16="http://schemas.microsoft.com/office/drawing/2014/main" id="{B8B6533C-FE93-4434-B47F-24BC766D539D}"/>
-              </a:ext>
-            </a:extLst>
-          </p:cNvPr>
+            <a:endParaRPr lang="en-US" dirty="0"/>
+          </a:p>
+        </p:txBody>
+      </p:sp>
+      <p:sp>
+        <p:nvSpPr>
+          <p:cNvPr id="4" name="Date Placeholder 3"/>
           <p:cNvSpPr>
             <a:spLocks noGrp="1"/>
           </p:cNvSpPr>
@@ -2902,8 +2543,8 @@
         </p:nvSpPr>
         <p:spPr>
           <a:xfrm>
-            <a:off x="838200" y="6356350"/>
-            <a:ext cx="2743200" cy="365125"/>
+            <a:off x="628650" y="6356351"/>
+            <a:ext cx="2057400" cy="365125"/>
           </a:xfrm>
           <a:prstGeom prst="rect">
             <a:avLst/>
@@ -2925,7 +2566,7 @@
           <a:p>
             <a:fld id="{4EFE2193-3B2A-43CE-A067-88969492A3B6}" type="datetimeFigureOut">
               <a:rPr lang="id-ID" smtClean="0"/>
-              <a:t>06/11/2025</a:t>
+              <a:t>08/11/2025</a:t>
             </a:fld>
             <a:endParaRPr lang="id-ID"/>
           </a:p>
@@ -2933,13 +2574,7 @@
       </p:sp>
       <p:sp>
         <p:nvSpPr>
-          <p:cNvPr id="5" name="Footer Placeholder 4">
-            <a:extLst>
-              <a:ext uri="{FF2B5EF4-FFF2-40B4-BE49-F238E27FC236}">
-                <a16:creationId xmlns:a16="http://schemas.microsoft.com/office/drawing/2014/main" id="{EC6E2504-483B-4C6A-96D9-0E34D2ABEEBF}"/>
-              </a:ext>
-            </a:extLst>
-          </p:cNvPr>
+          <p:cNvPr id="5" name="Footer Placeholder 4"/>
           <p:cNvSpPr>
             <a:spLocks noGrp="1"/>
           </p:cNvSpPr>
@@ -2949,8 +2584,8 @@
         </p:nvSpPr>
         <p:spPr>
           <a:xfrm>
-            <a:off x="4038600" y="6356350"/>
-            <a:ext cx="4114800" cy="365125"/>
+            <a:off x="3028950" y="6356351"/>
+            <a:ext cx="3086100" cy="365125"/>
           </a:xfrm>
           <a:prstGeom prst="rect">
             <a:avLst/>
@@ -2976,13 +2611,7 @@
       </p:sp>
       <p:sp>
         <p:nvSpPr>
-          <p:cNvPr id="6" name="Slide Number Placeholder 5">
-            <a:extLst>
-              <a:ext uri="{FF2B5EF4-FFF2-40B4-BE49-F238E27FC236}">
-                <a16:creationId xmlns:a16="http://schemas.microsoft.com/office/drawing/2014/main" id="{71FD2640-AC15-4DBB-A937-E1BABE57AC00}"/>
-              </a:ext>
-            </a:extLst>
-          </p:cNvPr>
+          <p:cNvPr id="6" name="Slide Number Placeholder 5"/>
           <p:cNvSpPr>
             <a:spLocks noGrp="1"/>
           </p:cNvSpPr>
@@ -2992,8 +2621,8 @@
         </p:nvSpPr>
         <p:spPr>
           <a:xfrm>
-            <a:off x="8610600" y="6356350"/>
-            <a:ext cx="2743200" cy="365125"/>
+            <a:off x="6457950" y="6356351"/>
+            <a:ext cx="2057400" cy="365125"/>
           </a:xfrm>
           <a:prstGeom prst="rect">
             <a:avLst/>
@@ -3024,23 +2653,23 @@
     </p:spTree>
     <p:extLst>
       <p:ext uri="{BB962C8B-B14F-4D97-AF65-F5344CB8AC3E}">
-        <p14:creationId xmlns:p14="http://schemas.microsoft.com/office/powerpoint/2010/main" val="3226266450"/>
+        <p14:creationId xmlns:p14="http://schemas.microsoft.com/office/powerpoint/2010/main" val="69365136"/>
       </p:ext>
     </p:extLst>
   </p:cSld>
   <p:clrMap bg1="lt1" tx1="dk1" bg2="lt2" tx2="dk2" accent1="accent1" accent2="accent2" accent3="accent3" accent4="accent4" accent5="accent5" accent6="accent6" hlink="hlink" folHlink="folHlink"/>
   <p:sldLayoutIdLst>
-    <p:sldLayoutId id="2147483649" r:id="rId1"/>
-    <p:sldLayoutId id="2147483650" r:id="rId2"/>
-    <p:sldLayoutId id="2147483651" r:id="rId3"/>
-    <p:sldLayoutId id="2147483652" r:id="rId4"/>
-    <p:sldLayoutId id="2147483653" r:id="rId5"/>
-    <p:sldLayoutId id="2147483654" r:id="rId6"/>
-    <p:sldLayoutId id="2147483655" r:id="rId7"/>
-    <p:sldLayoutId id="2147483656" r:id="rId8"/>
-    <p:sldLayoutId id="2147483657" r:id="rId9"/>
-    <p:sldLayoutId id="2147483658" r:id="rId10"/>
-    <p:sldLayoutId id="2147483659" r:id="rId11"/>
+    <p:sldLayoutId id="2147483661" r:id="rId1"/>
+    <p:sldLayoutId id="2147483662" r:id="rId2"/>
+    <p:sldLayoutId id="2147483663" r:id="rId3"/>
+    <p:sldLayoutId id="2147483664" r:id="rId4"/>
+    <p:sldLayoutId id="2147483665" r:id="rId5"/>
+    <p:sldLayoutId id="2147483666" r:id="rId6"/>
+    <p:sldLayoutId id="2147483667" r:id="rId7"/>
+    <p:sldLayoutId id="2147483668" r:id="rId8"/>
+    <p:sldLayoutId id="2147483669" r:id="rId9"/>
+    <p:sldLayoutId id="2147483670" r:id="rId10"/>
+    <p:sldLayoutId id="2147483671" r:id="rId11"/>
   </p:sldLayoutIdLst>
   <p:txStyles>
     <p:titleStyle>
@@ -3228,7 +2857,7 @@
     </p:bodyStyle>
     <p:otherStyle>
       <a:defPPr>
-        <a:defRPr lang="id-ID"/>
+        <a:defRPr lang="en-US"/>
       </a:defPPr>
       <a:lvl1pPr marL="0" algn="l" defTabSz="914400" rtl="0" eaLnBrk="1" latinLnBrk="0" hangingPunct="1">
         <a:defRPr sz="1800" kern="1200">
@@ -3357,13 +2986,13 @@
           <p:nvPr>
             <p:extLst>
               <p:ext uri="{D42A27DB-BD31-4B8C-83A1-F6EECF244321}">
-                <p14:modId xmlns:p14="http://schemas.microsoft.com/office/powerpoint/2010/main" val="1547331668"/>
+                <p14:modId xmlns:p14="http://schemas.microsoft.com/office/powerpoint/2010/main" val="3044687509"/>
               </p:ext>
             </p:extLst>
           </p:nvPr>
         </p:nvGraphicFramePr>
         <p:xfrm>
-          <a:off x="2032000" y="719666"/>
+          <a:off x="508000" y="468654"/>
           <a:ext cx="8128000" cy="1483360"/>
         </p:xfrm>
         <a:graphic>
@@ -3520,6 +3149,164 @@
           </a:graphicData>
         </a:graphic>
       </p:graphicFrame>
+      <p:sp>
+        <p:nvSpPr>
+          <p:cNvPr id="2" name="Rectangle 1">
+            <a:extLst>
+              <a:ext uri="{FF2B5EF4-FFF2-40B4-BE49-F238E27FC236}">
+                <a16:creationId xmlns:a16="http://schemas.microsoft.com/office/drawing/2014/main" id="{169964B8-166F-46F1-9923-216B41729100}"/>
+              </a:ext>
+            </a:extLst>
+          </p:cNvPr>
+          <p:cNvSpPr/>
+          <p:nvPr/>
+        </p:nvSpPr>
+        <p:spPr>
+          <a:xfrm>
+            <a:off x="708211" y="2256615"/>
+            <a:ext cx="3675529" cy="4287620"/>
+          </a:xfrm>
+          <a:prstGeom prst="rect">
+            <a:avLst/>
+          </a:prstGeom>
+          <a:noFill/>
+          <a:ln w="38100">
+            <a:solidFill>
+              <a:schemeClr val="tx1"/>
+            </a:solidFill>
+          </a:ln>
+        </p:spPr>
+        <p:style>
+          <a:lnRef idx="2">
+            <a:schemeClr val="accent1">
+              <a:shade val="50000"/>
+            </a:schemeClr>
+          </a:lnRef>
+          <a:fillRef idx="1">
+            <a:schemeClr val="accent1"/>
+          </a:fillRef>
+          <a:effectRef idx="0">
+            <a:schemeClr val="accent1"/>
+          </a:effectRef>
+          <a:fontRef idx="minor">
+            <a:schemeClr val="lt1"/>
+          </a:fontRef>
+        </p:style>
+        <p:txBody>
+          <a:bodyPr rtlCol="0" anchor="ctr"/>
+          <a:lstStyle/>
+          <a:p>
+            <a:pPr algn="ctr"/>
+            <a:endParaRPr lang="id-ID"/>
+          </a:p>
+        </p:txBody>
+      </p:sp>
+      <p:sp>
+        <p:nvSpPr>
+          <p:cNvPr id="6" name="Rectangle 5">
+            <a:extLst>
+              <a:ext uri="{FF2B5EF4-FFF2-40B4-BE49-F238E27FC236}">
+                <a16:creationId xmlns:a16="http://schemas.microsoft.com/office/drawing/2014/main" id="{2D7D4D1F-F14E-4DBD-90C1-D5F24528231A}"/>
+              </a:ext>
+            </a:extLst>
+          </p:cNvPr>
+          <p:cNvSpPr/>
+          <p:nvPr/>
+        </p:nvSpPr>
+        <p:spPr>
+          <a:xfrm>
+            <a:off x="4760262" y="2256615"/>
+            <a:ext cx="3675529" cy="4287620"/>
+          </a:xfrm>
+          <a:prstGeom prst="rect">
+            <a:avLst/>
+          </a:prstGeom>
+          <a:noFill/>
+          <a:ln w="38100">
+            <a:solidFill>
+              <a:schemeClr val="tx1"/>
+            </a:solidFill>
+          </a:ln>
+        </p:spPr>
+        <p:style>
+          <a:lnRef idx="2">
+            <a:schemeClr val="accent1">
+              <a:shade val="50000"/>
+            </a:schemeClr>
+          </a:lnRef>
+          <a:fillRef idx="1">
+            <a:schemeClr val="accent1"/>
+          </a:fillRef>
+          <a:effectRef idx="0">
+            <a:schemeClr val="accent1"/>
+          </a:effectRef>
+          <a:fontRef idx="minor">
+            <a:schemeClr val="lt1"/>
+          </a:fontRef>
+        </p:style>
+        <p:txBody>
+          <a:bodyPr rtlCol="0" anchor="ctr"/>
+          <a:lstStyle/>
+          <a:p>
+            <a:pPr algn="ctr"/>
+            <a:endParaRPr lang="id-ID"/>
+          </a:p>
+        </p:txBody>
+      </p:sp>
+      <p:sp>
+        <p:nvSpPr>
+          <p:cNvPr id="5" name="Rectangle 4">
+            <a:extLst>
+              <a:ext uri="{FF2B5EF4-FFF2-40B4-BE49-F238E27FC236}">
+                <a16:creationId xmlns:a16="http://schemas.microsoft.com/office/drawing/2014/main" id="{3A2D66AA-A604-4273-8DDD-351AB464E2EE}"/>
+              </a:ext>
+            </a:extLst>
+          </p:cNvPr>
+          <p:cNvSpPr/>
+          <p:nvPr/>
+        </p:nvSpPr>
+        <p:spPr>
+          <a:xfrm>
+            <a:off x="5387790" y="2030707"/>
+            <a:ext cx="2420471" cy="506305"/>
+          </a:xfrm>
+          <a:prstGeom prst="rect">
+            <a:avLst/>
+          </a:prstGeom>
+          <a:noFill/>
+          <a:ln>
+            <a:noFill/>
+          </a:ln>
+        </p:spPr>
+        <p:style>
+          <a:lnRef idx="2">
+            <a:schemeClr val="accent1">
+              <a:shade val="50000"/>
+            </a:schemeClr>
+          </a:lnRef>
+          <a:fillRef idx="1">
+            <a:schemeClr val="accent1"/>
+          </a:fillRef>
+          <a:effectRef idx="0">
+            <a:schemeClr val="accent1"/>
+          </a:effectRef>
+          <a:fontRef idx="minor">
+            <a:schemeClr val="lt1"/>
+          </a:fontRef>
+        </p:style>
+        <p:txBody>
+          <a:bodyPr rtlCol="0" anchor="ctr"/>
+          <a:lstStyle/>
+          <a:p>
+            <a:pPr algn="ctr"/>
+            <a:endParaRPr lang="id-ID" dirty="0">
+              <a:solidFill>
+                <a:schemeClr val="tx1"/>
+              </a:solidFill>
+            </a:endParaRPr>
+          </a:p>
+        </p:txBody>
+      </p:sp>
     </p:spTree>
     <p:extLst>
       <p:ext uri="{BB962C8B-B14F-4D97-AF65-F5344CB8AC3E}">
@@ -3536,7 +3323,7 @@
 <file path=ppt/theme/theme1.xml><?xml version="1.0" encoding="utf-8"?>
 <a:theme xmlns:a="http://schemas.openxmlformats.org/drawingml/2006/main" name="Office Theme">
   <a:themeElements>
-    <a:clrScheme name="Office">
+    <a:clrScheme name="Office Theme">
       <a:dk1>
         <a:sysClr val="windowText" lastClr="000000"/>
       </a:dk1>
@@ -3574,7 +3361,7 @@
         <a:srgbClr val="954F72"/>
       </a:folHlink>
     </a:clrScheme>
-    <a:fontScheme name="Office">
+    <a:fontScheme name="Office Theme">
       <a:majorFont>
         <a:latin typeface="Calibri Light" panose="020F0302020204030204"/>
         <a:ea typeface=""/>
@@ -3609,23 +3396,6 @@
         <a:font script="Viet" typeface="Times New Roman"/>
         <a:font script="Uigh" typeface="Microsoft Uighur"/>
         <a:font script="Geor" typeface="Sylfaen"/>
-        <a:font script="Armn" typeface="Arial"/>
-        <a:font script="Bugi" typeface="Leelawadee UI"/>
-        <a:font script="Bopo" typeface="Microsoft JhengHei"/>
-        <a:font script="Java" typeface="Javanese Text"/>
-        <a:font script="Lisu" typeface="Segoe UI"/>
-        <a:font script="Mymr" typeface="Myanmar Text"/>
-        <a:font script="Nkoo" typeface="Ebrima"/>
-        <a:font script="Olck" typeface="Nirmala UI"/>
-        <a:font script="Osma" typeface="Ebrima"/>
-        <a:font script="Phag" typeface="Phagspa"/>
-        <a:font script="Syrn" typeface="Estrangelo Edessa"/>
-        <a:font script="Syrj" typeface="Estrangelo Edessa"/>
-        <a:font script="Syre" typeface="Estrangelo Edessa"/>
-        <a:font script="Sora" typeface="Nirmala UI"/>
-        <a:font script="Tale" typeface="Microsoft Tai Le"/>
-        <a:font script="Talu" typeface="Microsoft New Tai Lue"/>
-        <a:font script="Tfng" typeface="Ebrima"/>
       </a:majorFont>
       <a:minorFont>
         <a:latin typeface="Calibri" panose="020F0502020204030204"/>
@@ -3661,26 +3431,9 @@
         <a:font script="Viet" typeface="Arial"/>
         <a:font script="Uigh" typeface="Microsoft Uighur"/>
         <a:font script="Geor" typeface="Sylfaen"/>
-        <a:font script="Armn" typeface="Arial"/>
-        <a:font script="Bugi" typeface="Leelawadee UI"/>
-        <a:font script="Bopo" typeface="Microsoft JhengHei"/>
-        <a:font script="Java" typeface="Javanese Text"/>
-        <a:font script="Lisu" typeface="Segoe UI"/>
-        <a:font script="Mymr" typeface="Myanmar Text"/>
-        <a:font script="Nkoo" typeface="Ebrima"/>
-        <a:font script="Olck" typeface="Nirmala UI"/>
-        <a:font script="Osma" typeface="Ebrima"/>
-        <a:font script="Phag" typeface="Phagspa"/>
-        <a:font script="Syrn" typeface="Estrangelo Edessa"/>
-        <a:font script="Syrj" typeface="Estrangelo Edessa"/>
-        <a:font script="Syre" typeface="Estrangelo Edessa"/>
-        <a:font script="Sora" typeface="Nirmala UI"/>
-        <a:font script="Tale" typeface="Microsoft Tai Le"/>
-        <a:font script="Talu" typeface="Microsoft New Tai Lue"/>
-        <a:font script="Tfng" typeface="Ebrima"/>
       </a:minorFont>
     </a:fontScheme>
-    <a:fmtScheme name="Office">
+    <a:fmtScheme name="Office Theme">
       <a:fillStyleLst>
         <a:solidFill>
           <a:schemeClr val="phClr"/>

</xml_diff>

<commit_message>
ready to deploy. still need to adjust when it has 2 images and minimalize the code
</commit_message>
<xml_diff>
--- a/template.pptx
+++ b/template.pptx
@@ -2,10 +2,13 @@
 <file path=ppt/presentation.xml><?xml version="1.0" encoding="utf-8"?>
 <p:presentation xmlns:a="http://schemas.openxmlformats.org/drawingml/2006/main" xmlns:r="http://schemas.openxmlformats.org/officeDocument/2006/relationships" xmlns:p="http://schemas.openxmlformats.org/presentationml/2006/main" saveSubsetFonts="1">
   <p:sldMasterIdLst>
-    <p:sldMasterId id="2147483660" r:id="rId1"/>
+    <p:sldMasterId id="2147483648" r:id="rId1"/>
   </p:sldMasterIdLst>
+  <p:notesMasterIdLst>
+    <p:notesMasterId r:id="rId3"/>
+  </p:notesMasterIdLst>
   <p:sldIdLst>
-    <p:sldId id="256" r:id="rId2"/>
+    <p:sldId id="260" r:id="rId2"/>
   </p:sldIdLst>
   <p:sldSz cx="9144000" cy="6858000" type="screen4x3"/>
   <p:notesSz cx="6858000" cy="9144000"/>
@@ -13,7 +16,7 @@
     <a:defPPr>
       <a:defRPr lang="en-US"/>
     </a:defPPr>
-    <a:lvl1pPr marL="0" algn="l" defTabSz="457200" rtl="0" eaLnBrk="1" latinLnBrk="0" hangingPunct="1">
+    <a:lvl1pPr marL="0" algn="l" defTabSz="914400" rtl="0" eaLnBrk="1" latinLnBrk="0" hangingPunct="1">
       <a:defRPr sz="1800" kern="1200">
         <a:solidFill>
           <a:schemeClr val="tx1"/>
@@ -23,7 +26,7 @@
         <a:cs typeface="+mn-cs"/>
       </a:defRPr>
     </a:lvl1pPr>
-    <a:lvl2pPr marL="457200" algn="l" defTabSz="457200" rtl="0" eaLnBrk="1" latinLnBrk="0" hangingPunct="1">
+    <a:lvl2pPr marL="457200" algn="l" defTabSz="914400" rtl="0" eaLnBrk="1" latinLnBrk="0" hangingPunct="1">
       <a:defRPr sz="1800" kern="1200">
         <a:solidFill>
           <a:schemeClr val="tx1"/>
@@ -33,7 +36,7 @@
         <a:cs typeface="+mn-cs"/>
       </a:defRPr>
     </a:lvl2pPr>
-    <a:lvl3pPr marL="914400" algn="l" defTabSz="457200" rtl="0" eaLnBrk="1" latinLnBrk="0" hangingPunct="1">
+    <a:lvl3pPr marL="914400" algn="l" defTabSz="914400" rtl="0" eaLnBrk="1" latinLnBrk="0" hangingPunct="1">
       <a:defRPr sz="1800" kern="1200">
         <a:solidFill>
           <a:schemeClr val="tx1"/>
@@ -43,7 +46,7 @@
         <a:cs typeface="+mn-cs"/>
       </a:defRPr>
     </a:lvl3pPr>
-    <a:lvl4pPr marL="1371600" algn="l" defTabSz="457200" rtl="0" eaLnBrk="1" latinLnBrk="0" hangingPunct="1">
+    <a:lvl4pPr marL="1371600" algn="l" defTabSz="914400" rtl="0" eaLnBrk="1" latinLnBrk="0" hangingPunct="1">
       <a:defRPr sz="1800" kern="1200">
         <a:solidFill>
           <a:schemeClr val="tx1"/>
@@ -53,7 +56,7 @@
         <a:cs typeface="+mn-cs"/>
       </a:defRPr>
     </a:lvl4pPr>
-    <a:lvl5pPr marL="1828800" algn="l" defTabSz="457200" rtl="0" eaLnBrk="1" latinLnBrk="0" hangingPunct="1">
+    <a:lvl5pPr marL="1828800" algn="l" defTabSz="914400" rtl="0" eaLnBrk="1" latinLnBrk="0" hangingPunct="1">
       <a:defRPr sz="1800" kern="1200">
         <a:solidFill>
           <a:schemeClr val="tx1"/>
@@ -63,7 +66,7 @@
         <a:cs typeface="+mn-cs"/>
       </a:defRPr>
     </a:lvl5pPr>
-    <a:lvl6pPr marL="2286000" algn="l" defTabSz="457200" rtl="0" eaLnBrk="1" latinLnBrk="0" hangingPunct="1">
+    <a:lvl6pPr marL="2286000" algn="l" defTabSz="914400" rtl="0" eaLnBrk="1" latinLnBrk="0" hangingPunct="1">
       <a:defRPr sz="1800" kern="1200">
         <a:solidFill>
           <a:schemeClr val="tx1"/>
@@ -73,7 +76,7 @@
         <a:cs typeface="+mn-cs"/>
       </a:defRPr>
     </a:lvl6pPr>
-    <a:lvl7pPr marL="2743200" algn="l" defTabSz="457200" rtl="0" eaLnBrk="1" latinLnBrk="0" hangingPunct="1">
+    <a:lvl7pPr marL="2743200" algn="l" defTabSz="914400" rtl="0" eaLnBrk="1" latinLnBrk="0" hangingPunct="1">
       <a:defRPr sz="1800" kern="1200">
         <a:solidFill>
           <a:schemeClr val="tx1"/>
@@ -83,7 +86,7 @@
         <a:cs typeface="+mn-cs"/>
       </a:defRPr>
     </a:lvl7pPr>
-    <a:lvl8pPr marL="3200400" algn="l" defTabSz="457200" rtl="0" eaLnBrk="1" latinLnBrk="0" hangingPunct="1">
+    <a:lvl8pPr marL="3200400" algn="l" defTabSz="914400" rtl="0" eaLnBrk="1" latinLnBrk="0" hangingPunct="1">
       <a:defRPr sz="1800" kern="1200">
         <a:solidFill>
           <a:schemeClr val="tx1"/>
@@ -93,7 +96,7 @@
         <a:cs typeface="+mn-cs"/>
       </a:defRPr>
     </a:lvl8pPr>
-    <a:lvl9pPr marL="3657600" algn="l" defTabSz="457200" rtl="0" eaLnBrk="1" latinLnBrk="0" hangingPunct="1">
+    <a:lvl9pPr marL="3657600" algn="l" defTabSz="914400" rtl="0" eaLnBrk="1" latinLnBrk="0" hangingPunct="1">
       <a:defRPr sz="1800" kern="1200">
         <a:solidFill>
           <a:schemeClr val="tx1"/>
@@ -106,10 +109,454 @@
   </p:defaultTextStyle>
   <p:extLst>
     <p:ext uri="{EFAFB233-063F-42B5-8137-9DF3F51BA10A}">
-      <p15:sldGuideLst xmlns:p15="http://schemas.microsoft.com/office/powerpoint/2012/main"/>
+      <p15:sldGuideLst xmlns:p15="http://schemas.microsoft.com/office/powerpoint/2012/main">
+        <p15:guide id="1" orient="horz" pos="2160">
+          <p15:clr>
+            <a:srgbClr val="A4A3A4"/>
+          </p15:clr>
+        </p15:guide>
+        <p15:guide id="2" pos="2880">
+          <p15:clr>
+            <a:srgbClr val="A4A3A4"/>
+          </p15:clr>
+        </p15:guide>
+      </p15:sldGuideLst>
     </p:ext>
   </p:extLst>
 </p:presentation>
+</file>
+
+<file path=ppt/notesMasters/notesMaster1.xml><?xml version="1.0" encoding="utf-8"?>
+<p:notesMaster xmlns:a="http://schemas.openxmlformats.org/drawingml/2006/main" xmlns:r="http://schemas.openxmlformats.org/officeDocument/2006/relationships" xmlns:p="http://schemas.openxmlformats.org/presentationml/2006/main">
+  <p:cSld>
+    <p:bg>
+      <p:bgRef idx="1001">
+        <a:schemeClr val="bg1"/>
+      </p:bgRef>
+    </p:bg>
+    <p:spTree>
+      <p:nvGrpSpPr>
+        <p:cNvPr id="1" name=""/>
+        <p:cNvGrpSpPr/>
+        <p:nvPr/>
+      </p:nvGrpSpPr>
+      <p:grpSpPr>
+        <a:xfrm>
+          <a:off x="0" y="0"/>
+          <a:ext cx="0" cy="0"/>
+          <a:chOff x="0" y="0"/>
+          <a:chExt cx="0" cy="0"/>
+        </a:xfrm>
+      </p:grpSpPr>
+      <p:sp>
+        <p:nvSpPr>
+          <p:cNvPr id="2" name="Header Placeholder 1"/>
+          <p:cNvSpPr>
+            <a:spLocks noGrp="1"/>
+          </p:cNvSpPr>
+          <p:nvPr>
+            <p:ph type="hdr" sz="quarter"/>
+          </p:nvPr>
+        </p:nvSpPr>
+        <p:spPr>
+          <a:xfrm>
+            <a:off x="0" y="0"/>
+            <a:ext cx="2971800" cy="457200"/>
+          </a:xfrm>
+          <a:prstGeom prst="rect">
+            <a:avLst/>
+          </a:prstGeom>
+        </p:spPr>
+        <p:txBody>
+          <a:bodyPr vert="horz" lIns="91440" tIns="45720" rIns="91440" bIns="45720" rtlCol="0"/>
+          <a:lstStyle>
+            <a:lvl1pPr algn="l">
+              <a:defRPr sz="1200"/>
+            </a:lvl1pPr>
+          </a:lstStyle>
+          <a:p>
+            <a:endParaRPr lang="en-US"/>
+          </a:p>
+        </p:txBody>
+      </p:sp>
+      <p:sp>
+        <p:nvSpPr>
+          <p:cNvPr id="3" name="Date Placeholder 2"/>
+          <p:cNvSpPr>
+            <a:spLocks noGrp="1"/>
+          </p:cNvSpPr>
+          <p:nvPr>
+            <p:ph type="dt" idx="1"/>
+          </p:nvPr>
+        </p:nvSpPr>
+        <p:spPr>
+          <a:xfrm>
+            <a:off x="3884613" y="0"/>
+            <a:ext cx="2971800" cy="457200"/>
+          </a:xfrm>
+          <a:prstGeom prst="rect">
+            <a:avLst/>
+          </a:prstGeom>
+        </p:spPr>
+        <p:txBody>
+          <a:bodyPr vert="horz" lIns="91440" tIns="45720" rIns="91440" bIns="45720" rtlCol="0"/>
+          <a:lstStyle>
+            <a:lvl1pPr algn="r">
+              <a:defRPr sz="1200"/>
+            </a:lvl1pPr>
+          </a:lstStyle>
+          <a:p>
+            <a:fld id="{400AE95E-2D77-4B1E-8558-DF474F773F18}" type="datetimeFigureOut">
+              <a:rPr lang="en-US" smtClean="0"/>
+              <a:t>11/12/2025</a:t>
+            </a:fld>
+            <a:endParaRPr lang="en-US"/>
+          </a:p>
+        </p:txBody>
+      </p:sp>
+      <p:sp>
+        <p:nvSpPr>
+          <p:cNvPr id="4" name="Slide Image Placeholder 3"/>
+          <p:cNvSpPr>
+            <a:spLocks noGrp="1" noRot="1" noChangeAspect="1"/>
+          </p:cNvSpPr>
+          <p:nvPr>
+            <p:ph type="sldImg" idx="2"/>
+          </p:nvPr>
+        </p:nvSpPr>
+        <p:spPr>
+          <a:xfrm>
+            <a:off x="1143000" y="685800"/>
+            <a:ext cx="4572000" cy="3429000"/>
+          </a:xfrm>
+          <a:prstGeom prst="rect">
+            <a:avLst/>
+          </a:prstGeom>
+          <a:noFill/>
+          <a:ln w="12700">
+            <a:solidFill>
+              <a:prstClr val="black"/>
+            </a:solidFill>
+          </a:ln>
+        </p:spPr>
+        <p:txBody>
+          <a:bodyPr vert="horz" lIns="91440" tIns="45720" rIns="91440" bIns="45720" rtlCol="0" anchor="ctr"/>
+          <a:lstStyle/>
+          <a:p>
+            <a:endParaRPr lang="en-US"/>
+          </a:p>
+        </p:txBody>
+      </p:sp>
+      <p:sp>
+        <p:nvSpPr>
+          <p:cNvPr id="5" name="Notes Placeholder 4"/>
+          <p:cNvSpPr>
+            <a:spLocks noGrp="1"/>
+          </p:cNvSpPr>
+          <p:nvPr>
+            <p:ph type="body" sz="quarter" idx="3"/>
+          </p:nvPr>
+        </p:nvSpPr>
+        <p:spPr>
+          <a:xfrm>
+            <a:off x="685800" y="4343400"/>
+            <a:ext cx="5486400" cy="4114800"/>
+          </a:xfrm>
+          <a:prstGeom prst="rect">
+            <a:avLst/>
+          </a:prstGeom>
+        </p:spPr>
+        <p:txBody>
+          <a:bodyPr vert="horz" lIns="91440" tIns="45720" rIns="91440" bIns="45720" rtlCol="0"/>
+          <a:lstStyle/>
+          <a:p>
+            <a:pPr lvl="0"/>
+            <a:r>
+              <a:rPr lang="en-US"/>
+              <a:t>Click to edit Master text styles</a:t>
+            </a:r>
+          </a:p>
+          <a:p>
+            <a:pPr lvl="1"/>
+            <a:r>
+              <a:rPr lang="en-US"/>
+              <a:t>Second level</a:t>
+            </a:r>
+          </a:p>
+          <a:p>
+            <a:pPr lvl="2"/>
+            <a:r>
+              <a:rPr lang="en-US"/>
+              <a:t>Third level</a:t>
+            </a:r>
+          </a:p>
+          <a:p>
+            <a:pPr lvl="3"/>
+            <a:r>
+              <a:rPr lang="en-US"/>
+              <a:t>Fourth level</a:t>
+            </a:r>
+          </a:p>
+          <a:p>
+            <a:pPr lvl="4"/>
+            <a:r>
+              <a:rPr lang="en-US"/>
+              <a:t>Fifth level</a:t>
+            </a:r>
+          </a:p>
+        </p:txBody>
+      </p:sp>
+      <p:sp>
+        <p:nvSpPr>
+          <p:cNvPr id="6" name="Footer Placeholder 5"/>
+          <p:cNvSpPr>
+            <a:spLocks noGrp="1"/>
+          </p:cNvSpPr>
+          <p:nvPr>
+            <p:ph type="ftr" sz="quarter" idx="4"/>
+          </p:nvPr>
+        </p:nvSpPr>
+        <p:spPr>
+          <a:xfrm>
+            <a:off x="0" y="8685213"/>
+            <a:ext cx="2971800" cy="457200"/>
+          </a:xfrm>
+          <a:prstGeom prst="rect">
+            <a:avLst/>
+          </a:prstGeom>
+        </p:spPr>
+        <p:txBody>
+          <a:bodyPr vert="horz" lIns="91440" tIns="45720" rIns="91440" bIns="45720" rtlCol="0" anchor="b"/>
+          <a:lstStyle>
+            <a:lvl1pPr algn="l">
+              <a:defRPr sz="1200"/>
+            </a:lvl1pPr>
+          </a:lstStyle>
+          <a:p>
+            <a:endParaRPr lang="en-US"/>
+          </a:p>
+        </p:txBody>
+      </p:sp>
+      <p:sp>
+        <p:nvSpPr>
+          <p:cNvPr id="7" name="Slide Number Placeholder 6"/>
+          <p:cNvSpPr>
+            <a:spLocks noGrp="1"/>
+          </p:cNvSpPr>
+          <p:nvPr>
+            <p:ph type="sldNum" sz="quarter" idx="5"/>
+          </p:nvPr>
+        </p:nvSpPr>
+        <p:spPr>
+          <a:xfrm>
+            <a:off x="3884613" y="8685213"/>
+            <a:ext cx="2971800" cy="457200"/>
+          </a:xfrm>
+          <a:prstGeom prst="rect">
+            <a:avLst/>
+          </a:prstGeom>
+        </p:spPr>
+        <p:txBody>
+          <a:bodyPr vert="horz" lIns="91440" tIns="45720" rIns="91440" bIns="45720" rtlCol="0" anchor="b"/>
+          <a:lstStyle>
+            <a:lvl1pPr algn="r">
+              <a:defRPr sz="1200"/>
+            </a:lvl1pPr>
+          </a:lstStyle>
+          <a:p>
+            <a:fld id="{B33D294D-5AA5-4044-946C-8FAB5B04A738}" type="slidenum">
+              <a:rPr lang="en-US" smtClean="0"/>
+              <a:t>‹#›</a:t>
+            </a:fld>
+            <a:endParaRPr lang="en-US"/>
+          </a:p>
+        </p:txBody>
+      </p:sp>
+    </p:spTree>
+    <p:extLst>
+      <p:ext uri="{BB962C8B-B14F-4D97-AF65-F5344CB8AC3E}">
+        <p14:creationId xmlns:p14="http://schemas.microsoft.com/office/powerpoint/2010/main" val="2091285007"/>
+      </p:ext>
+    </p:extLst>
+  </p:cSld>
+  <p:clrMap bg1="lt1" tx1="dk1" bg2="lt2" tx2="dk2" accent1="accent1" accent2="accent2" accent3="accent3" accent4="accent4" accent5="accent5" accent6="accent6" hlink="hlink" folHlink="folHlink"/>
+  <p:notesStyle>
+    <a:lvl1pPr marL="0" algn="l" defTabSz="914400" rtl="0" eaLnBrk="1" latinLnBrk="0" hangingPunct="1">
+      <a:defRPr sz="1200" kern="1200">
+        <a:solidFill>
+          <a:schemeClr val="tx1"/>
+        </a:solidFill>
+        <a:latin typeface="+mn-lt"/>
+        <a:ea typeface="+mn-ea"/>
+        <a:cs typeface="+mn-cs"/>
+      </a:defRPr>
+    </a:lvl1pPr>
+    <a:lvl2pPr marL="457200" algn="l" defTabSz="914400" rtl="0" eaLnBrk="1" latinLnBrk="0" hangingPunct="1">
+      <a:defRPr sz="1200" kern="1200">
+        <a:solidFill>
+          <a:schemeClr val="tx1"/>
+        </a:solidFill>
+        <a:latin typeface="+mn-lt"/>
+        <a:ea typeface="+mn-ea"/>
+        <a:cs typeface="+mn-cs"/>
+      </a:defRPr>
+    </a:lvl2pPr>
+    <a:lvl3pPr marL="914400" algn="l" defTabSz="914400" rtl="0" eaLnBrk="1" latinLnBrk="0" hangingPunct="1">
+      <a:defRPr sz="1200" kern="1200">
+        <a:solidFill>
+          <a:schemeClr val="tx1"/>
+        </a:solidFill>
+        <a:latin typeface="+mn-lt"/>
+        <a:ea typeface="+mn-ea"/>
+        <a:cs typeface="+mn-cs"/>
+      </a:defRPr>
+    </a:lvl3pPr>
+    <a:lvl4pPr marL="1371600" algn="l" defTabSz="914400" rtl="0" eaLnBrk="1" latinLnBrk="0" hangingPunct="1">
+      <a:defRPr sz="1200" kern="1200">
+        <a:solidFill>
+          <a:schemeClr val="tx1"/>
+        </a:solidFill>
+        <a:latin typeface="+mn-lt"/>
+        <a:ea typeface="+mn-ea"/>
+        <a:cs typeface="+mn-cs"/>
+      </a:defRPr>
+    </a:lvl4pPr>
+    <a:lvl5pPr marL="1828800" algn="l" defTabSz="914400" rtl="0" eaLnBrk="1" latinLnBrk="0" hangingPunct="1">
+      <a:defRPr sz="1200" kern="1200">
+        <a:solidFill>
+          <a:schemeClr val="tx1"/>
+        </a:solidFill>
+        <a:latin typeface="+mn-lt"/>
+        <a:ea typeface="+mn-ea"/>
+        <a:cs typeface="+mn-cs"/>
+      </a:defRPr>
+    </a:lvl5pPr>
+    <a:lvl6pPr marL="2286000" algn="l" defTabSz="914400" rtl="0" eaLnBrk="1" latinLnBrk="0" hangingPunct="1">
+      <a:defRPr sz="1200" kern="1200">
+        <a:solidFill>
+          <a:schemeClr val="tx1"/>
+        </a:solidFill>
+        <a:latin typeface="+mn-lt"/>
+        <a:ea typeface="+mn-ea"/>
+        <a:cs typeface="+mn-cs"/>
+      </a:defRPr>
+    </a:lvl6pPr>
+    <a:lvl7pPr marL="2743200" algn="l" defTabSz="914400" rtl="0" eaLnBrk="1" latinLnBrk="0" hangingPunct="1">
+      <a:defRPr sz="1200" kern="1200">
+        <a:solidFill>
+          <a:schemeClr val="tx1"/>
+        </a:solidFill>
+        <a:latin typeface="+mn-lt"/>
+        <a:ea typeface="+mn-ea"/>
+        <a:cs typeface="+mn-cs"/>
+      </a:defRPr>
+    </a:lvl7pPr>
+    <a:lvl8pPr marL="3200400" algn="l" defTabSz="914400" rtl="0" eaLnBrk="1" latinLnBrk="0" hangingPunct="1">
+      <a:defRPr sz="1200" kern="1200">
+        <a:solidFill>
+          <a:schemeClr val="tx1"/>
+        </a:solidFill>
+        <a:latin typeface="+mn-lt"/>
+        <a:ea typeface="+mn-ea"/>
+        <a:cs typeface="+mn-cs"/>
+      </a:defRPr>
+    </a:lvl8pPr>
+    <a:lvl9pPr marL="3657600" algn="l" defTabSz="914400" rtl="0" eaLnBrk="1" latinLnBrk="0" hangingPunct="1">
+      <a:defRPr sz="1200" kern="1200">
+        <a:solidFill>
+          <a:schemeClr val="tx1"/>
+        </a:solidFill>
+        <a:latin typeface="+mn-lt"/>
+        <a:ea typeface="+mn-ea"/>
+        <a:cs typeface="+mn-cs"/>
+      </a:defRPr>
+    </a:lvl9pPr>
+  </p:notesStyle>
+</p:notesMaster>
+</file>
+
+<file path=ppt/notesSlides/notesSlide1.xml><?xml version="1.0" encoding="utf-8"?>
+<p:notes xmlns:a="http://schemas.openxmlformats.org/drawingml/2006/main" xmlns:r="http://schemas.openxmlformats.org/officeDocument/2006/relationships" xmlns:p="http://schemas.openxmlformats.org/presentationml/2006/main">
+  <p:cSld>
+    <p:spTree>
+      <p:nvGrpSpPr>
+        <p:cNvPr id="1" name=""/>
+        <p:cNvGrpSpPr/>
+        <p:nvPr/>
+      </p:nvGrpSpPr>
+      <p:grpSpPr>
+        <a:xfrm>
+          <a:off x="0" y="0"/>
+          <a:ext cx="0" cy="0"/>
+          <a:chOff x="0" y="0"/>
+          <a:chExt cx="0" cy="0"/>
+        </a:xfrm>
+      </p:grpSpPr>
+      <p:sp>
+        <p:nvSpPr>
+          <p:cNvPr id="2" name="Slide Image Placeholder 1"/>
+          <p:cNvSpPr>
+            <a:spLocks noGrp="1" noRot="1" noChangeAspect="1"/>
+          </p:cNvSpPr>
+          <p:nvPr>
+            <p:ph type="sldImg"/>
+          </p:nvPr>
+        </p:nvSpPr>
+        <p:spPr/>
+      </p:sp>
+      <p:sp>
+        <p:nvSpPr>
+          <p:cNvPr id="3" name="Notes Placeholder 2"/>
+          <p:cNvSpPr>
+            <a:spLocks noGrp="1"/>
+          </p:cNvSpPr>
+          <p:nvPr>
+            <p:ph type="body" idx="1"/>
+          </p:nvPr>
+        </p:nvSpPr>
+        <p:spPr/>
+        <p:txBody>
+          <a:bodyPr/>
+          <a:lstStyle/>
+          <a:p>
+            <a:endParaRPr lang="en-US" dirty="0"/>
+          </a:p>
+        </p:txBody>
+      </p:sp>
+      <p:sp>
+        <p:nvSpPr>
+          <p:cNvPr id="4" name="Slide Number Placeholder 3"/>
+          <p:cNvSpPr>
+            <a:spLocks noGrp="1"/>
+          </p:cNvSpPr>
+          <p:nvPr>
+            <p:ph type="sldNum" sz="quarter" idx="10"/>
+          </p:nvPr>
+        </p:nvSpPr>
+        <p:spPr/>
+        <p:txBody>
+          <a:bodyPr/>
+          <a:lstStyle/>
+          <a:p>
+            <a:fld id="{B33D294D-5AA5-4044-946C-8FAB5B04A738}" type="slidenum">
+              <a:rPr lang="en-US" smtClean="0"/>
+              <a:t>1</a:t>
+            </a:fld>
+            <a:endParaRPr lang="en-US"/>
+          </a:p>
+        </p:txBody>
+      </p:sp>
+    </p:spTree>
+    <p:extLst>
+      <p:ext uri="{BB962C8B-B14F-4D97-AF65-F5344CB8AC3E}">
+        <p14:creationId xmlns:p14="http://schemas.microsoft.com/office/powerpoint/2010/main" val="733879385"/>
+      </p:ext>
+    </p:extLst>
+  </p:cSld>
+  <p:clrMapOvr>
+    <a:masterClrMapping/>
+  </p:clrMapOvr>
+</p:notes>
 </file>
 
 <file path=ppt/slideLayouts/slideLayout1.xml><?xml version="1.0" encoding="utf-8"?>
@@ -141,23 +588,18 @@
         </p:nvSpPr>
         <p:spPr>
           <a:xfrm>
-            <a:off x="685800" y="1122363"/>
-            <a:ext cx="7772400" cy="2387600"/>
+            <a:off x="685800" y="2130425"/>
+            <a:ext cx="7772400" cy="1470025"/>
           </a:xfrm>
         </p:spPr>
         <p:txBody>
-          <a:bodyPr anchor="b"/>
-          <a:lstStyle>
-            <a:lvl1pPr algn="ctr">
-              <a:defRPr sz="6000"/>
-            </a:lvl1pPr>
-          </a:lstStyle>
+          <a:bodyPr/>
+          <a:lstStyle/>
           <a:p>
             <a:r>
               <a:rPr lang="en-US"/>
               <a:t>Click to edit Master title style</a:t>
             </a:r>
-            <a:endParaRPr lang="en-US" dirty="0"/>
           </a:p>
         </p:txBody>
       </p:sp>
@@ -173,8 +615,8 @@
         </p:nvSpPr>
         <p:spPr>
           <a:xfrm>
-            <a:off x="1143000" y="3602038"/>
-            <a:ext cx="6858000" cy="1655762"/>
+            <a:off x="1371600" y="3886200"/>
+            <a:ext cx="6400800" cy="1752600"/>
           </a:xfrm>
         </p:spPr>
         <p:txBody>
@@ -182,39 +624,93 @@
           <a:lstStyle>
             <a:lvl1pPr marL="0" indent="0" algn="ctr">
               <a:buNone/>
-              <a:defRPr sz="2400"/>
+              <a:defRPr>
+                <a:solidFill>
+                  <a:schemeClr val="tx1">
+                    <a:tint val="75000"/>
+                  </a:schemeClr>
+                </a:solidFill>
+              </a:defRPr>
             </a:lvl1pPr>
             <a:lvl2pPr marL="457200" indent="0" algn="ctr">
               <a:buNone/>
-              <a:defRPr sz="2000"/>
+              <a:defRPr>
+                <a:solidFill>
+                  <a:schemeClr val="tx1">
+                    <a:tint val="75000"/>
+                  </a:schemeClr>
+                </a:solidFill>
+              </a:defRPr>
             </a:lvl2pPr>
             <a:lvl3pPr marL="914400" indent="0" algn="ctr">
               <a:buNone/>
-              <a:defRPr sz="1800"/>
+              <a:defRPr>
+                <a:solidFill>
+                  <a:schemeClr val="tx1">
+                    <a:tint val="75000"/>
+                  </a:schemeClr>
+                </a:solidFill>
+              </a:defRPr>
             </a:lvl3pPr>
             <a:lvl4pPr marL="1371600" indent="0" algn="ctr">
               <a:buNone/>
-              <a:defRPr sz="1600"/>
+              <a:defRPr>
+                <a:solidFill>
+                  <a:schemeClr val="tx1">
+                    <a:tint val="75000"/>
+                  </a:schemeClr>
+                </a:solidFill>
+              </a:defRPr>
             </a:lvl4pPr>
             <a:lvl5pPr marL="1828800" indent="0" algn="ctr">
               <a:buNone/>
-              <a:defRPr sz="1600"/>
+              <a:defRPr>
+                <a:solidFill>
+                  <a:schemeClr val="tx1">
+                    <a:tint val="75000"/>
+                  </a:schemeClr>
+                </a:solidFill>
+              </a:defRPr>
             </a:lvl5pPr>
             <a:lvl6pPr marL="2286000" indent="0" algn="ctr">
               <a:buNone/>
-              <a:defRPr sz="1600"/>
+              <a:defRPr>
+                <a:solidFill>
+                  <a:schemeClr val="tx1">
+                    <a:tint val="75000"/>
+                  </a:schemeClr>
+                </a:solidFill>
+              </a:defRPr>
             </a:lvl6pPr>
             <a:lvl7pPr marL="2743200" indent="0" algn="ctr">
               <a:buNone/>
-              <a:defRPr sz="1600"/>
+              <a:defRPr>
+                <a:solidFill>
+                  <a:schemeClr val="tx1">
+                    <a:tint val="75000"/>
+                  </a:schemeClr>
+                </a:solidFill>
+              </a:defRPr>
             </a:lvl7pPr>
             <a:lvl8pPr marL="3200400" indent="0" algn="ctr">
               <a:buNone/>
-              <a:defRPr sz="1600"/>
+              <a:defRPr>
+                <a:solidFill>
+                  <a:schemeClr val="tx1">
+                    <a:tint val="75000"/>
+                  </a:schemeClr>
+                </a:solidFill>
+              </a:defRPr>
             </a:lvl8pPr>
             <a:lvl9pPr marL="3657600" indent="0" algn="ctr">
               <a:buNone/>
-              <a:defRPr sz="1600"/>
+              <a:defRPr>
+                <a:solidFill>
+                  <a:schemeClr val="tx1">
+                    <a:tint val="75000"/>
+                  </a:schemeClr>
+                </a:solidFill>
+              </a:defRPr>
             </a:lvl9pPr>
           </a:lstStyle>
           <a:p>
@@ -222,7 +718,6 @@
               <a:rPr lang="en-US"/>
               <a:t>Click to edit Master subtitle style</a:t>
             </a:r>
-            <a:endParaRPr lang="en-US" dirty="0"/>
           </a:p>
         </p:txBody>
       </p:sp>
@@ -241,11 +736,12 @@
           <a:bodyPr/>
           <a:lstStyle/>
           <a:p>
-            <a:fld id="{4EFE2193-3B2A-43CE-A067-88969492A3B6}" type="datetimeFigureOut">
-              <a:rPr lang="id-ID" smtClean="0"/>
-              <a:t>08/11/2025</a:t>
+            <a:fld id="{378A028A-B623-4C5B-AF5C-862C1110FA74}" type="datetimeFigureOut">
+              <a:rPr lang="en-US" smtClean="0"/>
+              <a:pPr/>
+              <a:t>11/12/2025</a:t>
             </a:fld>
-            <a:endParaRPr lang="id-ID"/>
+            <a:endParaRPr lang="en-US"/>
           </a:p>
         </p:txBody>
       </p:sp>
@@ -264,7 +760,7 @@
           <a:bodyPr/>
           <a:lstStyle/>
           <a:p>
-            <a:endParaRPr lang="id-ID"/>
+            <a:endParaRPr lang="en-US"/>
           </a:p>
         </p:txBody>
       </p:sp>
@@ -283,18 +779,19 @@
           <a:bodyPr/>
           <a:lstStyle/>
           <a:p>
-            <a:fld id="{46DAC2AE-923F-4313-B289-0CA4A941956D}" type="slidenum">
-              <a:rPr lang="id-ID" smtClean="0"/>
+            <a:fld id="{755187AC-92FF-4BB7-99EB-38054C83B86D}" type="slidenum">
+              <a:rPr lang="en-US" smtClean="0"/>
+              <a:pPr/>
               <a:t>‹#›</a:t>
             </a:fld>
-            <a:endParaRPr lang="id-ID"/>
+            <a:endParaRPr lang="en-US"/>
           </a:p>
         </p:txBody>
       </p:sp>
     </p:spTree>
     <p:extLst>
       <p:ext uri="{BB962C8B-B14F-4D97-AF65-F5344CB8AC3E}">
-        <p14:creationId xmlns:p14="http://schemas.microsoft.com/office/powerpoint/2010/main" val="605002860"/>
+        <p14:creationId xmlns:p14="http://schemas.microsoft.com/office/powerpoint/2010/main" val="1474506470"/>
       </p:ext>
     </p:extLst>
   </p:cSld>
@@ -340,7 +837,6 @@
               <a:rPr lang="en-US"/>
               <a:t>Click to edit Master title style</a:t>
             </a:r>
-            <a:endParaRPr lang="en-US" dirty="0"/>
           </a:p>
         </p:txBody>
       </p:sp>
@@ -392,7 +888,6 @@
               <a:rPr lang="en-US"/>
               <a:t>Fifth level</a:t>
             </a:r>
-            <a:endParaRPr lang="en-US" dirty="0"/>
           </a:p>
         </p:txBody>
       </p:sp>
@@ -411,11 +906,12 @@
           <a:bodyPr/>
           <a:lstStyle/>
           <a:p>
-            <a:fld id="{4EFE2193-3B2A-43CE-A067-88969492A3B6}" type="datetimeFigureOut">
-              <a:rPr lang="id-ID" smtClean="0"/>
-              <a:t>08/11/2025</a:t>
+            <a:fld id="{378A028A-B623-4C5B-AF5C-862C1110FA74}" type="datetimeFigureOut">
+              <a:rPr lang="en-US" smtClean="0"/>
+              <a:pPr/>
+              <a:t>11/12/2025</a:t>
             </a:fld>
-            <a:endParaRPr lang="id-ID"/>
+            <a:endParaRPr lang="en-US"/>
           </a:p>
         </p:txBody>
       </p:sp>
@@ -434,7 +930,7 @@
           <a:bodyPr/>
           <a:lstStyle/>
           <a:p>
-            <a:endParaRPr lang="id-ID"/>
+            <a:endParaRPr lang="en-US"/>
           </a:p>
         </p:txBody>
       </p:sp>
@@ -453,18 +949,19 @@
           <a:bodyPr/>
           <a:lstStyle/>
           <a:p>
-            <a:fld id="{46DAC2AE-923F-4313-B289-0CA4A941956D}" type="slidenum">
-              <a:rPr lang="id-ID" smtClean="0"/>
+            <a:fld id="{755187AC-92FF-4BB7-99EB-38054C83B86D}" type="slidenum">
+              <a:rPr lang="en-US" smtClean="0"/>
+              <a:pPr/>
               <a:t>‹#›</a:t>
             </a:fld>
-            <a:endParaRPr lang="id-ID"/>
+            <a:endParaRPr lang="en-US"/>
           </a:p>
         </p:txBody>
       </p:sp>
     </p:spTree>
     <p:extLst>
       <p:ext uri="{BB962C8B-B14F-4D97-AF65-F5344CB8AC3E}">
-        <p14:creationId xmlns:p14="http://schemas.microsoft.com/office/powerpoint/2010/main" val="4150269399"/>
+        <p14:creationId xmlns:p14="http://schemas.microsoft.com/office/powerpoint/2010/main" val="3441483080"/>
       </p:ext>
     </p:extLst>
   </p:cSld>
@@ -503,8 +1000,8 @@
         </p:nvSpPr>
         <p:spPr>
           <a:xfrm>
-            <a:off x="6543675" y="365125"/>
-            <a:ext cx="1971675" cy="5811838"/>
+            <a:off x="6629400" y="274638"/>
+            <a:ext cx="2057400" cy="5851525"/>
           </a:xfrm>
         </p:spPr>
         <p:txBody>
@@ -515,7 +1012,6 @@
               <a:rPr lang="en-US"/>
               <a:t>Click to edit Master title style</a:t>
             </a:r>
-            <a:endParaRPr lang="en-US" dirty="0"/>
           </a:p>
         </p:txBody>
       </p:sp>
@@ -531,8 +1027,8 @@
         </p:nvSpPr>
         <p:spPr>
           <a:xfrm>
-            <a:off x="628650" y="365125"/>
-            <a:ext cx="5800725" cy="5811838"/>
+            <a:off x="457200" y="274638"/>
+            <a:ext cx="6019800" cy="5851525"/>
           </a:xfrm>
         </p:spPr>
         <p:txBody>
@@ -572,7 +1068,6 @@
               <a:rPr lang="en-US"/>
               <a:t>Fifth level</a:t>
             </a:r>
-            <a:endParaRPr lang="en-US" dirty="0"/>
           </a:p>
         </p:txBody>
       </p:sp>
@@ -591,11 +1086,12 @@
           <a:bodyPr/>
           <a:lstStyle/>
           <a:p>
-            <a:fld id="{4EFE2193-3B2A-43CE-A067-88969492A3B6}" type="datetimeFigureOut">
-              <a:rPr lang="id-ID" smtClean="0"/>
-              <a:t>08/11/2025</a:t>
+            <a:fld id="{378A028A-B623-4C5B-AF5C-862C1110FA74}" type="datetimeFigureOut">
+              <a:rPr lang="en-US" smtClean="0"/>
+              <a:pPr/>
+              <a:t>11/12/2025</a:t>
             </a:fld>
-            <a:endParaRPr lang="id-ID"/>
+            <a:endParaRPr lang="en-US"/>
           </a:p>
         </p:txBody>
       </p:sp>
@@ -614,7 +1110,7 @@
           <a:bodyPr/>
           <a:lstStyle/>
           <a:p>
-            <a:endParaRPr lang="id-ID"/>
+            <a:endParaRPr lang="en-US"/>
           </a:p>
         </p:txBody>
       </p:sp>
@@ -633,18 +1129,19 @@
           <a:bodyPr/>
           <a:lstStyle/>
           <a:p>
-            <a:fld id="{46DAC2AE-923F-4313-B289-0CA4A941956D}" type="slidenum">
-              <a:rPr lang="id-ID" smtClean="0"/>
+            <a:fld id="{755187AC-92FF-4BB7-99EB-38054C83B86D}" type="slidenum">
+              <a:rPr lang="en-US" smtClean="0"/>
+              <a:pPr/>
               <a:t>‹#›</a:t>
             </a:fld>
-            <a:endParaRPr lang="id-ID"/>
+            <a:endParaRPr lang="en-US"/>
           </a:p>
         </p:txBody>
       </p:sp>
     </p:spTree>
     <p:extLst>
       <p:ext uri="{BB962C8B-B14F-4D97-AF65-F5344CB8AC3E}">
-        <p14:creationId xmlns:p14="http://schemas.microsoft.com/office/powerpoint/2010/main" val="1189203665"/>
+        <p14:creationId xmlns:p14="http://schemas.microsoft.com/office/powerpoint/2010/main" val="4007451777"/>
       </p:ext>
     </p:extLst>
   </p:cSld>
@@ -690,7 +1187,6 @@
               <a:rPr lang="en-US"/>
               <a:t>Click to edit Master title style</a:t>
             </a:r>
-            <a:endParaRPr lang="en-US" dirty="0"/>
           </a:p>
         </p:txBody>
       </p:sp>
@@ -742,7 +1238,6 @@
               <a:rPr lang="en-US"/>
               <a:t>Fifth level</a:t>
             </a:r>
-            <a:endParaRPr lang="en-US" dirty="0"/>
           </a:p>
         </p:txBody>
       </p:sp>
@@ -761,11 +1256,12 @@
           <a:bodyPr/>
           <a:lstStyle/>
           <a:p>
-            <a:fld id="{4EFE2193-3B2A-43CE-A067-88969492A3B6}" type="datetimeFigureOut">
-              <a:rPr lang="id-ID" smtClean="0"/>
-              <a:t>08/11/2025</a:t>
+            <a:fld id="{378A028A-B623-4C5B-AF5C-862C1110FA74}" type="datetimeFigureOut">
+              <a:rPr lang="en-US" smtClean="0"/>
+              <a:pPr/>
+              <a:t>11/12/2025</a:t>
             </a:fld>
-            <a:endParaRPr lang="id-ID"/>
+            <a:endParaRPr lang="en-US"/>
           </a:p>
         </p:txBody>
       </p:sp>
@@ -784,7 +1280,7 @@
           <a:bodyPr/>
           <a:lstStyle/>
           <a:p>
-            <a:endParaRPr lang="id-ID"/>
+            <a:endParaRPr lang="en-US"/>
           </a:p>
         </p:txBody>
       </p:sp>
@@ -803,18 +1299,19 @@
           <a:bodyPr/>
           <a:lstStyle/>
           <a:p>
-            <a:fld id="{46DAC2AE-923F-4313-B289-0CA4A941956D}" type="slidenum">
-              <a:rPr lang="id-ID" smtClean="0"/>
+            <a:fld id="{755187AC-92FF-4BB7-99EB-38054C83B86D}" type="slidenum">
+              <a:rPr lang="en-US" smtClean="0"/>
+              <a:pPr/>
               <a:t>‹#›</a:t>
             </a:fld>
-            <a:endParaRPr lang="id-ID"/>
+            <a:endParaRPr lang="en-US"/>
           </a:p>
         </p:txBody>
       </p:sp>
     </p:spTree>
     <p:extLst>
       <p:ext uri="{BB962C8B-B14F-4D97-AF65-F5344CB8AC3E}">
-        <p14:creationId xmlns:p14="http://schemas.microsoft.com/office/powerpoint/2010/main" val="667000855"/>
+        <p14:creationId xmlns:p14="http://schemas.microsoft.com/office/powerpoint/2010/main" val="2759541744"/>
       </p:ext>
     </p:extLst>
   </p:cSld>
@@ -853,56 +1350,57 @@
         </p:nvSpPr>
         <p:spPr>
           <a:xfrm>
-            <a:off x="623888" y="1709739"/>
-            <a:ext cx="7886700" cy="2852737"/>
+            <a:off x="722313" y="4406900"/>
+            <a:ext cx="7772400" cy="1362075"/>
           </a:xfrm>
         </p:spPr>
         <p:txBody>
+          <a:bodyPr anchor="t"/>
+          <a:lstStyle>
+            <a:lvl1pPr algn="l">
+              <a:defRPr sz="4000" b="1" cap="all"/>
+            </a:lvl1pPr>
+          </a:lstStyle>
+          <a:p>
+            <a:r>
+              <a:rPr lang="en-US"/>
+              <a:t>Click to edit Master title style</a:t>
+            </a:r>
+          </a:p>
+        </p:txBody>
+      </p:sp>
+      <p:sp>
+        <p:nvSpPr>
+          <p:cNvPr id="3" name="Text Placeholder 2"/>
+          <p:cNvSpPr>
+            <a:spLocks noGrp="1"/>
+          </p:cNvSpPr>
+          <p:nvPr>
+            <p:ph type="body" idx="1"/>
+          </p:nvPr>
+        </p:nvSpPr>
+        <p:spPr>
+          <a:xfrm>
+            <a:off x="722313" y="2906713"/>
+            <a:ext cx="7772400" cy="1500187"/>
+          </a:xfrm>
+        </p:spPr>
+        <p:txBody>
           <a:bodyPr anchor="b"/>
           <a:lstStyle>
-            <a:lvl1pPr>
-              <a:defRPr sz="6000"/>
-            </a:lvl1pPr>
-          </a:lstStyle>
-          <a:p>
-            <a:r>
-              <a:rPr lang="en-US"/>
-              <a:t>Click to edit Master title style</a:t>
-            </a:r>
-            <a:endParaRPr lang="en-US" dirty="0"/>
-          </a:p>
-        </p:txBody>
-      </p:sp>
-      <p:sp>
-        <p:nvSpPr>
-          <p:cNvPr id="3" name="Text Placeholder 2"/>
-          <p:cNvSpPr>
-            <a:spLocks noGrp="1"/>
-          </p:cNvSpPr>
-          <p:nvPr>
-            <p:ph type="body" idx="1"/>
-          </p:nvPr>
-        </p:nvSpPr>
-        <p:spPr>
-          <a:xfrm>
-            <a:off x="623888" y="4589464"/>
-            <a:ext cx="7886700" cy="1500187"/>
-          </a:xfrm>
-        </p:spPr>
-        <p:txBody>
-          <a:bodyPr/>
-          <a:lstStyle>
             <a:lvl1pPr marL="0" indent="0">
               <a:buNone/>
-              <a:defRPr sz="2400">
+              <a:defRPr sz="2000">
                 <a:solidFill>
-                  <a:schemeClr val="tx1"/>
+                  <a:schemeClr val="tx1">
+                    <a:tint val="75000"/>
+                  </a:schemeClr>
                 </a:solidFill>
               </a:defRPr>
             </a:lvl1pPr>
             <a:lvl2pPr marL="457200" indent="0">
               <a:buNone/>
-              <a:defRPr sz="2000">
+              <a:defRPr sz="1800">
                 <a:solidFill>
                   <a:schemeClr val="tx1">
                     <a:tint val="75000"/>
@@ -912,7 +1410,7 @@
             </a:lvl2pPr>
             <a:lvl3pPr marL="914400" indent="0">
               <a:buNone/>
-              <a:defRPr sz="1800">
+              <a:defRPr sz="1600">
                 <a:solidFill>
                   <a:schemeClr val="tx1">
                     <a:tint val="75000"/>
@@ -922,7 +1420,7 @@
             </a:lvl3pPr>
             <a:lvl4pPr marL="1371600" indent="0">
               <a:buNone/>
-              <a:defRPr sz="1600">
+              <a:defRPr sz="1400">
                 <a:solidFill>
                   <a:schemeClr val="tx1">
                     <a:tint val="75000"/>
@@ -932,7 +1430,7 @@
             </a:lvl4pPr>
             <a:lvl5pPr marL="1828800" indent="0">
               <a:buNone/>
-              <a:defRPr sz="1600">
+              <a:defRPr sz="1400">
                 <a:solidFill>
                   <a:schemeClr val="tx1">
                     <a:tint val="75000"/>
@@ -942,7 +1440,7 @@
             </a:lvl5pPr>
             <a:lvl6pPr marL="2286000" indent="0">
               <a:buNone/>
-              <a:defRPr sz="1600">
+              <a:defRPr sz="1400">
                 <a:solidFill>
                   <a:schemeClr val="tx1">
                     <a:tint val="75000"/>
@@ -952,7 +1450,7 @@
             </a:lvl6pPr>
             <a:lvl7pPr marL="2743200" indent="0">
               <a:buNone/>
-              <a:defRPr sz="1600">
+              <a:defRPr sz="1400">
                 <a:solidFill>
                   <a:schemeClr val="tx1">
                     <a:tint val="75000"/>
@@ -962,7 +1460,7 @@
             </a:lvl7pPr>
             <a:lvl8pPr marL="3200400" indent="0">
               <a:buNone/>
-              <a:defRPr sz="1600">
+              <a:defRPr sz="1400">
                 <a:solidFill>
                   <a:schemeClr val="tx1">
                     <a:tint val="75000"/>
@@ -972,7 +1470,7 @@
             </a:lvl8pPr>
             <a:lvl9pPr marL="3657600" indent="0">
               <a:buNone/>
-              <a:defRPr sz="1600">
+              <a:defRPr sz="1400">
                 <a:solidFill>
                   <a:schemeClr val="tx1">
                     <a:tint val="75000"/>
@@ -1005,11 +1503,12 @@
           <a:bodyPr/>
           <a:lstStyle/>
           <a:p>
-            <a:fld id="{4EFE2193-3B2A-43CE-A067-88969492A3B6}" type="datetimeFigureOut">
-              <a:rPr lang="id-ID" smtClean="0"/>
-              <a:t>08/11/2025</a:t>
+            <a:fld id="{378A028A-B623-4C5B-AF5C-862C1110FA74}" type="datetimeFigureOut">
+              <a:rPr lang="en-US" smtClean="0"/>
+              <a:pPr/>
+              <a:t>11/12/2025</a:t>
             </a:fld>
-            <a:endParaRPr lang="id-ID"/>
+            <a:endParaRPr lang="en-US"/>
           </a:p>
         </p:txBody>
       </p:sp>
@@ -1028,7 +1527,7 @@
           <a:bodyPr/>
           <a:lstStyle/>
           <a:p>
-            <a:endParaRPr lang="id-ID"/>
+            <a:endParaRPr lang="en-US"/>
           </a:p>
         </p:txBody>
       </p:sp>
@@ -1047,18 +1546,19 @@
           <a:bodyPr/>
           <a:lstStyle/>
           <a:p>
-            <a:fld id="{46DAC2AE-923F-4313-B289-0CA4A941956D}" type="slidenum">
-              <a:rPr lang="id-ID" smtClean="0"/>
+            <a:fld id="{755187AC-92FF-4BB7-99EB-38054C83B86D}" type="slidenum">
+              <a:rPr lang="en-US" smtClean="0"/>
+              <a:pPr/>
               <a:t>‹#›</a:t>
             </a:fld>
-            <a:endParaRPr lang="id-ID"/>
+            <a:endParaRPr lang="en-US"/>
           </a:p>
         </p:txBody>
       </p:sp>
     </p:spTree>
     <p:extLst>
       <p:ext uri="{BB962C8B-B14F-4D97-AF65-F5344CB8AC3E}">
-        <p14:creationId xmlns:p14="http://schemas.microsoft.com/office/powerpoint/2010/main" val="560858723"/>
+        <p14:creationId xmlns:p14="http://schemas.microsoft.com/office/powerpoint/2010/main" val="1942499492"/>
       </p:ext>
     </p:extLst>
   </p:cSld>
@@ -1104,7 +1604,6 @@
               <a:rPr lang="en-US"/>
               <a:t>Click to edit Master title style</a:t>
             </a:r>
-            <a:endParaRPr lang="en-US" dirty="0"/>
           </a:p>
         </p:txBody>
       </p:sp>
@@ -1120,13 +1619,41 @@
         </p:nvSpPr>
         <p:spPr>
           <a:xfrm>
-            <a:off x="628650" y="1825625"/>
-            <a:ext cx="3886200" cy="4351338"/>
+            <a:off x="457200" y="1600200"/>
+            <a:ext cx="4038600" cy="4525963"/>
           </a:xfrm>
         </p:spPr>
         <p:txBody>
           <a:bodyPr/>
-          <a:lstStyle/>
+          <a:lstStyle>
+            <a:lvl1pPr>
+              <a:defRPr sz="2800"/>
+            </a:lvl1pPr>
+            <a:lvl2pPr>
+              <a:defRPr sz="2400"/>
+            </a:lvl2pPr>
+            <a:lvl3pPr>
+              <a:defRPr sz="2000"/>
+            </a:lvl3pPr>
+            <a:lvl4pPr>
+              <a:defRPr sz="1800"/>
+            </a:lvl4pPr>
+            <a:lvl5pPr>
+              <a:defRPr sz="1800"/>
+            </a:lvl5pPr>
+            <a:lvl6pPr>
+              <a:defRPr sz="1800"/>
+            </a:lvl6pPr>
+            <a:lvl7pPr>
+              <a:defRPr sz="1800"/>
+            </a:lvl7pPr>
+            <a:lvl8pPr>
+              <a:defRPr sz="1800"/>
+            </a:lvl8pPr>
+            <a:lvl9pPr>
+              <a:defRPr sz="1800"/>
+            </a:lvl9pPr>
+          </a:lstStyle>
           <a:p>
             <a:pPr lvl="0"/>
             <a:r>
@@ -1161,7 +1688,6 @@
               <a:rPr lang="en-US"/>
               <a:t>Fifth level</a:t>
             </a:r>
-            <a:endParaRPr lang="en-US" dirty="0"/>
           </a:p>
         </p:txBody>
       </p:sp>
@@ -1177,13 +1703,41 @@
         </p:nvSpPr>
         <p:spPr>
           <a:xfrm>
-            <a:off x="4629150" y="1825625"/>
-            <a:ext cx="3886200" cy="4351338"/>
+            <a:off x="4648200" y="1600200"/>
+            <a:ext cx="4038600" cy="4525963"/>
           </a:xfrm>
         </p:spPr>
         <p:txBody>
           <a:bodyPr/>
-          <a:lstStyle/>
+          <a:lstStyle>
+            <a:lvl1pPr>
+              <a:defRPr sz="2800"/>
+            </a:lvl1pPr>
+            <a:lvl2pPr>
+              <a:defRPr sz="2400"/>
+            </a:lvl2pPr>
+            <a:lvl3pPr>
+              <a:defRPr sz="2000"/>
+            </a:lvl3pPr>
+            <a:lvl4pPr>
+              <a:defRPr sz="1800"/>
+            </a:lvl4pPr>
+            <a:lvl5pPr>
+              <a:defRPr sz="1800"/>
+            </a:lvl5pPr>
+            <a:lvl6pPr>
+              <a:defRPr sz="1800"/>
+            </a:lvl6pPr>
+            <a:lvl7pPr>
+              <a:defRPr sz="1800"/>
+            </a:lvl7pPr>
+            <a:lvl8pPr>
+              <a:defRPr sz="1800"/>
+            </a:lvl8pPr>
+            <a:lvl9pPr>
+              <a:defRPr sz="1800"/>
+            </a:lvl9pPr>
+          </a:lstStyle>
           <a:p>
             <a:pPr lvl="0"/>
             <a:r>
@@ -1218,7 +1772,6 @@
               <a:rPr lang="en-US"/>
               <a:t>Fifth level</a:t>
             </a:r>
-            <a:endParaRPr lang="en-US" dirty="0"/>
           </a:p>
         </p:txBody>
       </p:sp>
@@ -1237,11 +1790,12 @@
           <a:bodyPr/>
           <a:lstStyle/>
           <a:p>
-            <a:fld id="{4EFE2193-3B2A-43CE-A067-88969492A3B6}" type="datetimeFigureOut">
-              <a:rPr lang="id-ID" smtClean="0"/>
-              <a:t>08/11/2025</a:t>
+            <a:fld id="{378A028A-B623-4C5B-AF5C-862C1110FA74}" type="datetimeFigureOut">
+              <a:rPr lang="en-US" smtClean="0"/>
+              <a:pPr/>
+              <a:t>11/12/2025</a:t>
             </a:fld>
-            <a:endParaRPr lang="id-ID"/>
+            <a:endParaRPr lang="en-US"/>
           </a:p>
         </p:txBody>
       </p:sp>
@@ -1260,7 +1814,7 @@
           <a:bodyPr/>
           <a:lstStyle/>
           <a:p>
-            <a:endParaRPr lang="id-ID"/>
+            <a:endParaRPr lang="en-US"/>
           </a:p>
         </p:txBody>
       </p:sp>
@@ -1279,18 +1833,19 @@
           <a:bodyPr/>
           <a:lstStyle/>
           <a:p>
-            <a:fld id="{46DAC2AE-923F-4313-B289-0CA4A941956D}" type="slidenum">
-              <a:rPr lang="id-ID" smtClean="0"/>
+            <a:fld id="{755187AC-92FF-4BB7-99EB-38054C83B86D}" type="slidenum">
+              <a:rPr lang="en-US" smtClean="0"/>
+              <a:pPr/>
               <a:t>‹#›</a:t>
             </a:fld>
-            <a:endParaRPr lang="id-ID"/>
+            <a:endParaRPr lang="en-US"/>
           </a:p>
         </p:txBody>
       </p:sp>
     </p:spTree>
     <p:extLst>
       <p:ext uri="{BB962C8B-B14F-4D97-AF65-F5344CB8AC3E}">
-        <p14:creationId xmlns:p14="http://schemas.microsoft.com/office/powerpoint/2010/main" val="2798558292"/>
+        <p14:creationId xmlns:p14="http://schemas.microsoft.com/office/powerpoint/2010/main" val="2695151767"/>
       </p:ext>
     </p:extLst>
   </p:cSld>
@@ -1327,38 +1882,36 @@
             <p:ph type="title"/>
           </p:nvPr>
         </p:nvSpPr>
+        <p:spPr/>
+        <p:txBody>
+          <a:bodyPr/>
+          <a:lstStyle>
+            <a:lvl1pPr>
+              <a:defRPr/>
+            </a:lvl1pPr>
+          </a:lstStyle>
+          <a:p>
+            <a:r>
+              <a:rPr lang="en-US"/>
+              <a:t>Click to edit Master title style</a:t>
+            </a:r>
+          </a:p>
+        </p:txBody>
+      </p:sp>
+      <p:sp>
+        <p:nvSpPr>
+          <p:cNvPr id="3" name="Text Placeholder 2"/>
+          <p:cNvSpPr>
+            <a:spLocks noGrp="1"/>
+          </p:cNvSpPr>
+          <p:nvPr>
+            <p:ph type="body" idx="1"/>
+          </p:nvPr>
+        </p:nvSpPr>
         <p:spPr>
           <a:xfrm>
-            <a:off x="629841" y="365126"/>
-            <a:ext cx="7886700" cy="1325563"/>
-          </a:xfrm>
-        </p:spPr>
-        <p:txBody>
-          <a:bodyPr/>
-          <a:lstStyle/>
-          <a:p>
-            <a:r>
-              <a:rPr lang="en-US"/>
-              <a:t>Click to edit Master title style</a:t>
-            </a:r>
-            <a:endParaRPr lang="en-US" dirty="0"/>
-          </a:p>
-        </p:txBody>
-      </p:sp>
-      <p:sp>
-        <p:nvSpPr>
-          <p:cNvPr id="3" name="Text Placeholder 2"/>
-          <p:cNvSpPr>
-            <a:spLocks noGrp="1"/>
-          </p:cNvSpPr>
-          <p:nvPr>
-            <p:ph type="body" idx="1"/>
-          </p:nvPr>
-        </p:nvSpPr>
-        <p:spPr>
-          <a:xfrm>
-            <a:off x="629842" y="1681163"/>
-            <a:ext cx="3868340" cy="823912"/>
+            <a:off x="457200" y="1535113"/>
+            <a:ext cx="4040188" cy="639762"/>
           </a:xfrm>
         </p:spPr>
         <p:txBody>
@@ -1422,13 +1975,41 @@
         </p:nvSpPr>
         <p:spPr>
           <a:xfrm>
-            <a:off x="629842" y="2505075"/>
-            <a:ext cx="3868340" cy="3684588"/>
+            <a:off x="457200" y="2174875"/>
+            <a:ext cx="4040188" cy="3951288"/>
           </a:xfrm>
         </p:spPr>
         <p:txBody>
           <a:bodyPr/>
-          <a:lstStyle/>
+          <a:lstStyle>
+            <a:lvl1pPr>
+              <a:defRPr sz="2400"/>
+            </a:lvl1pPr>
+            <a:lvl2pPr>
+              <a:defRPr sz="2000"/>
+            </a:lvl2pPr>
+            <a:lvl3pPr>
+              <a:defRPr sz="1800"/>
+            </a:lvl3pPr>
+            <a:lvl4pPr>
+              <a:defRPr sz="1600"/>
+            </a:lvl4pPr>
+            <a:lvl5pPr>
+              <a:defRPr sz="1600"/>
+            </a:lvl5pPr>
+            <a:lvl6pPr>
+              <a:defRPr sz="1600"/>
+            </a:lvl6pPr>
+            <a:lvl7pPr>
+              <a:defRPr sz="1600"/>
+            </a:lvl7pPr>
+            <a:lvl8pPr>
+              <a:defRPr sz="1600"/>
+            </a:lvl8pPr>
+            <a:lvl9pPr>
+              <a:defRPr sz="1600"/>
+            </a:lvl9pPr>
+          </a:lstStyle>
           <a:p>
             <a:pPr lvl="0"/>
             <a:r>
@@ -1463,7 +2044,6 @@
               <a:rPr lang="en-US"/>
               <a:t>Fifth level</a:t>
             </a:r>
-            <a:endParaRPr lang="en-US" dirty="0"/>
           </a:p>
         </p:txBody>
       </p:sp>
@@ -1479,8 +2059,8 @@
         </p:nvSpPr>
         <p:spPr>
           <a:xfrm>
-            <a:off x="4629150" y="1681163"/>
-            <a:ext cx="3887391" cy="823912"/>
+            <a:off x="4645025" y="1535113"/>
+            <a:ext cx="4041775" cy="639762"/>
           </a:xfrm>
         </p:spPr>
         <p:txBody>
@@ -1544,13 +2124,41 @@
         </p:nvSpPr>
         <p:spPr>
           <a:xfrm>
-            <a:off x="4629150" y="2505075"/>
-            <a:ext cx="3887391" cy="3684588"/>
+            <a:off x="4645025" y="2174875"/>
+            <a:ext cx="4041775" cy="3951288"/>
           </a:xfrm>
         </p:spPr>
         <p:txBody>
           <a:bodyPr/>
-          <a:lstStyle/>
+          <a:lstStyle>
+            <a:lvl1pPr>
+              <a:defRPr sz="2400"/>
+            </a:lvl1pPr>
+            <a:lvl2pPr>
+              <a:defRPr sz="2000"/>
+            </a:lvl2pPr>
+            <a:lvl3pPr>
+              <a:defRPr sz="1800"/>
+            </a:lvl3pPr>
+            <a:lvl4pPr>
+              <a:defRPr sz="1600"/>
+            </a:lvl4pPr>
+            <a:lvl5pPr>
+              <a:defRPr sz="1600"/>
+            </a:lvl5pPr>
+            <a:lvl6pPr>
+              <a:defRPr sz="1600"/>
+            </a:lvl6pPr>
+            <a:lvl7pPr>
+              <a:defRPr sz="1600"/>
+            </a:lvl7pPr>
+            <a:lvl8pPr>
+              <a:defRPr sz="1600"/>
+            </a:lvl8pPr>
+            <a:lvl9pPr>
+              <a:defRPr sz="1600"/>
+            </a:lvl9pPr>
+          </a:lstStyle>
           <a:p>
             <a:pPr lvl="0"/>
             <a:r>
@@ -1585,7 +2193,6 @@
               <a:rPr lang="en-US"/>
               <a:t>Fifth level</a:t>
             </a:r>
-            <a:endParaRPr lang="en-US" dirty="0"/>
           </a:p>
         </p:txBody>
       </p:sp>
@@ -1604,11 +2211,12 @@
           <a:bodyPr/>
           <a:lstStyle/>
           <a:p>
-            <a:fld id="{4EFE2193-3B2A-43CE-A067-88969492A3B6}" type="datetimeFigureOut">
-              <a:rPr lang="id-ID" smtClean="0"/>
-              <a:t>08/11/2025</a:t>
+            <a:fld id="{378A028A-B623-4C5B-AF5C-862C1110FA74}" type="datetimeFigureOut">
+              <a:rPr lang="en-US" smtClean="0"/>
+              <a:pPr/>
+              <a:t>11/12/2025</a:t>
             </a:fld>
-            <a:endParaRPr lang="id-ID"/>
+            <a:endParaRPr lang="en-US"/>
           </a:p>
         </p:txBody>
       </p:sp>
@@ -1627,7 +2235,7 @@
           <a:bodyPr/>
           <a:lstStyle/>
           <a:p>
-            <a:endParaRPr lang="id-ID"/>
+            <a:endParaRPr lang="en-US"/>
           </a:p>
         </p:txBody>
       </p:sp>
@@ -1646,18 +2254,19 @@
           <a:bodyPr/>
           <a:lstStyle/>
           <a:p>
-            <a:fld id="{46DAC2AE-923F-4313-B289-0CA4A941956D}" type="slidenum">
-              <a:rPr lang="id-ID" smtClean="0"/>
+            <a:fld id="{755187AC-92FF-4BB7-99EB-38054C83B86D}" type="slidenum">
+              <a:rPr lang="en-US" smtClean="0"/>
+              <a:pPr/>
               <a:t>‹#›</a:t>
             </a:fld>
-            <a:endParaRPr lang="id-ID"/>
+            <a:endParaRPr lang="en-US"/>
           </a:p>
         </p:txBody>
       </p:sp>
     </p:spTree>
     <p:extLst>
       <p:ext uri="{BB962C8B-B14F-4D97-AF65-F5344CB8AC3E}">
-        <p14:creationId xmlns:p14="http://schemas.microsoft.com/office/powerpoint/2010/main" val="737912227"/>
+        <p14:creationId xmlns:p14="http://schemas.microsoft.com/office/powerpoint/2010/main" val="620297872"/>
       </p:ext>
     </p:extLst>
   </p:cSld>
@@ -1703,7 +2312,6 @@
               <a:rPr lang="en-US"/>
               <a:t>Click to edit Master title style</a:t>
             </a:r>
-            <a:endParaRPr lang="en-US" dirty="0"/>
           </a:p>
         </p:txBody>
       </p:sp>
@@ -1722,11 +2330,12 @@
           <a:bodyPr/>
           <a:lstStyle/>
           <a:p>
-            <a:fld id="{4EFE2193-3B2A-43CE-A067-88969492A3B6}" type="datetimeFigureOut">
-              <a:rPr lang="id-ID" smtClean="0"/>
-              <a:t>08/11/2025</a:t>
+            <a:fld id="{378A028A-B623-4C5B-AF5C-862C1110FA74}" type="datetimeFigureOut">
+              <a:rPr lang="en-US" smtClean="0"/>
+              <a:pPr/>
+              <a:t>11/12/2025</a:t>
             </a:fld>
-            <a:endParaRPr lang="id-ID"/>
+            <a:endParaRPr lang="en-US"/>
           </a:p>
         </p:txBody>
       </p:sp>
@@ -1745,7 +2354,7 @@
           <a:bodyPr/>
           <a:lstStyle/>
           <a:p>
-            <a:endParaRPr lang="id-ID"/>
+            <a:endParaRPr lang="en-US"/>
           </a:p>
         </p:txBody>
       </p:sp>
@@ -1764,18 +2373,19 @@
           <a:bodyPr/>
           <a:lstStyle/>
           <a:p>
-            <a:fld id="{46DAC2AE-923F-4313-B289-0CA4A941956D}" type="slidenum">
-              <a:rPr lang="id-ID" smtClean="0"/>
+            <a:fld id="{755187AC-92FF-4BB7-99EB-38054C83B86D}" type="slidenum">
+              <a:rPr lang="en-US" smtClean="0"/>
+              <a:pPr/>
               <a:t>‹#›</a:t>
             </a:fld>
-            <a:endParaRPr lang="id-ID"/>
+            <a:endParaRPr lang="en-US"/>
           </a:p>
         </p:txBody>
       </p:sp>
     </p:spTree>
     <p:extLst>
       <p:ext uri="{BB962C8B-B14F-4D97-AF65-F5344CB8AC3E}">
-        <p14:creationId xmlns:p14="http://schemas.microsoft.com/office/powerpoint/2010/main" val="2039356209"/>
+        <p14:creationId xmlns:p14="http://schemas.microsoft.com/office/powerpoint/2010/main" val="2795225503"/>
       </p:ext>
     </p:extLst>
   </p:cSld>
@@ -1817,11 +2427,12 @@
           <a:bodyPr/>
           <a:lstStyle/>
           <a:p>
-            <a:fld id="{4EFE2193-3B2A-43CE-A067-88969492A3B6}" type="datetimeFigureOut">
-              <a:rPr lang="id-ID" smtClean="0"/>
-              <a:t>08/11/2025</a:t>
+            <a:fld id="{378A028A-B623-4C5B-AF5C-862C1110FA74}" type="datetimeFigureOut">
+              <a:rPr lang="en-US" smtClean="0"/>
+              <a:pPr/>
+              <a:t>11/12/2025</a:t>
             </a:fld>
-            <a:endParaRPr lang="id-ID"/>
+            <a:endParaRPr lang="en-US"/>
           </a:p>
         </p:txBody>
       </p:sp>
@@ -1840,7 +2451,7 @@
           <a:bodyPr/>
           <a:lstStyle/>
           <a:p>
-            <a:endParaRPr lang="id-ID"/>
+            <a:endParaRPr lang="en-US"/>
           </a:p>
         </p:txBody>
       </p:sp>
@@ -1859,18 +2470,19 @@
           <a:bodyPr/>
           <a:lstStyle/>
           <a:p>
-            <a:fld id="{46DAC2AE-923F-4313-B289-0CA4A941956D}" type="slidenum">
-              <a:rPr lang="id-ID" smtClean="0"/>
+            <a:fld id="{755187AC-92FF-4BB7-99EB-38054C83B86D}" type="slidenum">
+              <a:rPr lang="en-US" smtClean="0"/>
+              <a:pPr/>
               <a:t>‹#›</a:t>
             </a:fld>
-            <a:endParaRPr lang="id-ID"/>
+            <a:endParaRPr lang="en-US"/>
           </a:p>
         </p:txBody>
       </p:sp>
     </p:spTree>
     <p:extLst>
       <p:ext uri="{BB962C8B-B14F-4D97-AF65-F5344CB8AC3E}">
-        <p14:creationId xmlns:p14="http://schemas.microsoft.com/office/powerpoint/2010/main" val="1878055254"/>
+        <p14:creationId xmlns:p14="http://schemas.microsoft.com/office/powerpoint/2010/main" val="1472093282"/>
       </p:ext>
     </p:extLst>
   </p:cSld>
@@ -1909,15 +2521,15 @@
         </p:nvSpPr>
         <p:spPr>
           <a:xfrm>
-            <a:off x="629841" y="457200"/>
-            <a:ext cx="2949178" cy="1600200"/>
+            <a:off x="457200" y="273050"/>
+            <a:ext cx="3008313" cy="1162050"/>
           </a:xfrm>
         </p:spPr>
         <p:txBody>
           <a:bodyPr anchor="b"/>
           <a:lstStyle>
-            <a:lvl1pPr>
-              <a:defRPr sz="3200"/>
+            <a:lvl1pPr algn="l">
+              <a:defRPr sz="2000" b="1"/>
             </a:lvl1pPr>
           </a:lstStyle>
           <a:p>
@@ -1925,7 +2537,6 @@
               <a:rPr lang="en-US"/>
               <a:t>Click to edit Master title style</a:t>
             </a:r>
-            <a:endParaRPr lang="en-US" dirty="0"/>
           </a:p>
         </p:txBody>
       </p:sp>
@@ -1941,8 +2552,8 @@
         </p:nvSpPr>
         <p:spPr>
           <a:xfrm>
-            <a:off x="3887391" y="987426"/>
-            <a:ext cx="4629150" cy="4873625"/>
+            <a:off x="3575050" y="273050"/>
+            <a:ext cx="5111750" cy="5853113"/>
           </a:xfrm>
         </p:spPr>
         <p:txBody>
@@ -2010,7 +2621,6 @@
               <a:rPr lang="en-US"/>
               <a:t>Fifth level</a:t>
             </a:r>
-            <a:endParaRPr lang="en-US" dirty="0"/>
           </a:p>
         </p:txBody>
       </p:sp>
@@ -2026,8 +2636,8 @@
         </p:nvSpPr>
         <p:spPr>
           <a:xfrm>
-            <a:off x="629841" y="2057400"/>
-            <a:ext cx="2949178" cy="3811588"/>
+            <a:off x="457200" y="1435100"/>
+            <a:ext cx="3008313" cy="4691063"/>
           </a:xfrm>
         </p:spPr>
         <p:txBody>
@@ -2035,39 +2645,39 @@
           <a:lstStyle>
             <a:lvl1pPr marL="0" indent="0">
               <a:buNone/>
-              <a:defRPr sz="1600"/>
+              <a:defRPr sz="1400"/>
             </a:lvl1pPr>
             <a:lvl2pPr marL="457200" indent="0">
               <a:buNone/>
-              <a:defRPr sz="1400"/>
+              <a:defRPr sz="1200"/>
             </a:lvl2pPr>
             <a:lvl3pPr marL="914400" indent="0">
               <a:buNone/>
-              <a:defRPr sz="1200"/>
+              <a:defRPr sz="1000"/>
             </a:lvl3pPr>
             <a:lvl4pPr marL="1371600" indent="0">
               <a:buNone/>
-              <a:defRPr sz="1000"/>
+              <a:defRPr sz="900"/>
             </a:lvl4pPr>
             <a:lvl5pPr marL="1828800" indent="0">
               <a:buNone/>
-              <a:defRPr sz="1000"/>
+              <a:defRPr sz="900"/>
             </a:lvl5pPr>
             <a:lvl6pPr marL="2286000" indent="0">
               <a:buNone/>
-              <a:defRPr sz="1000"/>
+              <a:defRPr sz="900"/>
             </a:lvl6pPr>
             <a:lvl7pPr marL="2743200" indent="0">
               <a:buNone/>
-              <a:defRPr sz="1000"/>
+              <a:defRPr sz="900"/>
             </a:lvl7pPr>
             <a:lvl8pPr marL="3200400" indent="0">
               <a:buNone/>
-              <a:defRPr sz="1000"/>
+              <a:defRPr sz="900"/>
             </a:lvl8pPr>
             <a:lvl9pPr marL="3657600" indent="0">
               <a:buNone/>
-              <a:defRPr sz="1000"/>
+              <a:defRPr sz="900"/>
             </a:lvl9pPr>
           </a:lstStyle>
           <a:p>
@@ -2094,11 +2704,12 @@
           <a:bodyPr/>
           <a:lstStyle/>
           <a:p>
-            <a:fld id="{4EFE2193-3B2A-43CE-A067-88969492A3B6}" type="datetimeFigureOut">
-              <a:rPr lang="id-ID" smtClean="0"/>
-              <a:t>08/11/2025</a:t>
+            <a:fld id="{378A028A-B623-4C5B-AF5C-862C1110FA74}" type="datetimeFigureOut">
+              <a:rPr lang="en-US" smtClean="0"/>
+              <a:pPr/>
+              <a:t>11/12/2025</a:t>
             </a:fld>
-            <a:endParaRPr lang="id-ID"/>
+            <a:endParaRPr lang="en-US"/>
           </a:p>
         </p:txBody>
       </p:sp>
@@ -2117,7 +2728,7 @@
           <a:bodyPr/>
           <a:lstStyle/>
           <a:p>
-            <a:endParaRPr lang="id-ID"/>
+            <a:endParaRPr lang="en-US"/>
           </a:p>
         </p:txBody>
       </p:sp>
@@ -2136,18 +2747,19 @@
           <a:bodyPr/>
           <a:lstStyle/>
           <a:p>
-            <a:fld id="{46DAC2AE-923F-4313-B289-0CA4A941956D}" type="slidenum">
-              <a:rPr lang="id-ID" smtClean="0"/>
+            <a:fld id="{755187AC-92FF-4BB7-99EB-38054C83B86D}" type="slidenum">
+              <a:rPr lang="en-US" smtClean="0"/>
+              <a:pPr/>
               <a:t>‹#›</a:t>
             </a:fld>
-            <a:endParaRPr lang="id-ID"/>
+            <a:endParaRPr lang="en-US"/>
           </a:p>
         </p:txBody>
       </p:sp>
     </p:spTree>
     <p:extLst>
       <p:ext uri="{BB962C8B-B14F-4D97-AF65-F5344CB8AC3E}">
-        <p14:creationId xmlns:p14="http://schemas.microsoft.com/office/powerpoint/2010/main" val="2019485168"/>
+        <p14:creationId xmlns:p14="http://schemas.microsoft.com/office/powerpoint/2010/main" val="4068561352"/>
       </p:ext>
     </p:extLst>
   </p:cSld>
@@ -2186,15 +2798,15 @@
         </p:nvSpPr>
         <p:spPr>
           <a:xfrm>
-            <a:off x="629841" y="457200"/>
-            <a:ext cx="2949178" cy="1600200"/>
+            <a:off x="1792288" y="4800600"/>
+            <a:ext cx="5486400" cy="566738"/>
           </a:xfrm>
         </p:spPr>
         <p:txBody>
           <a:bodyPr anchor="b"/>
           <a:lstStyle>
-            <a:lvl1pPr>
-              <a:defRPr sz="3200"/>
+            <a:lvl1pPr algn="l">
+              <a:defRPr sz="2000" b="1"/>
             </a:lvl1pPr>
           </a:lstStyle>
           <a:p>
@@ -2202,7 +2814,6 @@
               <a:rPr lang="en-US"/>
               <a:t>Click to edit Master title style</a:t>
             </a:r>
-            <a:endParaRPr lang="en-US" dirty="0"/>
           </a:p>
         </p:txBody>
       </p:sp>
@@ -2210,7 +2821,7 @@
         <p:nvSpPr>
           <p:cNvPr id="3" name="Picture Placeholder 2"/>
           <p:cNvSpPr>
-            <a:spLocks noGrp="1" noChangeAspect="1"/>
+            <a:spLocks noGrp="1"/>
           </p:cNvSpPr>
           <p:nvPr>
             <p:ph type="pic" idx="1"/>
@@ -2218,12 +2829,12 @@
         </p:nvSpPr>
         <p:spPr>
           <a:xfrm>
-            <a:off x="3887391" y="987426"/>
-            <a:ext cx="4629150" cy="4873625"/>
+            <a:off x="1792288" y="612775"/>
+            <a:ext cx="5486400" cy="4114800"/>
           </a:xfrm>
         </p:spPr>
         <p:txBody>
-          <a:bodyPr anchor="t"/>
+          <a:bodyPr/>
           <a:lstStyle>
             <a:lvl1pPr marL="0" indent="0">
               <a:buNone/>
@@ -2263,11 +2874,7 @@
             </a:lvl9pPr>
           </a:lstStyle>
           <a:p>
-            <a:r>
-              <a:rPr lang="en-US"/>
-              <a:t>Click icon to add picture</a:t>
-            </a:r>
-            <a:endParaRPr lang="en-US" dirty="0"/>
+            <a:endParaRPr lang="en-US"/>
           </a:p>
         </p:txBody>
       </p:sp>
@@ -2283,8 +2890,8 @@
         </p:nvSpPr>
         <p:spPr>
           <a:xfrm>
-            <a:off x="629841" y="2057400"/>
-            <a:ext cx="2949178" cy="3811588"/>
+            <a:off x="1792288" y="5367338"/>
+            <a:ext cx="5486400" cy="804862"/>
           </a:xfrm>
         </p:spPr>
         <p:txBody>
@@ -2292,39 +2899,39 @@
           <a:lstStyle>
             <a:lvl1pPr marL="0" indent="0">
               <a:buNone/>
-              <a:defRPr sz="1600"/>
+              <a:defRPr sz="1400"/>
             </a:lvl1pPr>
             <a:lvl2pPr marL="457200" indent="0">
               <a:buNone/>
-              <a:defRPr sz="1400"/>
+              <a:defRPr sz="1200"/>
             </a:lvl2pPr>
             <a:lvl3pPr marL="914400" indent="0">
               <a:buNone/>
-              <a:defRPr sz="1200"/>
+              <a:defRPr sz="1000"/>
             </a:lvl3pPr>
             <a:lvl4pPr marL="1371600" indent="0">
               <a:buNone/>
-              <a:defRPr sz="1000"/>
+              <a:defRPr sz="900"/>
             </a:lvl4pPr>
             <a:lvl5pPr marL="1828800" indent="0">
               <a:buNone/>
-              <a:defRPr sz="1000"/>
+              <a:defRPr sz="900"/>
             </a:lvl5pPr>
             <a:lvl6pPr marL="2286000" indent="0">
               <a:buNone/>
-              <a:defRPr sz="1000"/>
+              <a:defRPr sz="900"/>
             </a:lvl6pPr>
             <a:lvl7pPr marL="2743200" indent="0">
               <a:buNone/>
-              <a:defRPr sz="1000"/>
+              <a:defRPr sz="900"/>
             </a:lvl7pPr>
             <a:lvl8pPr marL="3200400" indent="0">
               <a:buNone/>
-              <a:defRPr sz="1000"/>
+              <a:defRPr sz="900"/>
             </a:lvl8pPr>
             <a:lvl9pPr marL="3657600" indent="0">
               <a:buNone/>
-              <a:defRPr sz="1000"/>
+              <a:defRPr sz="900"/>
             </a:lvl9pPr>
           </a:lstStyle>
           <a:p>
@@ -2351,11 +2958,12 @@
           <a:bodyPr/>
           <a:lstStyle/>
           <a:p>
-            <a:fld id="{4EFE2193-3B2A-43CE-A067-88969492A3B6}" type="datetimeFigureOut">
-              <a:rPr lang="id-ID" smtClean="0"/>
-              <a:t>08/11/2025</a:t>
+            <a:fld id="{378A028A-B623-4C5B-AF5C-862C1110FA74}" type="datetimeFigureOut">
+              <a:rPr lang="en-US" smtClean="0"/>
+              <a:pPr/>
+              <a:t>11/12/2025</a:t>
             </a:fld>
-            <a:endParaRPr lang="id-ID"/>
+            <a:endParaRPr lang="en-US"/>
           </a:p>
         </p:txBody>
       </p:sp>
@@ -2374,7 +2982,7 @@
           <a:bodyPr/>
           <a:lstStyle/>
           <a:p>
-            <a:endParaRPr lang="id-ID"/>
+            <a:endParaRPr lang="en-US"/>
           </a:p>
         </p:txBody>
       </p:sp>
@@ -2393,18 +3001,19 @@
           <a:bodyPr/>
           <a:lstStyle/>
           <a:p>
-            <a:fld id="{46DAC2AE-923F-4313-B289-0CA4A941956D}" type="slidenum">
-              <a:rPr lang="id-ID" smtClean="0"/>
+            <a:fld id="{755187AC-92FF-4BB7-99EB-38054C83B86D}" type="slidenum">
+              <a:rPr lang="en-US" smtClean="0"/>
+              <a:pPr/>
               <a:t>‹#›</a:t>
             </a:fld>
-            <a:endParaRPr lang="id-ID"/>
+            <a:endParaRPr lang="en-US"/>
           </a:p>
         </p:txBody>
       </p:sp>
     </p:spTree>
     <p:extLst>
       <p:ext uri="{BB962C8B-B14F-4D97-AF65-F5344CB8AC3E}">
-        <p14:creationId xmlns:p14="http://schemas.microsoft.com/office/powerpoint/2010/main" val="2615253616"/>
+        <p14:creationId xmlns:p14="http://schemas.microsoft.com/office/powerpoint/2010/main" val="836224124"/>
       </p:ext>
     </p:extLst>
   </p:cSld>
@@ -2448,8 +3057,8 @@
         </p:nvSpPr>
         <p:spPr>
           <a:xfrm>
-            <a:off x="628650" y="365126"/>
-            <a:ext cx="7886700" cy="1325563"/>
+            <a:off x="457200" y="274638"/>
+            <a:ext cx="8229600" cy="1143000"/>
           </a:xfrm>
           <a:prstGeom prst="rect">
             <a:avLst/>
@@ -2465,7 +3074,6 @@
               <a:rPr lang="en-US"/>
               <a:t>Click to edit Master title style</a:t>
             </a:r>
-            <a:endParaRPr lang="en-US" dirty="0"/>
           </a:p>
         </p:txBody>
       </p:sp>
@@ -2481,8 +3089,8 @@
         </p:nvSpPr>
         <p:spPr>
           <a:xfrm>
-            <a:off x="628650" y="1825625"/>
-            <a:ext cx="7886700" cy="4351338"/>
+            <a:off x="457200" y="1600200"/>
+            <a:ext cx="8229600" cy="4525963"/>
           </a:xfrm>
           <a:prstGeom prst="rect">
             <a:avLst/>
@@ -2527,7 +3135,6 @@
               <a:rPr lang="en-US"/>
               <a:t>Fifth level</a:t>
             </a:r>
-            <a:endParaRPr lang="en-US" dirty="0"/>
           </a:p>
         </p:txBody>
       </p:sp>
@@ -2543,8 +3150,8 @@
         </p:nvSpPr>
         <p:spPr>
           <a:xfrm>
-            <a:off x="628650" y="6356351"/>
-            <a:ext cx="2057400" cy="365125"/>
+            <a:off x="457200" y="6356350"/>
+            <a:ext cx="2133600" cy="365125"/>
           </a:xfrm>
           <a:prstGeom prst="rect">
             <a:avLst/>
@@ -2564,11 +3171,12 @@
             </a:lvl1pPr>
           </a:lstStyle>
           <a:p>
-            <a:fld id="{4EFE2193-3B2A-43CE-A067-88969492A3B6}" type="datetimeFigureOut">
-              <a:rPr lang="id-ID" smtClean="0"/>
-              <a:t>08/11/2025</a:t>
+            <a:fld id="{378A028A-B623-4C5B-AF5C-862C1110FA74}" type="datetimeFigureOut">
+              <a:rPr lang="en-US" smtClean="0"/>
+              <a:pPr/>
+              <a:t>11/12/2025</a:t>
             </a:fld>
-            <a:endParaRPr lang="id-ID"/>
+            <a:endParaRPr lang="en-US"/>
           </a:p>
         </p:txBody>
       </p:sp>
@@ -2584,8 +3192,8 @@
         </p:nvSpPr>
         <p:spPr>
           <a:xfrm>
-            <a:off x="3028950" y="6356351"/>
-            <a:ext cx="3086100" cy="365125"/>
+            <a:off x="3124200" y="6356350"/>
+            <a:ext cx="2895600" cy="365125"/>
           </a:xfrm>
           <a:prstGeom prst="rect">
             <a:avLst/>
@@ -2605,7 +3213,7 @@
             </a:lvl1pPr>
           </a:lstStyle>
           <a:p>
-            <a:endParaRPr lang="id-ID"/>
+            <a:endParaRPr lang="en-US"/>
           </a:p>
         </p:txBody>
       </p:sp>
@@ -2621,8 +3229,8 @@
         </p:nvSpPr>
         <p:spPr>
           <a:xfrm>
-            <a:off x="6457950" y="6356351"/>
-            <a:ext cx="2057400" cy="365125"/>
+            <a:off x="6553200" y="6356350"/>
+            <a:ext cx="2133600" cy="365125"/>
           </a:xfrm>
           <a:prstGeom prst="rect">
             <a:avLst/>
@@ -2642,41 +3250,39 @@
             </a:lvl1pPr>
           </a:lstStyle>
           <a:p>
-            <a:fld id="{46DAC2AE-923F-4313-B289-0CA4A941956D}" type="slidenum">
-              <a:rPr lang="id-ID" smtClean="0"/>
+            <a:fld id="{755187AC-92FF-4BB7-99EB-38054C83B86D}" type="slidenum">
+              <a:rPr lang="en-US" smtClean="0"/>
+              <a:pPr/>
               <a:t>‹#›</a:t>
             </a:fld>
-            <a:endParaRPr lang="id-ID"/>
+            <a:endParaRPr lang="en-US"/>
           </a:p>
         </p:txBody>
       </p:sp>
     </p:spTree>
     <p:extLst>
       <p:ext uri="{BB962C8B-B14F-4D97-AF65-F5344CB8AC3E}">
-        <p14:creationId xmlns:p14="http://schemas.microsoft.com/office/powerpoint/2010/main" val="69365136"/>
+        <p14:creationId xmlns:p14="http://schemas.microsoft.com/office/powerpoint/2010/main" val="1656696286"/>
       </p:ext>
     </p:extLst>
   </p:cSld>
   <p:clrMap bg1="lt1" tx1="dk1" bg2="lt2" tx2="dk2" accent1="accent1" accent2="accent2" accent3="accent3" accent4="accent4" accent5="accent5" accent6="accent6" hlink="hlink" folHlink="folHlink"/>
   <p:sldLayoutIdLst>
-    <p:sldLayoutId id="2147483661" r:id="rId1"/>
-    <p:sldLayoutId id="2147483662" r:id="rId2"/>
-    <p:sldLayoutId id="2147483663" r:id="rId3"/>
-    <p:sldLayoutId id="2147483664" r:id="rId4"/>
-    <p:sldLayoutId id="2147483665" r:id="rId5"/>
-    <p:sldLayoutId id="2147483666" r:id="rId6"/>
-    <p:sldLayoutId id="2147483667" r:id="rId7"/>
-    <p:sldLayoutId id="2147483668" r:id="rId8"/>
-    <p:sldLayoutId id="2147483669" r:id="rId9"/>
-    <p:sldLayoutId id="2147483670" r:id="rId10"/>
-    <p:sldLayoutId id="2147483671" r:id="rId11"/>
+    <p:sldLayoutId id="2147483649" r:id="rId1"/>
+    <p:sldLayoutId id="2147483650" r:id="rId2"/>
+    <p:sldLayoutId id="2147483651" r:id="rId3"/>
+    <p:sldLayoutId id="2147483652" r:id="rId4"/>
+    <p:sldLayoutId id="2147483653" r:id="rId5"/>
+    <p:sldLayoutId id="2147483654" r:id="rId6"/>
+    <p:sldLayoutId id="2147483655" r:id="rId7"/>
+    <p:sldLayoutId id="2147483656" r:id="rId8"/>
+    <p:sldLayoutId id="2147483657" r:id="rId9"/>
+    <p:sldLayoutId id="2147483658" r:id="rId10"/>
+    <p:sldLayoutId id="2147483659" r:id="rId11"/>
   </p:sldLayoutIdLst>
   <p:txStyles>
     <p:titleStyle>
-      <a:lvl1pPr algn="l" defTabSz="914400" rtl="0" eaLnBrk="1" latinLnBrk="0" hangingPunct="1">
-        <a:lnSpc>
-          <a:spcPct val="90000"/>
-        </a:lnSpc>
+      <a:lvl1pPr algn="ctr" defTabSz="914400" rtl="0" eaLnBrk="1" latinLnBrk="0" hangingPunct="1">
         <a:spcBef>
           <a:spcPct val="0"/>
         </a:spcBef>
@@ -2692,15 +3298,27 @@
       </a:lvl1pPr>
     </p:titleStyle>
     <p:bodyStyle>
-      <a:lvl1pPr marL="228600" indent="-228600" algn="l" defTabSz="914400" rtl="0" eaLnBrk="1" latinLnBrk="0" hangingPunct="1">
-        <a:lnSpc>
-          <a:spcPct val="90000"/>
-        </a:lnSpc>
+      <a:lvl1pPr marL="342900" indent="-342900" algn="l" defTabSz="914400" rtl="0" eaLnBrk="1" latinLnBrk="0" hangingPunct="1">
         <a:spcBef>
-          <a:spcPts val="1000"/>
+          <a:spcPct val="20000"/>
         </a:spcBef>
         <a:buFont typeface="Arial" panose="020B0604020202020204" pitchFamily="34" charset="0"/>
         <a:buChar char="•"/>
+        <a:defRPr sz="3200" kern="1200">
+          <a:solidFill>
+            <a:schemeClr val="tx1"/>
+          </a:solidFill>
+          <a:latin typeface="+mn-lt"/>
+          <a:ea typeface="+mn-ea"/>
+          <a:cs typeface="+mn-cs"/>
+        </a:defRPr>
+      </a:lvl1pPr>
+      <a:lvl2pPr marL="742950" indent="-285750" algn="l" defTabSz="914400" rtl="0" eaLnBrk="1" latinLnBrk="0" hangingPunct="1">
+        <a:spcBef>
+          <a:spcPct val="20000"/>
+        </a:spcBef>
+        <a:buFont typeface="Arial" panose="020B0604020202020204" pitchFamily="34" charset="0"/>
+        <a:buChar char="–"/>
         <a:defRPr sz="2800" kern="1200">
           <a:solidFill>
             <a:schemeClr val="tx1"/>
@@ -2709,13 +3327,10 @@
           <a:ea typeface="+mn-ea"/>
           <a:cs typeface="+mn-cs"/>
         </a:defRPr>
-      </a:lvl1pPr>
-      <a:lvl2pPr marL="685800" indent="-228600" algn="l" defTabSz="914400" rtl="0" eaLnBrk="1" latinLnBrk="0" hangingPunct="1">
-        <a:lnSpc>
-          <a:spcPct val="90000"/>
-        </a:lnSpc>
+      </a:lvl2pPr>
+      <a:lvl3pPr marL="1143000" indent="-228600" algn="l" defTabSz="914400" rtl="0" eaLnBrk="1" latinLnBrk="0" hangingPunct="1">
         <a:spcBef>
-          <a:spcPts val="500"/>
+          <a:spcPct val="20000"/>
         </a:spcBef>
         <a:buFont typeface="Arial" panose="020B0604020202020204" pitchFamily="34" charset="0"/>
         <a:buChar char="•"/>
@@ -2727,13 +3342,40 @@
           <a:ea typeface="+mn-ea"/>
           <a:cs typeface="+mn-cs"/>
         </a:defRPr>
-      </a:lvl2pPr>
-      <a:lvl3pPr marL="1143000" indent="-228600" algn="l" defTabSz="914400" rtl="0" eaLnBrk="1" latinLnBrk="0" hangingPunct="1">
-        <a:lnSpc>
-          <a:spcPct val="90000"/>
-        </a:lnSpc>
+      </a:lvl3pPr>
+      <a:lvl4pPr marL="1600200" indent="-228600" algn="l" defTabSz="914400" rtl="0" eaLnBrk="1" latinLnBrk="0" hangingPunct="1">
         <a:spcBef>
-          <a:spcPts val="500"/>
+          <a:spcPct val="20000"/>
+        </a:spcBef>
+        <a:buFont typeface="Arial" panose="020B0604020202020204" pitchFamily="34" charset="0"/>
+        <a:buChar char="–"/>
+        <a:defRPr sz="2000" kern="1200">
+          <a:solidFill>
+            <a:schemeClr val="tx1"/>
+          </a:solidFill>
+          <a:latin typeface="+mn-lt"/>
+          <a:ea typeface="+mn-ea"/>
+          <a:cs typeface="+mn-cs"/>
+        </a:defRPr>
+      </a:lvl4pPr>
+      <a:lvl5pPr marL="2057400" indent="-228600" algn="l" defTabSz="914400" rtl="0" eaLnBrk="1" latinLnBrk="0" hangingPunct="1">
+        <a:spcBef>
+          <a:spcPct val="20000"/>
+        </a:spcBef>
+        <a:buFont typeface="Arial" panose="020B0604020202020204" pitchFamily="34" charset="0"/>
+        <a:buChar char="»"/>
+        <a:defRPr sz="2000" kern="1200">
+          <a:solidFill>
+            <a:schemeClr val="tx1"/>
+          </a:solidFill>
+          <a:latin typeface="+mn-lt"/>
+          <a:ea typeface="+mn-ea"/>
+          <a:cs typeface="+mn-cs"/>
+        </a:defRPr>
+      </a:lvl5pPr>
+      <a:lvl6pPr marL="2514600" indent="-228600" algn="l" defTabSz="914400" rtl="0" eaLnBrk="1" latinLnBrk="0" hangingPunct="1">
+        <a:spcBef>
+          <a:spcPct val="20000"/>
         </a:spcBef>
         <a:buFont typeface="Arial" panose="020B0604020202020204" pitchFamily="34" charset="0"/>
         <a:buChar char="•"/>
@@ -2745,71 +3387,14 @@
           <a:ea typeface="+mn-ea"/>
           <a:cs typeface="+mn-cs"/>
         </a:defRPr>
-      </a:lvl3pPr>
-      <a:lvl4pPr marL="1600200" indent="-228600" algn="l" defTabSz="914400" rtl="0" eaLnBrk="1" latinLnBrk="0" hangingPunct="1">
-        <a:lnSpc>
-          <a:spcPct val="90000"/>
-        </a:lnSpc>
+      </a:lvl6pPr>
+      <a:lvl7pPr marL="2971800" indent="-228600" algn="l" defTabSz="914400" rtl="0" eaLnBrk="1" latinLnBrk="0" hangingPunct="1">
         <a:spcBef>
-          <a:spcPts val="500"/>
+          <a:spcPct val="20000"/>
         </a:spcBef>
         <a:buFont typeface="Arial" panose="020B0604020202020204" pitchFamily="34" charset="0"/>
         <a:buChar char="•"/>
-        <a:defRPr sz="1800" kern="1200">
-          <a:solidFill>
-            <a:schemeClr val="tx1"/>
-          </a:solidFill>
-          <a:latin typeface="+mn-lt"/>
-          <a:ea typeface="+mn-ea"/>
-          <a:cs typeface="+mn-cs"/>
-        </a:defRPr>
-      </a:lvl4pPr>
-      <a:lvl5pPr marL="2057400" indent="-228600" algn="l" defTabSz="914400" rtl="0" eaLnBrk="1" latinLnBrk="0" hangingPunct="1">
-        <a:lnSpc>
-          <a:spcPct val="90000"/>
-        </a:lnSpc>
-        <a:spcBef>
-          <a:spcPts val="500"/>
-        </a:spcBef>
-        <a:buFont typeface="Arial" panose="020B0604020202020204" pitchFamily="34" charset="0"/>
-        <a:buChar char="•"/>
-        <a:defRPr sz="1800" kern="1200">
-          <a:solidFill>
-            <a:schemeClr val="tx1"/>
-          </a:solidFill>
-          <a:latin typeface="+mn-lt"/>
-          <a:ea typeface="+mn-ea"/>
-          <a:cs typeface="+mn-cs"/>
-        </a:defRPr>
-      </a:lvl5pPr>
-      <a:lvl6pPr marL="2514600" indent="-228600" algn="l" defTabSz="914400" rtl="0" eaLnBrk="1" latinLnBrk="0" hangingPunct="1">
-        <a:lnSpc>
-          <a:spcPct val="90000"/>
-        </a:lnSpc>
-        <a:spcBef>
-          <a:spcPts val="500"/>
-        </a:spcBef>
-        <a:buFont typeface="Arial" panose="020B0604020202020204" pitchFamily="34" charset="0"/>
-        <a:buChar char="•"/>
-        <a:defRPr sz="1800" kern="1200">
-          <a:solidFill>
-            <a:schemeClr val="tx1"/>
-          </a:solidFill>
-          <a:latin typeface="+mn-lt"/>
-          <a:ea typeface="+mn-ea"/>
-          <a:cs typeface="+mn-cs"/>
-        </a:defRPr>
-      </a:lvl6pPr>
-      <a:lvl7pPr marL="2971800" indent="-228600" algn="l" defTabSz="914400" rtl="0" eaLnBrk="1" latinLnBrk="0" hangingPunct="1">
-        <a:lnSpc>
-          <a:spcPct val="90000"/>
-        </a:lnSpc>
-        <a:spcBef>
-          <a:spcPts val="500"/>
-        </a:spcBef>
-        <a:buFont typeface="Arial" panose="020B0604020202020204" pitchFamily="34" charset="0"/>
-        <a:buChar char="•"/>
-        <a:defRPr sz="1800" kern="1200">
+        <a:defRPr sz="2000" kern="1200">
           <a:solidFill>
             <a:schemeClr val="tx1"/>
           </a:solidFill>
@@ -2819,15 +3404,12 @@
         </a:defRPr>
       </a:lvl7pPr>
       <a:lvl8pPr marL="3429000" indent="-228600" algn="l" defTabSz="914400" rtl="0" eaLnBrk="1" latinLnBrk="0" hangingPunct="1">
-        <a:lnSpc>
-          <a:spcPct val="90000"/>
-        </a:lnSpc>
         <a:spcBef>
-          <a:spcPts val="500"/>
+          <a:spcPct val="20000"/>
         </a:spcBef>
         <a:buFont typeface="Arial" panose="020B0604020202020204" pitchFamily="34" charset="0"/>
         <a:buChar char="•"/>
-        <a:defRPr sz="1800" kern="1200">
+        <a:defRPr sz="2000" kern="1200">
           <a:solidFill>
             <a:schemeClr val="tx1"/>
           </a:solidFill>
@@ -2837,15 +3419,12 @@
         </a:defRPr>
       </a:lvl8pPr>
       <a:lvl9pPr marL="3886200" indent="-228600" algn="l" defTabSz="914400" rtl="0" eaLnBrk="1" latinLnBrk="0" hangingPunct="1">
-        <a:lnSpc>
-          <a:spcPct val="90000"/>
-        </a:lnSpc>
         <a:spcBef>
-          <a:spcPts val="500"/>
+          <a:spcPct val="20000"/>
         </a:spcBef>
         <a:buFont typeface="Arial" panose="020B0604020202020204" pitchFamily="34" charset="0"/>
         <a:buChar char="•"/>
-        <a:defRPr sz="1800" kern="1200">
+        <a:defRPr sz="2000" kern="1200">
           <a:solidFill>
             <a:schemeClr val="tx1"/>
           </a:solidFill>
@@ -2971,206 +3550,22 @@
           <a:chExt cx="0" cy="0"/>
         </a:xfrm>
       </p:grpSpPr>
-      <p:graphicFrame>
-        <p:nvGraphicFramePr>
-          <p:cNvPr id="4" name="Table 4">
-            <a:extLst>
-              <a:ext uri="{FF2B5EF4-FFF2-40B4-BE49-F238E27FC236}">
-                <a16:creationId xmlns:a16="http://schemas.microsoft.com/office/drawing/2014/main" id="{8E106F41-6BDB-4065-B2C6-BA31F40FC18F}"/>
-              </a:ext>
-            </a:extLst>
-          </p:cNvPr>
-          <p:cNvGraphicFramePr>
-            <a:graphicFrameLocks noGrp="1"/>
-          </p:cNvGraphicFramePr>
-          <p:nvPr>
-            <p:extLst>
-              <p:ext uri="{D42A27DB-BD31-4B8C-83A1-F6EECF244321}">
-                <p14:modId xmlns:p14="http://schemas.microsoft.com/office/powerpoint/2010/main" val="3044687509"/>
-              </p:ext>
-            </p:extLst>
-          </p:nvPr>
-        </p:nvGraphicFramePr>
-        <p:xfrm>
-          <a:off x="508000" y="468654"/>
-          <a:ext cx="8128000" cy="1483360"/>
-        </p:xfrm>
-        <a:graphic>
-          <a:graphicData uri="http://schemas.openxmlformats.org/drawingml/2006/table">
-            <a:tbl>
-              <a:tblPr firstRow="1" bandRow="1">
-                <a:tableStyleId>{5940675A-B579-460E-94D1-54222C63F5DA}</a:tableStyleId>
-              </a:tblPr>
-              <a:tblGrid>
-                <a:gridCol w="4064000">
-                  <a:extLst>
-                    <a:ext uri="{9D8B030D-6E8A-4147-A177-3AD203B41FA5}">
-                      <a16:colId xmlns:a16="http://schemas.microsoft.com/office/drawing/2014/main" val="3135068197"/>
-                    </a:ext>
-                  </a:extLst>
-                </a:gridCol>
-                <a:gridCol w="4064000">
-                  <a:extLst>
-                    <a:ext uri="{9D8B030D-6E8A-4147-A177-3AD203B41FA5}">
-                      <a16:colId xmlns:a16="http://schemas.microsoft.com/office/drawing/2014/main" val="235572776"/>
-                    </a:ext>
-                  </a:extLst>
-                </a:gridCol>
-              </a:tblGrid>
-              <a:tr h="370840">
-                <a:tc>
-                  <a:txBody>
-                    <a:bodyPr/>
-                    <a:lstStyle/>
-                    <a:p>
-                      <a:pPr algn="ctr"/>
-                      <a:r>
-                        <a:rPr lang="en-US" dirty="0"/>
-                        <a:t>CASE NUMBER</a:t>
-                      </a:r>
-                      <a:endParaRPr lang="id-ID" dirty="0"/>
-                    </a:p>
-                  </a:txBody>
-                  <a:tcPr/>
-                </a:tc>
-                <a:tc>
-                  <a:txBody>
-                    <a:bodyPr/>
-                    <a:lstStyle/>
-                    <a:p>
-                      <a:endParaRPr lang="id-ID" dirty="0"/>
-                    </a:p>
-                  </a:txBody>
-                  <a:tcPr/>
-                </a:tc>
-                <a:extLst>
-                  <a:ext uri="{0D108BD9-81ED-4DB2-BD59-A6C34878D82A}">
-                    <a16:rowId xmlns:a16="http://schemas.microsoft.com/office/drawing/2014/main" val="1405607791"/>
-                  </a:ext>
-                </a:extLst>
-              </a:tr>
-              <a:tr h="370840">
-                <a:tc>
-                  <a:txBody>
-                    <a:bodyPr/>
-                    <a:lstStyle/>
-                    <a:p>
-                      <a:pPr algn="ctr"/>
-                      <a:r>
-                        <a:rPr lang="en-US" dirty="0"/>
-                        <a:t>UNIT MODEL</a:t>
-                      </a:r>
-                      <a:endParaRPr lang="id-ID" dirty="0"/>
-                    </a:p>
-                  </a:txBody>
-                  <a:tcPr/>
-                </a:tc>
-                <a:tc>
-                  <a:txBody>
-                    <a:bodyPr/>
-                    <a:lstStyle/>
-                    <a:p>
-                      <a:endParaRPr lang="id-ID" dirty="0"/>
-                    </a:p>
-                  </a:txBody>
-                  <a:tcPr/>
-                </a:tc>
-                <a:extLst>
-                  <a:ext uri="{0D108BD9-81ED-4DB2-BD59-A6C34878D82A}">
-                    <a16:rowId xmlns:a16="http://schemas.microsoft.com/office/drawing/2014/main" val="2099113448"/>
-                  </a:ext>
-                </a:extLst>
-              </a:tr>
-              <a:tr h="370840">
-                <a:tc>
-                  <a:txBody>
-                    <a:bodyPr/>
-                    <a:lstStyle/>
-                    <a:p>
-                      <a:pPr algn="ctr"/>
-                      <a:r>
-                        <a:rPr lang="en-US" dirty="0"/>
-                        <a:t>SERIAL NUMBER</a:t>
-                      </a:r>
-                      <a:endParaRPr lang="id-ID" dirty="0"/>
-                    </a:p>
-                  </a:txBody>
-                  <a:tcPr/>
-                </a:tc>
-                <a:tc>
-                  <a:txBody>
-                    <a:bodyPr/>
-                    <a:lstStyle/>
-                    <a:p>
-                      <a:endParaRPr lang="id-ID" dirty="0"/>
-                    </a:p>
-                  </a:txBody>
-                  <a:tcPr/>
-                </a:tc>
-                <a:extLst>
-                  <a:ext uri="{0D108BD9-81ED-4DB2-BD59-A6C34878D82A}">
-                    <a16:rowId xmlns:a16="http://schemas.microsoft.com/office/drawing/2014/main" val="790939611"/>
-                  </a:ext>
-                </a:extLst>
-              </a:tr>
-              <a:tr h="370840">
-                <a:tc>
-                  <a:txBody>
-                    <a:bodyPr/>
-                    <a:lstStyle/>
-                    <a:p>
-                      <a:pPr algn="ctr"/>
-                      <a:r>
-                        <a:rPr lang="en-US" dirty="0"/>
-                        <a:t>CLAIM NUMBER</a:t>
-                      </a:r>
-                      <a:endParaRPr lang="id-ID" dirty="0"/>
-                    </a:p>
-                  </a:txBody>
-                  <a:tcPr/>
-                </a:tc>
-                <a:tc>
-                  <a:txBody>
-                    <a:bodyPr/>
-                    <a:lstStyle/>
-                    <a:p>
-                      <a:endParaRPr lang="id-ID" dirty="0"/>
-                    </a:p>
-                  </a:txBody>
-                  <a:tcPr/>
-                </a:tc>
-                <a:extLst>
-                  <a:ext uri="{0D108BD9-81ED-4DB2-BD59-A6C34878D82A}">
-                    <a16:rowId xmlns:a16="http://schemas.microsoft.com/office/drawing/2014/main" val="3443209361"/>
-                  </a:ext>
-                </a:extLst>
-              </a:tr>
-            </a:tbl>
-          </a:graphicData>
-        </a:graphic>
-      </p:graphicFrame>
-      <p:sp>
-        <p:nvSpPr>
-          <p:cNvPr id="2" name="Rectangle 1">
-            <a:extLst>
-              <a:ext uri="{FF2B5EF4-FFF2-40B4-BE49-F238E27FC236}">
-                <a16:creationId xmlns:a16="http://schemas.microsoft.com/office/drawing/2014/main" id="{169964B8-166F-46F1-9923-216B41729100}"/>
-              </a:ext>
-            </a:extLst>
-          </p:cNvPr>
+      <p:sp>
+        <p:nvSpPr>
+          <p:cNvPr id="3" name="Rectangle 2"/>
           <p:cNvSpPr/>
           <p:nvPr/>
         </p:nvSpPr>
         <p:spPr>
           <a:xfrm>
-            <a:off x="708211" y="2256615"/>
-            <a:ext cx="3675529" cy="4287620"/>
+            <a:off x="395471" y="1977202"/>
+            <a:ext cx="3714293" cy="4548142"/>
           </a:xfrm>
           <a:prstGeom prst="rect">
             <a:avLst/>
           </a:prstGeom>
           <a:noFill/>
-          <a:ln w="38100">
+          <a:ln>
             <a:solidFill>
               <a:schemeClr val="tx1"/>
             </a:solidFill>
@@ -3197,32 +3592,26 @@
           <a:lstStyle/>
           <a:p>
             <a:pPr algn="ctr"/>
-            <a:endParaRPr lang="id-ID"/>
-          </a:p>
-        </p:txBody>
-      </p:sp>
-      <p:sp>
-        <p:nvSpPr>
-          <p:cNvPr id="6" name="Rectangle 5">
-            <a:extLst>
-              <a:ext uri="{FF2B5EF4-FFF2-40B4-BE49-F238E27FC236}">
-                <a16:creationId xmlns:a16="http://schemas.microsoft.com/office/drawing/2014/main" id="{2D7D4D1F-F14E-4DBD-90C1-D5F24528231A}"/>
-              </a:ext>
-            </a:extLst>
-          </p:cNvPr>
+            <a:endParaRPr lang="en-US"/>
+          </a:p>
+        </p:txBody>
+      </p:sp>
+      <p:sp>
+        <p:nvSpPr>
+          <p:cNvPr id="7" name="Rectangle 6"/>
           <p:cNvSpPr/>
           <p:nvPr/>
         </p:nvSpPr>
         <p:spPr>
           <a:xfrm>
-            <a:off x="4760262" y="2256615"/>
-            <a:ext cx="3675529" cy="4287620"/>
+            <a:off x="5034238" y="1980824"/>
+            <a:ext cx="3714293" cy="4548143"/>
           </a:xfrm>
           <a:prstGeom prst="rect">
             <a:avLst/>
           </a:prstGeom>
           <a:noFill/>
-          <a:ln w="38100">
+          <a:ln>
             <a:solidFill>
               <a:schemeClr val="tx1"/>
             </a:solidFill>
@@ -3249,16 +3638,270 @@
           <a:lstStyle/>
           <a:p>
             <a:pPr algn="ctr"/>
-            <a:endParaRPr lang="id-ID"/>
-          </a:p>
-        </p:txBody>
-      </p:sp>
+            <a:endParaRPr lang="en-US"/>
+          </a:p>
+        </p:txBody>
+      </p:sp>
+      <p:graphicFrame>
+        <p:nvGraphicFramePr>
+          <p:cNvPr id="6" name="Table 5"/>
+          <p:cNvGraphicFramePr>
+            <a:graphicFrameLocks noGrp="1"/>
+          </p:cNvGraphicFramePr>
+          <p:nvPr>
+            <p:extLst>
+              <p:ext uri="{D42A27DB-BD31-4B8C-83A1-F6EECF244321}">
+                <p14:modId xmlns:p14="http://schemas.microsoft.com/office/powerpoint/2010/main" val="528942121"/>
+              </p:ext>
+            </p:extLst>
+          </p:nvPr>
+        </p:nvGraphicFramePr>
+        <p:xfrm>
+          <a:off x="395471" y="332655"/>
+          <a:ext cx="8352993" cy="1483360"/>
+        </p:xfrm>
+        <a:graphic>
+          <a:graphicData uri="http://schemas.openxmlformats.org/drawingml/2006/table">
+            <a:tbl>
+              <a:tblPr firstRow="1" bandRow="1">
+                <a:tableStyleId>{5940675A-B579-460E-94D1-54222C63F5DA}</a:tableStyleId>
+              </a:tblPr>
+              <a:tblGrid>
+                <a:gridCol w="1872273">
+                  <a:extLst>
+                    <a:ext uri="{9D8B030D-6E8A-4147-A177-3AD203B41FA5}">
+                      <a16:colId xmlns:a16="http://schemas.microsoft.com/office/drawing/2014/main" val="20000"/>
+                    </a:ext>
+                  </a:extLst>
+                </a:gridCol>
+                <a:gridCol w="6480720">
+                  <a:extLst>
+                    <a:ext uri="{9D8B030D-6E8A-4147-A177-3AD203B41FA5}">
+                      <a16:colId xmlns:a16="http://schemas.microsoft.com/office/drawing/2014/main" val="20001"/>
+                    </a:ext>
+                  </a:extLst>
+                </a:gridCol>
+              </a:tblGrid>
+              <a:tr h="370840">
+                <a:tc>
+                  <a:txBody>
+                    <a:bodyPr/>
+                    <a:lstStyle/>
+                    <a:p>
+                      <a:r>
+                        <a:rPr lang="en-US" b="1" dirty="0">
+                          <a:solidFill>
+                            <a:schemeClr val="bg1"/>
+                          </a:solidFill>
+                        </a:rPr>
+                        <a:t>CUSTOMER</a:t>
+                      </a:r>
+                    </a:p>
+                  </a:txBody>
+                  <a:tcPr>
+                    <a:solidFill>
+                      <a:srgbClr val="00B050"/>
+                    </a:solidFill>
+                  </a:tcPr>
+                </a:tc>
+                <a:tc>
+                  <a:txBody>
+                    <a:bodyPr/>
+                    <a:lstStyle/>
+                    <a:p>
+                      <a:endParaRPr lang="en-US" dirty="0">
+                        <a:solidFill>
+                          <a:schemeClr val="bg1"/>
+                        </a:solidFill>
+                      </a:endParaRPr>
+                    </a:p>
+                  </a:txBody>
+                  <a:tcPr>
+                    <a:solidFill>
+                      <a:srgbClr val="00B050"/>
+                    </a:solidFill>
+                  </a:tcPr>
+                </a:tc>
+                <a:extLst>
+                  <a:ext uri="{0D108BD9-81ED-4DB2-BD59-A6C34878D82A}">
+                    <a16:rowId xmlns:a16="http://schemas.microsoft.com/office/drawing/2014/main" val="10000"/>
+                  </a:ext>
+                </a:extLst>
+              </a:tr>
+              <a:tr h="370840">
+                <a:tc>
+                  <a:txBody>
+                    <a:bodyPr/>
+                    <a:lstStyle/>
+                    <a:p>
+                      <a:r>
+                        <a:rPr lang="en-US" b="1" dirty="0">
+                          <a:solidFill>
+                            <a:schemeClr val="bg1"/>
+                          </a:solidFill>
+                        </a:rPr>
+                        <a:t>SERIAL</a:t>
+                      </a:r>
+                      <a:r>
+                        <a:rPr lang="en-US" b="1" baseline="0" dirty="0">
+                          <a:solidFill>
+                            <a:schemeClr val="bg1"/>
+                          </a:solidFill>
+                        </a:rPr>
+                        <a:t> NUMBER</a:t>
+                      </a:r>
+                      <a:endParaRPr lang="en-US" b="1" dirty="0">
+                        <a:solidFill>
+                          <a:schemeClr val="bg1"/>
+                        </a:solidFill>
+                      </a:endParaRPr>
+                    </a:p>
+                  </a:txBody>
+                  <a:tcPr>
+                    <a:solidFill>
+                      <a:srgbClr val="00B050"/>
+                    </a:solidFill>
+                  </a:tcPr>
+                </a:tc>
+                <a:tc>
+                  <a:txBody>
+                    <a:bodyPr/>
+                    <a:lstStyle/>
+                    <a:p>
+                      <a:endParaRPr lang="en-US" dirty="0">
+                        <a:solidFill>
+                          <a:schemeClr val="bg1"/>
+                        </a:solidFill>
+                      </a:endParaRPr>
+                    </a:p>
+                  </a:txBody>
+                  <a:tcPr>
+                    <a:solidFill>
+                      <a:srgbClr val="00B050"/>
+                    </a:solidFill>
+                  </a:tcPr>
+                </a:tc>
+                <a:extLst>
+                  <a:ext uri="{0D108BD9-81ED-4DB2-BD59-A6C34878D82A}">
+                    <a16:rowId xmlns:a16="http://schemas.microsoft.com/office/drawing/2014/main" val="10001"/>
+                  </a:ext>
+                </a:extLst>
+              </a:tr>
+              <a:tr h="370840">
+                <a:tc>
+                  <a:txBody>
+                    <a:bodyPr/>
+                    <a:lstStyle/>
+                    <a:p>
+                      <a:r>
+                        <a:rPr lang="en-US" b="1" dirty="0">
+                          <a:solidFill>
+                            <a:schemeClr val="bg1"/>
+                          </a:solidFill>
+                        </a:rPr>
+                        <a:t>CASE</a:t>
+                      </a:r>
+                      <a:r>
+                        <a:rPr lang="en-US" b="1" baseline="0" dirty="0">
+                          <a:solidFill>
+                            <a:schemeClr val="bg1"/>
+                          </a:solidFill>
+                        </a:rPr>
+                        <a:t> NUMBER</a:t>
+                      </a:r>
+                      <a:endParaRPr lang="en-US" b="1" dirty="0">
+                        <a:solidFill>
+                          <a:schemeClr val="bg1"/>
+                        </a:solidFill>
+                      </a:endParaRPr>
+                    </a:p>
+                  </a:txBody>
+                  <a:tcPr>
+                    <a:solidFill>
+                      <a:srgbClr val="00B050"/>
+                    </a:solidFill>
+                  </a:tcPr>
+                </a:tc>
+                <a:tc>
+                  <a:txBody>
+                    <a:bodyPr/>
+                    <a:lstStyle/>
+                    <a:p>
+                      <a:endParaRPr lang="en-US" dirty="0">
+                        <a:solidFill>
+                          <a:schemeClr val="bg1"/>
+                        </a:solidFill>
+                      </a:endParaRPr>
+                    </a:p>
+                  </a:txBody>
+                  <a:tcPr>
+                    <a:solidFill>
+                      <a:srgbClr val="00B050"/>
+                    </a:solidFill>
+                  </a:tcPr>
+                </a:tc>
+                <a:extLst>
+                  <a:ext uri="{0D108BD9-81ED-4DB2-BD59-A6C34878D82A}">
+                    <a16:rowId xmlns:a16="http://schemas.microsoft.com/office/drawing/2014/main" val="10002"/>
+                  </a:ext>
+                </a:extLst>
+              </a:tr>
+              <a:tr h="370840">
+                <a:tc>
+                  <a:txBody>
+                    <a:bodyPr/>
+                    <a:lstStyle/>
+                    <a:p>
+                      <a:r>
+                        <a:rPr lang="en-US" b="1" dirty="0">
+                          <a:solidFill>
+                            <a:schemeClr val="bg1"/>
+                          </a:solidFill>
+                        </a:rPr>
+                        <a:t>CLAIM NUMBER</a:t>
+                      </a:r>
+                    </a:p>
+                  </a:txBody>
+                  <a:tcPr>
+                    <a:solidFill>
+                      <a:srgbClr val="00B050"/>
+                    </a:solidFill>
+                  </a:tcPr>
+                </a:tc>
+                <a:tc>
+                  <a:txBody>
+                    <a:bodyPr/>
+                    <a:lstStyle/>
+                    <a:p>
+                      <a:endParaRPr lang="en-US" dirty="0">
+                        <a:solidFill>
+                          <a:schemeClr val="bg1"/>
+                        </a:solidFill>
+                      </a:endParaRPr>
+                    </a:p>
+                  </a:txBody>
+                  <a:tcPr>
+                    <a:solidFill>
+                      <a:srgbClr val="00B050"/>
+                    </a:solidFill>
+                  </a:tcPr>
+                </a:tc>
+                <a:extLst>
+                  <a:ext uri="{0D108BD9-81ED-4DB2-BD59-A6C34878D82A}">
+                    <a16:rowId xmlns:a16="http://schemas.microsoft.com/office/drawing/2014/main" val="2697666472"/>
+                  </a:ext>
+                </a:extLst>
+              </a:tr>
+            </a:tbl>
+          </a:graphicData>
+        </a:graphic>
+      </p:graphicFrame>
       <p:sp>
         <p:nvSpPr>
           <p:cNvPr id="5" name="Rectangle 4">
             <a:extLst>
               <a:ext uri="{FF2B5EF4-FFF2-40B4-BE49-F238E27FC236}">
-                <a16:creationId xmlns:a16="http://schemas.microsoft.com/office/drawing/2014/main" id="{3A2D66AA-A604-4273-8DDD-351AB464E2EE}"/>
+                <a16:creationId xmlns:a16="http://schemas.microsoft.com/office/drawing/2014/main" id="{D253C81F-89C7-4C16-AFCB-87D108203EC5}"/>
               </a:ext>
             </a:extLst>
           </p:cNvPr>
@@ -3267,7 +3910,7 @@
         </p:nvSpPr>
         <p:spPr>
           <a:xfrm>
-            <a:off x="5387790" y="2030707"/>
+            <a:off x="5681148" y="1809169"/>
             <a:ext cx="2420471" cy="506305"/>
           </a:xfrm>
           <a:prstGeom prst="rect">
@@ -3310,7 +3953,7 @@
     </p:spTree>
     <p:extLst>
       <p:ext uri="{BB962C8B-B14F-4D97-AF65-F5344CB8AC3E}">
-        <p14:creationId xmlns:p14="http://schemas.microsoft.com/office/powerpoint/2010/main" val="2025992077"/>
+        <p14:creationId xmlns:p14="http://schemas.microsoft.com/office/powerpoint/2010/main" val="2247439630"/>
       </p:ext>
     </p:extLst>
   </p:cSld>
@@ -3323,7 +3966,7 @@
 <file path=ppt/theme/theme1.xml><?xml version="1.0" encoding="utf-8"?>
 <a:theme xmlns:a="http://schemas.openxmlformats.org/drawingml/2006/main" name="Office Theme">
   <a:themeElements>
-    <a:clrScheme name="Office Theme">
+    <a:clrScheme name="Office">
       <a:dk1>
         <a:sysClr val="windowText" lastClr="000000"/>
       </a:dk1>
@@ -3331,44 +3974,44 @@
         <a:sysClr val="window" lastClr="FFFFFF"/>
       </a:lt1>
       <a:dk2>
-        <a:srgbClr val="44546A"/>
+        <a:srgbClr val="1F497D"/>
       </a:dk2>
       <a:lt2>
-        <a:srgbClr val="E7E6E6"/>
+        <a:srgbClr val="EEECE1"/>
       </a:lt2>
       <a:accent1>
-        <a:srgbClr val="4472C4"/>
+        <a:srgbClr val="4F81BD"/>
       </a:accent1>
       <a:accent2>
-        <a:srgbClr val="ED7D31"/>
+        <a:srgbClr val="C0504D"/>
       </a:accent2>
       <a:accent3>
-        <a:srgbClr val="A5A5A5"/>
+        <a:srgbClr val="9BBB59"/>
       </a:accent3>
       <a:accent4>
-        <a:srgbClr val="FFC000"/>
+        <a:srgbClr val="8064A2"/>
       </a:accent4>
       <a:accent5>
-        <a:srgbClr val="5B9BD5"/>
+        <a:srgbClr val="4BACC6"/>
       </a:accent5>
       <a:accent6>
-        <a:srgbClr val="70AD47"/>
+        <a:srgbClr val="F79646"/>
       </a:accent6>
       <a:hlink>
-        <a:srgbClr val="0563C1"/>
+        <a:srgbClr val="0000FF"/>
       </a:hlink>
       <a:folHlink>
-        <a:srgbClr val="954F72"/>
+        <a:srgbClr val="800080"/>
       </a:folHlink>
     </a:clrScheme>
-    <a:fontScheme name="Office Theme">
+    <a:fontScheme name="Office">
       <a:majorFont>
-        <a:latin typeface="Calibri Light" panose="020F0302020204030204"/>
+        <a:latin typeface="Calibri"/>
         <a:ea typeface=""/>
         <a:cs typeface=""/>
-        <a:font script="Jpan" typeface="游ゴシック Light"/>
+        <a:font script="Jpan" typeface="ＭＳ Ｐゴシック"/>
         <a:font script="Hang" typeface="맑은 고딕"/>
-        <a:font script="Hans" typeface="等线 Light"/>
+        <a:font script="Hans" typeface="宋体"/>
         <a:font script="Hant" typeface="新細明體"/>
         <a:font script="Arab" typeface="Times New Roman"/>
         <a:font script="Hebr" typeface="Times New Roman"/>
@@ -3398,12 +4041,12 @@
         <a:font script="Geor" typeface="Sylfaen"/>
       </a:majorFont>
       <a:minorFont>
-        <a:latin typeface="Calibri" panose="020F0502020204030204"/>
+        <a:latin typeface="Calibri"/>
         <a:ea typeface=""/>
         <a:cs typeface=""/>
-        <a:font script="Jpan" typeface="游ゴシック"/>
+        <a:font script="Jpan" typeface="ＭＳ Ｐゴシック"/>
         <a:font script="Hang" typeface="맑은 고딕"/>
-        <a:font script="Hans" typeface="等线"/>
+        <a:font script="Hans" typeface="宋体"/>
         <a:font script="Hant" typeface="新細明體"/>
         <a:font script="Arab" typeface="Arial"/>
         <a:font script="Hebr" typeface="Arial"/>
@@ -3433,7 +4076,7 @@
         <a:font script="Geor" typeface="Sylfaen"/>
       </a:minorFont>
     </a:fontScheme>
-    <a:fmtScheme name="Office Theme">
+    <a:fmtScheme name="Office">
       <a:fillStyleLst>
         <a:solidFill>
           <a:schemeClr val="phClr"/>
@@ -3442,141 +4085,450 @@
           <a:gsLst>
             <a:gs pos="0">
               <a:schemeClr val="phClr">
-                <a:lumMod val="110000"/>
-                <a:satMod val="105000"/>
-                <a:tint val="67000"/>
+                <a:tint val="50000"/>
+                <a:satMod val="300000"/>
               </a:schemeClr>
             </a:gs>
-            <a:gs pos="50000">
+            <a:gs pos="35000">
               <a:schemeClr val="phClr">
-                <a:lumMod val="105000"/>
-                <a:satMod val="103000"/>
-                <a:tint val="73000"/>
+                <a:tint val="37000"/>
+                <a:satMod val="300000"/>
               </a:schemeClr>
             </a:gs>
             <a:gs pos="100000">
               <a:schemeClr val="phClr">
-                <a:lumMod val="105000"/>
-                <a:satMod val="109000"/>
-                <a:tint val="81000"/>
+                <a:tint val="15000"/>
+                <a:satMod val="350000"/>
               </a:schemeClr>
             </a:gs>
           </a:gsLst>
-          <a:lin ang="5400000" scaled="0"/>
+          <a:lin ang="16200000" scaled="1"/>
         </a:gradFill>
         <a:gradFill rotWithShape="1">
           <a:gsLst>
             <a:gs pos="0">
               <a:schemeClr val="phClr">
-                <a:satMod val="103000"/>
-                <a:lumMod val="102000"/>
-                <a:tint val="94000"/>
+                <a:shade val="51000"/>
+                <a:satMod val="130000"/>
               </a:schemeClr>
             </a:gs>
-            <a:gs pos="50000">
+            <a:gs pos="80000">
               <a:schemeClr val="phClr">
-                <a:satMod val="110000"/>
-                <a:lumMod val="100000"/>
-                <a:shade val="100000"/>
+                <a:shade val="93000"/>
+                <a:satMod val="130000"/>
               </a:schemeClr>
             </a:gs>
             <a:gs pos="100000">
               <a:schemeClr val="phClr">
-                <a:lumMod val="99000"/>
-                <a:satMod val="120000"/>
-                <a:shade val="78000"/>
+                <a:shade val="94000"/>
+                <a:satMod val="135000"/>
               </a:schemeClr>
             </a:gs>
           </a:gsLst>
-          <a:lin ang="5400000" scaled="0"/>
+          <a:lin ang="16200000" scaled="0"/>
         </a:gradFill>
       </a:fillStyleLst>
       <a:lnStyleLst>
-        <a:ln w="6350" cap="flat" cmpd="sng" algn="ctr">
+        <a:ln w="9525" cap="flat" cmpd="sng" algn="ctr">
+          <a:solidFill>
+            <a:schemeClr val="phClr">
+              <a:shade val="95000"/>
+              <a:satMod val="105000"/>
+            </a:schemeClr>
+          </a:solidFill>
+          <a:prstDash val="solid"/>
+        </a:ln>
+        <a:ln w="25400" cap="flat" cmpd="sng" algn="ctr">
           <a:solidFill>
             <a:schemeClr val="phClr"/>
           </a:solidFill>
           <a:prstDash val="solid"/>
-          <a:miter lim="800000"/>
         </a:ln>
-        <a:ln w="12700" cap="flat" cmpd="sng" algn="ctr">
+        <a:ln w="38100" cap="flat" cmpd="sng" algn="ctr">
           <a:solidFill>
             <a:schemeClr val="phClr"/>
           </a:solidFill>
           <a:prstDash val="solid"/>
-          <a:miter lim="800000"/>
-        </a:ln>
-        <a:ln w="19050" cap="flat" cmpd="sng" algn="ctr">
-          <a:solidFill>
-            <a:schemeClr val="phClr"/>
-          </a:solidFill>
-          <a:prstDash val="solid"/>
-          <a:miter lim="800000"/>
         </a:ln>
       </a:lnStyleLst>
       <a:effectStyleLst>
         <a:effectStyle>
-          <a:effectLst/>
-        </a:effectStyle>
-        <a:effectStyle>
-          <a:effectLst/>
+          <a:effectLst>
+            <a:outerShdw blurRad="40000" dist="20000" dir="5400000" rotWithShape="0">
+              <a:srgbClr val="000000">
+                <a:alpha val="38000"/>
+              </a:srgbClr>
+            </a:outerShdw>
+          </a:effectLst>
         </a:effectStyle>
         <a:effectStyle>
           <a:effectLst>
-            <a:outerShdw blurRad="57150" dist="19050" dir="5400000" algn="ctr" rotWithShape="0">
+            <a:outerShdw blurRad="40000" dist="23000" dir="5400000" rotWithShape="0">
               <a:srgbClr val="000000">
-                <a:alpha val="63000"/>
+                <a:alpha val="35000"/>
               </a:srgbClr>
             </a:outerShdw>
           </a:effectLst>
+        </a:effectStyle>
+        <a:effectStyle>
+          <a:effectLst>
+            <a:outerShdw blurRad="40000" dist="23000" dir="5400000" rotWithShape="0">
+              <a:srgbClr val="000000">
+                <a:alpha val="35000"/>
+              </a:srgbClr>
+            </a:outerShdw>
+          </a:effectLst>
+          <a:scene3d>
+            <a:camera prst="orthographicFront">
+              <a:rot lat="0" lon="0" rev="0"/>
+            </a:camera>
+            <a:lightRig rig="threePt" dir="t">
+              <a:rot lat="0" lon="0" rev="1200000"/>
+            </a:lightRig>
+          </a:scene3d>
+          <a:sp3d>
+            <a:bevelT w="63500" h="25400"/>
+          </a:sp3d>
         </a:effectStyle>
       </a:effectStyleLst>
       <a:bgFillStyleLst>
         <a:solidFill>
           <a:schemeClr val="phClr"/>
         </a:solidFill>
-        <a:solidFill>
-          <a:schemeClr val="phClr">
-            <a:tint val="95000"/>
-            <a:satMod val="170000"/>
-          </a:schemeClr>
-        </a:solidFill>
         <a:gradFill rotWithShape="1">
           <a:gsLst>
             <a:gs pos="0">
               <a:schemeClr val="phClr">
-                <a:tint val="93000"/>
-                <a:satMod val="150000"/>
-                <a:shade val="98000"/>
-                <a:lumMod val="102000"/>
+                <a:tint val="40000"/>
+                <a:satMod val="350000"/>
               </a:schemeClr>
             </a:gs>
-            <a:gs pos="50000">
+            <a:gs pos="40000">
               <a:schemeClr val="phClr">
-                <a:tint val="98000"/>
-                <a:satMod val="130000"/>
-                <a:shade val="90000"/>
-                <a:lumMod val="103000"/>
+                <a:tint val="45000"/>
+                <a:shade val="99000"/>
+                <a:satMod val="350000"/>
               </a:schemeClr>
             </a:gs>
             <a:gs pos="100000">
               <a:schemeClr val="phClr">
-                <a:shade val="63000"/>
-                <a:satMod val="120000"/>
+                <a:shade val="20000"/>
+                <a:satMod val="255000"/>
               </a:schemeClr>
             </a:gs>
           </a:gsLst>
-          <a:lin ang="5400000" scaled="0"/>
+          <a:path path="circle">
+            <a:fillToRect l="50000" t="-80000" r="50000" b="180000"/>
+          </a:path>
+        </a:gradFill>
+        <a:gradFill rotWithShape="1">
+          <a:gsLst>
+            <a:gs pos="0">
+              <a:schemeClr val="phClr">
+                <a:tint val="80000"/>
+                <a:satMod val="300000"/>
+              </a:schemeClr>
+            </a:gs>
+            <a:gs pos="100000">
+              <a:schemeClr val="phClr">
+                <a:shade val="30000"/>
+                <a:satMod val="200000"/>
+              </a:schemeClr>
+            </a:gs>
+          </a:gsLst>
+          <a:path path="circle">
+            <a:fillToRect l="50000" t="50000" r="50000" b="50000"/>
+          </a:path>
         </a:gradFill>
       </a:bgFillStyleLst>
     </a:fmtScheme>
   </a:themeElements>
   <a:objectDefaults/>
   <a:extraClrSchemeLst/>
-  <a:extLst>
-    <a:ext uri="{05A4C25C-085E-4340-85A3-A5531E510DB2}">
-      <thm15:themeFamily xmlns:thm15="http://schemas.microsoft.com/office/thememl/2012/main" name="Office Theme" id="{62F939B6-93AF-4DB8-9C6B-D6C7DFDC589F}" vid="{4A3C46E8-61CC-4603-A589-7422A47A8E4A}"/>
-    </a:ext>
-  </a:extLst>
+</a:theme>
+</file>
+
+<file path=ppt/theme/theme2.xml><?xml version="1.0" encoding="utf-8"?>
+<a:theme xmlns:a="http://schemas.openxmlformats.org/drawingml/2006/main" name="Office Theme">
+  <a:themeElements>
+    <a:clrScheme name="Office">
+      <a:dk1>
+        <a:sysClr val="windowText" lastClr="000000"/>
+      </a:dk1>
+      <a:lt1>
+        <a:sysClr val="window" lastClr="FFFFFF"/>
+      </a:lt1>
+      <a:dk2>
+        <a:srgbClr val="1F497D"/>
+      </a:dk2>
+      <a:lt2>
+        <a:srgbClr val="EEECE1"/>
+      </a:lt2>
+      <a:accent1>
+        <a:srgbClr val="4F81BD"/>
+      </a:accent1>
+      <a:accent2>
+        <a:srgbClr val="C0504D"/>
+      </a:accent2>
+      <a:accent3>
+        <a:srgbClr val="9BBB59"/>
+      </a:accent3>
+      <a:accent4>
+        <a:srgbClr val="8064A2"/>
+      </a:accent4>
+      <a:accent5>
+        <a:srgbClr val="4BACC6"/>
+      </a:accent5>
+      <a:accent6>
+        <a:srgbClr val="F79646"/>
+      </a:accent6>
+      <a:hlink>
+        <a:srgbClr val="0000FF"/>
+      </a:hlink>
+      <a:folHlink>
+        <a:srgbClr val="800080"/>
+      </a:folHlink>
+    </a:clrScheme>
+    <a:fontScheme name="Office">
+      <a:majorFont>
+        <a:latin typeface="Calibri"/>
+        <a:ea typeface=""/>
+        <a:cs typeface=""/>
+        <a:font script="Jpan" typeface="ＭＳ Ｐゴシック"/>
+        <a:font script="Hang" typeface="맑은 고딕"/>
+        <a:font script="Hans" typeface="宋体"/>
+        <a:font script="Hant" typeface="新細明體"/>
+        <a:font script="Arab" typeface="Times New Roman"/>
+        <a:font script="Hebr" typeface="Times New Roman"/>
+        <a:font script="Thai" typeface="Angsana New"/>
+        <a:font script="Ethi" typeface="Nyala"/>
+        <a:font script="Beng" typeface="Vrinda"/>
+        <a:font script="Gujr" typeface="Shruti"/>
+        <a:font script="Khmr" typeface="MoolBoran"/>
+        <a:font script="Knda" typeface="Tunga"/>
+        <a:font script="Guru" typeface="Raavi"/>
+        <a:font script="Cans" typeface="Euphemia"/>
+        <a:font script="Cher" typeface="Plantagenet Cherokee"/>
+        <a:font script="Yiii" typeface="Microsoft Yi Baiti"/>
+        <a:font script="Tibt" typeface="Microsoft Himalaya"/>
+        <a:font script="Thaa" typeface="MV Boli"/>
+        <a:font script="Deva" typeface="Mangal"/>
+        <a:font script="Telu" typeface="Gautami"/>
+        <a:font script="Taml" typeface="Latha"/>
+        <a:font script="Syrc" typeface="Estrangelo Edessa"/>
+        <a:font script="Orya" typeface="Kalinga"/>
+        <a:font script="Mlym" typeface="Kartika"/>
+        <a:font script="Laoo" typeface="DokChampa"/>
+        <a:font script="Sinh" typeface="Iskoola Pota"/>
+        <a:font script="Mong" typeface="Mongolian Baiti"/>
+        <a:font script="Viet" typeface="Times New Roman"/>
+        <a:font script="Uigh" typeface="Microsoft Uighur"/>
+        <a:font script="Geor" typeface="Sylfaen"/>
+      </a:majorFont>
+      <a:minorFont>
+        <a:latin typeface="Calibri"/>
+        <a:ea typeface=""/>
+        <a:cs typeface=""/>
+        <a:font script="Jpan" typeface="ＭＳ Ｐゴシック"/>
+        <a:font script="Hang" typeface="맑은 고딕"/>
+        <a:font script="Hans" typeface="宋体"/>
+        <a:font script="Hant" typeface="新細明體"/>
+        <a:font script="Arab" typeface="Arial"/>
+        <a:font script="Hebr" typeface="Arial"/>
+        <a:font script="Thai" typeface="Cordia New"/>
+        <a:font script="Ethi" typeface="Nyala"/>
+        <a:font script="Beng" typeface="Vrinda"/>
+        <a:font script="Gujr" typeface="Shruti"/>
+        <a:font script="Khmr" typeface="DaunPenh"/>
+        <a:font script="Knda" typeface="Tunga"/>
+        <a:font script="Guru" typeface="Raavi"/>
+        <a:font script="Cans" typeface="Euphemia"/>
+        <a:font script="Cher" typeface="Plantagenet Cherokee"/>
+        <a:font script="Yiii" typeface="Microsoft Yi Baiti"/>
+        <a:font script="Tibt" typeface="Microsoft Himalaya"/>
+        <a:font script="Thaa" typeface="MV Boli"/>
+        <a:font script="Deva" typeface="Mangal"/>
+        <a:font script="Telu" typeface="Gautami"/>
+        <a:font script="Taml" typeface="Latha"/>
+        <a:font script="Syrc" typeface="Estrangelo Edessa"/>
+        <a:font script="Orya" typeface="Kalinga"/>
+        <a:font script="Mlym" typeface="Kartika"/>
+        <a:font script="Laoo" typeface="DokChampa"/>
+        <a:font script="Sinh" typeface="Iskoola Pota"/>
+        <a:font script="Mong" typeface="Mongolian Baiti"/>
+        <a:font script="Viet" typeface="Arial"/>
+        <a:font script="Uigh" typeface="Microsoft Uighur"/>
+        <a:font script="Geor" typeface="Sylfaen"/>
+      </a:minorFont>
+    </a:fontScheme>
+    <a:fmtScheme name="Office">
+      <a:fillStyleLst>
+        <a:solidFill>
+          <a:schemeClr val="phClr"/>
+        </a:solidFill>
+        <a:gradFill rotWithShape="1">
+          <a:gsLst>
+            <a:gs pos="0">
+              <a:schemeClr val="phClr">
+                <a:tint val="50000"/>
+                <a:satMod val="300000"/>
+              </a:schemeClr>
+            </a:gs>
+            <a:gs pos="35000">
+              <a:schemeClr val="phClr">
+                <a:tint val="37000"/>
+                <a:satMod val="300000"/>
+              </a:schemeClr>
+            </a:gs>
+            <a:gs pos="100000">
+              <a:schemeClr val="phClr">
+                <a:tint val="15000"/>
+                <a:satMod val="350000"/>
+              </a:schemeClr>
+            </a:gs>
+          </a:gsLst>
+          <a:lin ang="16200000" scaled="1"/>
+        </a:gradFill>
+        <a:gradFill rotWithShape="1">
+          <a:gsLst>
+            <a:gs pos="0">
+              <a:schemeClr val="phClr">
+                <a:shade val="51000"/>
+                <a:satMod val="130000"/>
+              </a:schemeClr>
+            </a:gs>
+            <a:gs pos="80000">
+              <a:schemeClr val="phClr">
+                <a:shade val="93000"/>
+                <a:satMod val="130000"/>
+              </a:schemeClr>
+            </a:gs>
+            <a:gs pos="100000">
+              <a:schemeClr val="phClr">
+                <a:shade val="94000"/>
+                <a:satMod val="135000"/>
+              </a:schemeClr>
+            </a:gs>
+          </a:gsLst>
+          <a:lin ang="16200000" scaled="0"/>
+        </a:gradFill>
+      </a:fillStyleLst>
+      <a:lnStyleLst>
+        <a:ln w="9525" cap="flat" cmpd="sng" algn="ctr">
+          <a:solidFill>
+            <a:schemeClr val="phClr">
+              <a:shade val="95000"/>
+              <a:satMod val="105000"/>
+            </a:schemeClr>
+          </a:solidFill>
+          <a:prstDash val="solid"/>
+        </a:ln>
+        <a:ln w="25400" cap="flat" cmpd="sng" algn="ctr">
+          <a:solidFill>
+            <a:schemeClr val="phClr"/>
+          </a:solidFill>
+          <a:prstDash val="solid"/>
+        </a:ln>
+        <a:ln w="38100" cap="flat" cmpd="sng" algn="ctr">
+          <a:solidFill>
+            <a:schemeClr val="phClr"/>
+          </a:solidFill>
+          <a:prstDash val="solid"/>
+        </a:ln>
+      </a:lnStyleLst>
+      <a:effectStyleLst>
+        <a:effectStyle>
+          <a:effectLst>
+            <a:outerShdw blurRad="40000" dist="20000" dir="5400000" rotWithShape="0">
+              <a:srgbClr val="000000">
+                <a:alpha val="38000"/>
+              </a:srgbClr>
+            </a:outerShdw>
+          </a:effectLst>
+        </a:effectStyle>
+        <a:effectStyle>
+          <a:effectLst>
+            <a:outerShdw blurRad="40000" dist="23000" dir="5400000" rotWithShape="0">
+              <a:srgbClr val="000000">
+                <a:alpha val="35000"/>
+              </a:srgbClr>
+            </a:outerShdw>
+          </a:effectLst>
+        </a:effectStyle>
+        <a:effectStyle>
+          <a:effectLst>
+            <a:outerShdw blurRad="40000" dist="23000" dir="5400000" rotWithShape="0">
+              <a:srgbClr val="000000">
+                <a:alpha val="35000"/>
+              </a:srgbClr>
+            </a:outerShdw>
+          </a:effectLst>
+          <a:scene3d>
+            <a:camera prst="orthographicFront">
+              <a:rot lat="0" lon="0" rev="0"/>
+            </a:camera>
+            <a:lightRig rig="threePt" dir="t">
+              <a:rot lat="0" lon="0" rev="1200000"/>
+            </a:lightRig>
+          </a:scene3d>
+          <a:sp3d>
+            <a:bevelT w="63500" h="25400"/>
+          </a:sp3d>
+        </a:effectStyle>
+      </a:effectStyleLst>
+      <a:bgFillStyleLst>
+        <a:solidFill>
+          <a:schemeClr val="phClr"/>
+        </a:solidFill>
+        <a:gradFill rotWithShape="1">
+          <a:gsLst>
+            <a:gs pos="0">
+              <a:schemeClr val="phClr">
+                <a:tint val="40000"/>
+                <a:satMod val="350000"/>
+              </a:schemeClr>
+            </a:gs>
+            <a:gs pos="40000">
+              <a:schemeClr val="phClr">
+                <a:tint val="45000"/>
+                <a:shade val="99000"/>
+                <a:satMod val="350000"/>
+              </a:schemeClr>
+            </a:gs>
+            <a:gs pos="100000">
+              <a:schemeClr val="phClr">
+                <a:shade val="20000"/>
+                <a:satMod val="255000"/>
+              </a:schemeClr>
+            </a:gs>
+          </a:gsLst>
+          <a:path path="circle">
+            <a:fillToRect l="50000" t="-80000" r="50000" b="180000"/>
+          </a:path>
+        </a:gradFill>
+        <a:gradFill rotWithShape="1">
+          <a:gsLst>
+            <a:gs pos="0">
+              <a:schemeClr val="phClr">
+                <a:tint val="80000"/>
+                <a:satMod val="300000"/>
+              </a:schemeClr>
+            </a:gs>
+            <a:gs pos="100000">
+              <a:schemeClr val="phClr">
+                <a:shade val="30000"/>
+                <a:satMod val="200000"/>
+              </a:schemeClr>
+            </a:gs>
+          </a:gsLst>
+          <a:path path="circle">
+            <a:fillToRect l="50000" t="50000" r="50000" b="50000"/>
+          </a:path>
+        </a:gradFill>
+      </a:bgFillStyleLst>
+    </a:fmtScheme>
+  </a:themeElements>
+  <a:objectDefaults/>
+  <a:extraClrSchemeLst/>
 </a:theme>
 </file>
</xml_diff>